<commit_message>
try except update of username
</commit_message>
<xml_diff>
--- a/about_me/Visual Listening In_Draft_LS.pptx
+++ b/about_me/Visual Listening In_Draft_LS.pptx
@@ -14590,6 +14590,107 @@
       </p:grpSpPr>
       <p:sp>
         <p:nvSpPr>
+          <p:cNvPr id="2" name="Slide Image Placeholder 1"/>
+          <p:cNvSpPr>
+            <a:spLocks noGrp="1" noRot="1" noChangeAspect="1"/>
+          </p:cNvSpPr>
+          <p:nvPr>
+            <p:ph type="sldImg"/>
+          </p:nvPr>
+        </p:nvSpPr>
+        <p:spPr/>
+      </p:sp>
+      <p:sp>
+        <p:nvSpPr>
+          <p:cNvPr id="3" name="Notes Placeholder 2"/>
+          <p:cNvSpPr>
+            <a:spLocks noGrp="1"/>
+          </p:cNvSpPr>
+          <p:nvPr>
+            <p:ph type="body" idx="1"/>
+          </p:nvPr>
+        </p:nvSpPr>
+        <p:spPr/>
+        <p:txBody>
+          <a:bodyPr/>
+          <a:lstStyle/>
+          <a:p>
+            <a:r>
+              <a:rPr lang="de-CH" smtClean="0"/>
+              <a:t>Welcome to our presentation of the project about Visual Listening or Extracting Brand</a:t>
+            </a:r>
+            <a:r>
+              <a:rPr lang="de-CH" baseline="0" smtClean="0"/>
+              <a:t> Image Portrayed on Social Media. </a:t>
+            </a:r>
+          </a:p>
+          <a:p>
+            <a:r>
+              <a:rPr lang="de-CH" baseline="0" smtClean="0"/>
+              <a:t>Our team members consists of Neeraj, Linda, Theebana and Vincent. </a:t>
+            </a:r>
+          </a:p>
+          <a:p>
+            <a:endParaRPr lang="en-US"/>
+          </a:p>
+        </p:txBody>
+      </p:sp>
+      <p:sp>
+        <p:nvSpPr>
+          <p:cNvPr id="4" name="Slide Number Placeholder 3"/>
+          <p:cNvSpPr>
+            <a:spLocks noGrp="1"/>
+          </p:cNvSpPr>
+          <p:nvPr>
+            <p:ph type="sldNum" sz="quarter" idx="10"/>
+          </p:nvPr>
+        </p:nvSpPr>
+        <p:spPr/>
+        <p:txBody>
+          <a:bodyPr/>
+          <a:lstStyle/>
+          <a:p>
+            <a:fld id="{2A9D45BF-071E-7C44-BE90-B011D0240A3E}" type="slidenum">
+              <a:rPr lang="en-US" smtClean="0"/>
+              <a:pPr/>
+              <a:t>1</a:t>
+            </a:fld>
+            <a:endParaRPr lang="en-US"/>
+          </a:p>
+        </p:txBody>
+      </p:sp>
+    </p:spTree>
+    <p:extLst>
+      <p:ext uri="{BB962C8B-B14F-4D97-AF65-F5344CB8AC3E}">
+        <p14:creationId xmlns:p14="http://schemas.microsoft.com/office/powerpoint/2010/main" val="1341234096"/>
+      </p:ext>
+    </p:extLst>
+  </p:cSld>
+  <p:clrMapOvr>
+    <a:masterClrMapping/>
+  </p:clrMapOvr>
+</p:notes>
+</file>
+
+<file path=ppt/notesSlides/notesSlide2.xml><?xml version="1.0" encoding="utf-8"?>
+<p:notes xmlns:a="http://schemas.openxmlformats.org/drawingml/2006/main" xmlns:r="http://schemas.openxmlformats.org/officeDocument/2006/relationships" xmlns:p="http://schemas.openxmlformats.org/presentationml/2006/main">
+  <p:cSld>
+    <p:spTree>
+      <p:nvGrpSpPr>
+        <p:cNvPr id="1" name=""/>
+        <p:cNvGrpSpPr/>
+        <p:nvPr/>
+      </p:nvGrpSpPr>
+      <p:grpSpPr>
+        <a:xfrm>
+          <a:off x="0" y="0"/>
+          <a:ext cx="0" cy="0"/>
+          <a:chOff x="0" y="0"/>
+          <a:chExt cx="0" cy="0"/>
+        </a:xfrm>
+      </p:grpSpPr>
+      <p:sp>
+        <p:nvSpPr>
           <p:cNvPr id="2" name="Folienbildplatzhalter 1"/>
           <p:cNvSpPr>
             <a:spLocks noGrp="1" noRot="1" noChangeAspect="1"/>
@@ -14805,7 +14906,7 @@
 </p:notes>
 </file>
 
-<file path=ppt/notesSlides/notesSlide2.xml><?xml version="1.0" encoding="utf-8"?>
+<file path=ppt/notesSlides/notesSlide3.xml><?xml version="1.0" encoding="utf-8"?>
 <p:notes xmlns:a="http://schemas.openxmlformats.org/drawingml/2006/main" xmlns:r="http://schemas.openxmlformats.org/officeDocument/2006/relationships" xmlns:p="http://schemas.openxmlformats.org/presentationml/2006/main">
   <p:cSld>
     <p:spTree>
@@ -14890,7 +14991,7 @@
 </p:notes>
 </file>
 
-<file path=ppt/notesSlides/notesSlide3.xml><?xml version="1.0" encoding="utf-8"?>
+<file path=ppt/notesSlides/notesSlide4.xml><?xml version="1.0" encoding="utf-8"?>
 <p:notes xmlns:a="http://schemas.openxmlformats.org/drawingml/2006/main" xmlns:r="http://schemas.openxmlformats.org/officeDocument/2006/relationships" xmlns:p="http://schemas.openxmlformats.org/presentationml/2006/main">
   <p:cSld>
     <p:spTree>
@@ -14979,7 +15080,7 @@
 </p:notes>
 </file>
 
-<file path=ppt/notesSlides/notesSlide4.xml><?xml version="1.0" encoding="utf-8"?>
+<file path=ppt/notesSlides/notesSlide5.xml><?xml version="1.0" encoding="utf-8"?>
 <p:notes xmlns:a="http://schemas.openxmlformats.org/drawingml/2006/main" xmlns:r="http://schemas.openxmlformats.org/officeDocument/2006/relationships" xmlns:p="http://schemas.openxmlformats.org/presentationml/2006/main">
   <p:cSld>
     <p:spTree>
@@ -15716,7 +15817,7 @@
           </a:ln>
           <a:extLst>
             <a:ext uri="{91240B29-F687-4f45-9708-019B960494DF}">
-              <a14:hiddenLine xmlns:a14="http://schemas.microsoft.com/office/drawing/2010/main" xmlns="" w="9525">
+              <a14:hiddenLine xmlns="" xmlns:a14="http://schemas.microsoft.com/office/drawing/2010/main" w="9525">
                 <a:solidFill>
                   <a:srgbClr val="000000"/>
                 </a:solidFill>
@@ -15876,7 +15977,7 @@
           <a:graphicData uri="http://schemas.openxmlformats.org/presentationml/2006/ole">
             <mc:AlternateContent xmlns:mc="http://schemas.openxmlformats.org/markup-compatibility/2006">
               <mc:Choice xmlns:v="urn:schemas-microsoft-com:vml" Requires="v">
-                <p:oleObj spid="_x0000_s27797" name="think-cell Slide" r:id="rId7" imgW="38100" imgH="38100" progId="TCLayout.ActiveDocument.1">
+                <p:oleObj spid="_x0000_s27800" name="think-cell Slide" r:id="rId7" imgW="38100" imgH="38100" progId="TCLayout.ActiveDocument.1">
                   <p:embed/>
                 </p:oleObj>
               </mc:Choice>
@@ -15918,14 +16019,14 @@
                       </a:ln>
                       <a:extLst>
                         <a:ext uri="{909E8E84-426E-40dd-AFC4-6F175D3DCCD1}">
-                          <a14:hiddenFill xmlns:a14="http://schemas.microsoft.com/office/drawing/2010/main" xmlns="">
+                          <a14:hiddenFill xmlns="" xmlns:a14="http://schemas.microsoft.com/office/drawing/2010/main">
                             <a:solidFill>
                               <a:srgbClr val="FFFFFF"/>
                             </a:solidFill>
                           </a14:hiddenFill>
                         </a:ext>
                         <a:ext uri="{91240B29-F687-4f45-9708-019B960494DF}">
-                          <a14:hiddenLine xmlns:a14="http://schemas.microsoft.com/office/drawing/2010/main" xmlns="" w="9525">
+                          <a14:hiddenLine xmlns="" xmlns:a14="http://schemas.microsoft.com/office/drawing/2010/main" w="9525">
                             <a:solidFill>
                               <a:srgbClr val="000000"/>
                             </a:solidFill>
@@ -16408,14 +16509,14 @@
           </a:ln>
           <a:extLst>
             <a:ext uri="{909E8E84-426E-40dd-AFC4-6F175D3DCCD1}">
-              <a14:hiddenFill xmlns:a14="http://schemas.microsoft.com/office/drawing/2010/main" xmlns="">
+              <a14:hiddenFill xmlns="" xmlns:a14="http://schemas.microsoft.com/office/drawing/2010/main">
                 <a:solidFill>
                   <a:srgbClr val="FFFFFF"/>
                 </a:solidFill>
               </a14:hiddenFill>
             </a:ext>
             <a:ext uri="{91240B29-F687-4f45-9708-019B960494DF}">
-              <a14:hiddenLine xmlns:a14="http://schemas.microsoft.com/office/drawing/2010/main" xmlns="" w="9525">
+              <a14:hiddenLine xmlns="" xmlns:a14="http://schemas.microsoft.com/office/drawing/2010/main" w="9525">
                 <a:solidFill>
                   <a:srgbClr val="000000"/>
                 </a:solidFill>
@@ -16606,7 +16707,7 @@
           </a:ln>
           <a:extLst>
             <a:ext uri="{91240B29-F687-4f45-9708-019B960494DF}">
-              <a14:hiddenLine xmlns:a14="http://schemas.microsoft.com/office/drawing/2010/main" xmlns="" w="9525">
+              <a14:hiddenLine xmlns="" xmlns:a14="http://schemas.microsoft.com/office/drawing/2010/main" w="9525">
                 <a:solidFill>
                   <a:srgbClr val="000000"/>
                 </a:solidFill>
@@ -16766,7 +16867,7 @@
           <a:graphicData uri="http://schemas.openxmlformats.org/presentationml/2006/ole">
             <mc:AlternateContent xmlns:mc="http://schemas.openxmlformats.org/markup-compatibility/2006">
               <mc:Choice xmlns:v="urn:schemas-microsoft-com:vml" Requires="v">
-                <p:oleObj spid="_x0000_s28821" name="think-cell Slide" r:id="rId7" imgW="38100" imgH="38100" progId="TCLayout.ActiveDocument.1">
+                <p:oleObj spid="_x0000_s28824" name="think-cell Slide" r:id="rId7" imgW="38100" imgH="38100" progId="TCLayout.ActiveDocument.1">
                   <p:embed/>
                 </p:oleObj>
               </mc:Choice>
@@ -16808,14 +16909,14 @@
                       </a:ln>
                       <a:extLst>
                         <a:ext uri="{909E8E84-426E-40dd-AFC4-6F175D3DCCD1}">
-                          <a14:hiddenFill xmlns:a14="http://schemas.microsoft.com/office/drawing/2010/main" xmlns="">
+                          <a14:hiddenFill xmlns="" xmlns:a14="http://schemas.microsoft.com/office/drawing/2010/main">
                             <a:solidFill>
                               <a:srgbClr val="FFFFFF"/>
                             </a:solidFill>
                           </a14:hiddenFill>
                         </a:ext>
                         <a:ext uri="{91240B29-F687-4f45-9708-019B960494DF}">
-                          <a14:hiddenLine xmlns:a14="http://schemas.microsoft.com/office/drawing/2010/main" xmlns="" w="9525">
+                          <a14:hiddenLine xmlns="" xmlns:a14="http://schemas.microsoft.com/office/drawing/2010/main" w="9525">
                             <a:solidFill>
                               <a:srgbClr val="000000"/>
                             </a:solidFill>
@@ -17298,14 +17399,14 @@
           </a:ln>
           <a:extLst>
             <a:ext uri="{909E8E84-426E-40dd-AFC4-6F175D3DCCD1}">
-              <a14:hiddenFill xmlns:a14="http://schemas.microsoft.com/office/drawing/2010/main" xmlns="">
+              <a14:hiddenFill xmlns="" xmlns:a14="http://schemas.microsoft.com/office/drawing/2010/main">
                 <a:solidFill>
                   <a:srgbClr val="FFFFFF"/>
                 </a:solidFill>
               </a14:hiddenFill>
             </a:ext>
             <a:ext uri="{91240B29-F687-4f45-9708-019B960494DF}">
-              <a14:hiddenLine xmlns:a14="http://schemas.microsoft.com/office/drawing/2010/main" xmlns="" w="9525">
+              <a14:hiddenLine xmlns="" xmlns:a14="http://schemas.microsoft.com/office/drawing/2010/main" w="9525">
                 <a:solidFill>
                   <a:srgbClr val="000000"/>
                 </a:solidFill>
@@ -17510,14 +17611,14 @@
           </a:ln>
           <a:extLst>
             <a:ext uri="{909E8E84-426E-40dd-AFC4-6F175D3DCCD1}">
-              <a14:hiddenFill xmlns:a14="http://schemas.microsoft.com/office/drawing/2010/main" xmlns="">
+              <a14:hiddenFill xmlns="" xmlns:a14="http://schemas.microsoft.com/office/drawing/2010/main">
                 <a:solidFill>
                   <a:srgbClr val="FFFFFF"/>
                 </a:solidFill>
               </a14:hiddenFill>
             </a:ext>
             <a:ext uri="{91240B29-F687-4f45-9708-019B960494DF}">
-              <a14:hiddenLine xmlns:a14="http://schemas.microsoft.com/office/drawing/2010/main" xmlns="" w="9525">
+              <a14:hiddenLine xmlns="" xmlns:a14="http://schemas.microsoft.com/office/drawing/2010/main" w="9525">
                 <a:solidFill>
                   <a:srgbClr val="000000"/>
                 </a:solidFill>
@@ -20625,14 +20726,14 @@
           </a:ln>
           <a:extLst>
             <a:ext uri="{909E8E84-426E-40dd-AFC4-6F175D3DCCD1}">
-              <a14:hiddenFill xmlns:a14="http://schemas.microsoft.com/office/drawing/2010/main" xmlns="">
+              <a14:hiddenFill xmlns="" xmlns:a14="http://schemas.microsoft.com/office/drawing/2010/main">
                 <a:solidFill>
                   <a:srgbClr val="FFFFFF"/>
                 </a:solidFill>
               </a14:hiddenFill>
             </a:ext>
             <a:ext uri="{91240B29-F687-4f45-9708-019B960494DF}">
-              <a14:hiddenLine xmlns:a14="http://schemas.microsoft.com/office/drawing/2010/main" xmlns="" w="9525">
+              <a14:hiddenLine xmlns="" xmlns:a14="http://schemas.microsoft.com/office/drawing/2010/main" w="9525">
                 <a:solidFill>
                   <a:srgbClr val="000000"/>
                 </a:solidFill>
@@ -21327,7 +21428,7 @@
           </a:xfrm>
           <a:extLst>
             <a:ext uri="{91240B29-F687-4f45-9708-019B960494DF}">
-              <a14:hiddenLine xmlns:a14="http://schemas.microsoft.com/office/drawing/2010/main" xmlns="" w="9525">
+              <a14:hiddenLine xmlns="" xmlns:a14="http://schemas.microsoft.com/office/drawing/2010/main" w="9525">
                 <a:solidFill>
                   <a:srgbClr val="000000"/>
                 </a:solidFill>
@@ -21430,14 +21531,14 @@
           <a:noFill/>
           <a:extLst>
             <a:ext uri="{909E8E84-426E-40dd-AFC4-6F175D3DCCD1}">
-              <a14:hiddenFill xmlns:a14="http://schemas.microsoft.com/office/drawing/2010/main" xmlns="">
+              <a14:hiddenFill xmlns="" xmlns:a14="http://schemas.microsoft.com/office/drawing/2010/main">
                 <a:solidFill>
                   <a:srgbClr val="FFFFFF"/>
                 </a:solidFill>
               </a14:hiddenFill>
             </a:ext>
             <a:ext uri="{91240B29-F687-4f45-9708-019B960494DF}">
-              <a14:hiddenLine xmlns:a14="http://schemas.microsoft.com/office/drawing/2010/main" xmlns="" w="9525">
+              <a14:hiddenLine xmlns="" xmlns:a14="http://schemas.microsoft.com/office/drawing/2010/main" w="9525">
                 <a:solidFill>
                   <a:srgbClr val="000000"/>
                 </a:solidFill>
@@ -21447,7 +21548,7 @@
               </a14:hiddenLine>
             </a:ext>
             <a:ext uri="{FAA26D3D-D897-4be2-8F04-BA451C77F1D7}">
-              <ma14:placeholderFlag xmlns:ma14="http://schemas.microsoft.com/office/mac/drawingml/2011/main" xmlns="" val="1"/>
+              <ma14:placeholderFlag xmlns="" xmlns:ma14="http://schemas.microsoft.com/office/mac/drawingml/2011/main" val="1"/>
             </a:ext>
           </a:extLst>
         </p:spPr>
@@ -21505,14 +21606,14 @@
           <a:noFill/>
           <a:extLst>
             <a:ext uri="{909E8E84-426E-40dd-AFC4-6F175D3DCCD1}">
-              <a14:hiddenFill xmlns:a14="http://schemas.microsoft.com/office/drawing/2010/main" xmlns="">
+              <a14:hiddenFill xmlns="" xmlns:a14="http://schemas.microsoft.com/office/drawing/2010/main">
                 <a:solidFill>
                   <a:srgbClr val="FFFFFF"/>
                 </a:solidFill>
               </a14:hiddenFill>
             </a:ext>
             <a:ext uri="{91240B29-F687-4f45-9708-019B960494DF}">
-              <a14:hiddenLine xmlns:a14="http://schemas.microsoft.com/office/drawing/2010/main" xmlns="" w="9525">
+              <a14:hiddenLine xmlns="" xmlns:a14="http://schemas.microsoft.com/office/drawing/2010/main" w="9525">
                 <a:solidFill>
                   <a:srgbClr val="000000"/>
                 </a:solidFill>
@@ -21584,7 +21685,7 @@
           <a:effectLst/>
           <a:extLst>
             <a:ext uri="{AF507438-7753-43e0-B8FC-AC1667EBCBE1}">
-              <a14:hiddenEffects xmlns:a14="http://schemas.microsoft.com/office/drawing/2010/main" xmlns="">
+              <a14:hiddenEffects xmlns="" xmlns:a14="http://schemas.microsoft.com/office/drawing/2010/main">
                 <a:effectLst>
                   <a:outerShdw blurRad="63500" dist="38099" dir="2700000" algn="ctr" rotWithShape="0">
                     <a:schemeClr val="bg2">
@@ -21641,14 +21742,14 @@
           <a:noFill/>
           <a:extLst>
             <a:ext uri="{909E8E84-426E-40dd-AFC4-6F175D3DCCD1}">
-              <a14:hiddenFill xmlns:a14="http://schemas.microsoft.com/office/drawing/2010/main" xmlns="">
+              <a14:hiddenFill xmlns="" xmlns:a14="http://schemas.microsoft.com/office/drawing/2010/main">
                 <a:solidFill>
                   <a:srgbClr val="FFFFFF"/>
                 </a:solidFill>
               </a14:hiddenFill>
             </a:ext>
             <a:ext uri="{91240B29-F687-4f45-9708-019B960494DF}">
-              <a14:hiddenLine xmlns:a14="http://schemas.microsoft.com/office/drawing/2010/main" xmlns="" w="9525">
+              <a14:hiddenLine xmlns="" xmlns:a14="http://schemas.microsoft.com/office/drawing/2010/main" w="9525">
                 <a:solidFill>
                   <a:srgbClr val="000000"/>
                 </a:solidFill>
@@ -21701,14 +21802,14 @@
           <a:noFill/>
           <a:extLst>
             <a:ext uri="{909E8E84-426E-40dd-AFC4-6F175D3DCCD1}">
-              <a14:hiddenFill xmlns:a14="http://schemas.microsoft.com/office/drawing/2010/main" xmlns="">
+              <a14:hiddenFill xmlns="" xmlns:a14="http://schemas.microsoft.com/office/drawing/2010/main">
                 <a:solidFill>
                   <a:srgbClr val="FFFFFF"/>
                 </a:solidFill>
               </a14:hiddenFill>
             </a:ext>
             <a:ext uri="{91240B29-F687-4f45-9708-019B960494DF}">
-              <a14:hiddenLine xmlns:a14="http://schemas.microsoft.com/office/drawing/2010/main" xmlns="" w="9525">
+              <a14:hiddenLine xmlns="" xmlns:a14="http://schemas.microsoft.com/office/drawing/2010/main" w="9525">
                 <a:solidFill>
                   <a:srgbClr val="000000"/>
                 </a:solidFill>
@@ -21886,15 +21987,7 @@
                 <a:ea typeface="ヒラギノ角ゴ ProN W3" charset="0"/>
                 <a:cs typeface="Source Sans Pro Light" charset="0"/>
               </a:rPr>
-              <a:t>a Web </a:t>
-            </a:r>
-            <a:r>
-              <a:rPr lang="de-CH" smtClean="0">
-                <a:latin typeface="Source Sans Pro Light" charset="0"/>
-                <a:ea typeface="ヒラギノ角ゴ ProN W3" charset="0"/>
-                <a:cs typeface="Source Sans Pro Light" charset="0"/>
-              </a:rPr>
-              <a:t>Application</a:t>
+              <a:t>a Web Application</a:t>
             </a:r>
             <a:endParaRPr lang="de-CH">
               <a:latin typeface="Source Sans Pro Light" charset="0"/>
@@ -22005,14 +22098,14 @@
           <a:noFill/>
           <a:extLst>
             <a:ext uri="{909E8E84-426E-40dd-AFC4-6F175D3DCCD1}">
-              <a14:hiddenFill xmlns:a14="http://schemas.microsoft.com/office/drawing/2010/main" xmlns="">
+              <a14:hiddenFill xmlns="" xmlns:a14="http://schemas.microsoft.com/office/drawing/2010/main">
                 <a:solidFill>
                   <a:srgbClr val="FFFFFF"/>
                 </a:solidFill>
               </a14:hiddenFill>
             </a:ext>
             <a:ext uri="{91240B29-F687-4f45-9708-019B960494DF}">
-              <a14:hiddenLine xmlns:a14="http://schemas.microsoft.com/office/drawing/2010/main" xmlns="" w="9525">
+              <a14:hiddenLine xmlns="" xmlns:a14="http://schemas.microsoft.com/office/drawing/2010/main" w="9525">
                 <a:solidFill>
                   <a:srgbClr val="000000"/>
                 </a:solidFill>
@@ -22022,7 +22115,7 @@
               </a14:hiddenLine>
             </a:ext>
             <a:ext uri="{FAA26D3D-D897-4be2-8F04-BA451C77F1D7}">
-              <ma14:placeholderFlag xmlns:ma14="http://schemas.microsoft.com/office/mac/drawingml/2011/main" xmlns="" val="1"/>
+              <ma14:placeholderFlag xmlns="" xmlns:ma14="http://schemas.microsoft.com/office/mac/drawingml/2011/main" val="1"/>
             </a:ext>
           </a:extLst>
         </p:spPr>
@@ -22112,14 +22205,14 @@
           <a:noFill/>
           <a:extLst>
             <a:ext uri="{909E8E84-426E-40dd-AFC4-6F175D3DCCD1}">
-              <a14:hiddenFill xmlns:a14="http://schemas.microsoft.com/office/drawing/2010/main" xmlns="">
+              <a14:hiddenFill xmlns="" xmlns:a14="http://schemas.microsoft.com/office/drawing/2010/main">
                 <a:solidFill>
                   <a:srgbClr val="FFFFFF"/>
                 </a:solidFill>
               </a14:hiddenFill>
             </a:ext>
             <a:ext uri="{91240B29-F687-4f45-9708-019B960494DF}">
-              <a14:hiddenLine xmlns:a14="http://schemas.microsoft.com/office/drawing/2010/main" xmlns="" w="9525">
+              <a14:hiddenLine xmlns="" xmlns:a14="http://schemas.microsoft.com/office/drawing/2010/main" w="9525">
                 <a:solidFill>
                   <a:srgbClr val="000000"/>
                 </a:solidFill>
@@ -22172,14 +22265,14 @@
           <a:noFill/>
           <a:extLst>
             <a:ext uri="{909E8E84-426E-40dd-AFC4-6F175D3DCCD1}">
-              <a14:hiddenFill xmlns:a14="http://schemas.microsoft.com/office/drawing/2010/main" xmlns="">
+              <a14:hiddenFill xmlns="" xmlns:a14="http://schemas.microsoft.com/office/drawing/2010/main">
                 <a:solidFill>
                   <a:srgbClr val="FFFFFF"/>
                 </a:solidFill>
               </a14:hiddenFill>
             </a:ext>
             <a:ext uri="{91240B29-F687-4f45-9708-019B960494DF}">
-              <a14:hiddenLine xmlns:a14="http://schemas.microsoft.com/office/drawing/2010/main" xmlns="" w="9525">
+              <a14:hiddenLine xmlns="" xmlns:a14="http://schemas.microsoft.com/office/drawing/2010/main" w="9525">
                 <a:solidFill>
                   <a:srgbClr val="000000"/>
                 </a:solidFill>
@@ -22224,15 +22317,7 @@
                 <a:ea typeface="ヒラギノ角ゴ ProN W3" charset="0"/>
                 <a:cs typeface="Source Sans Pro Light" charset="0"/>
               </a:rPr>
-              <a:t>: </a:t>
-            </a:r>
-            <a:r>
-              <a:rPr lang="en-US" smtClean="0">
-                <a:latin typeface="Source Sans Pro Light" charset="0"/>
-                <a:ea typeface="ヒラギノ角ゴ ProN W3" charset="0"/>
-                <a:cs typeface="Source Sans Pro Light" charset="0"/>
-              </a:rPr>
-              <a:t>Design an AI-powered </a:t>
+              <a:t>: Design an AI-powered </a:t>
             </a:r>
             <a:r>
               <a:rPr lang="en-US">
@@ -22280,15 +22365,7 @@
                 <a:ea typeface="ヒラギノ角ゴ ProN W3" charset="0"/>
                 <a:cs typeface="Source Sans Pro Light" charset="0"/>
               </a:rPr>
-              <a:t>social media</a:t>
-            </a:r>
-            <a:r>
-              <a:rPr lang="en-US" smtClean="0">
-                <a:latin typeface="Source Sans Pro Light" charset="0"/>
-                <a:ea typeface="ヒラギノ角ゴ ProN W3" charset="0"/>
-                <a:cs typeface="Source Sans Pro Light" charset="0"/>
-              </a:rPr>
-              <a:t>: </a:t>
+              <a:t>social media: </a:t>
             </a:r>
             <a:r>
               <a:rPr lang="en-US" smtClean="0">
@@ -22330,15 +22407,7 @@
                 <a:ea typeface="ヒラギノ角ゴ ProN W3" charset="0"/>
                 <a:cs typeface="Source Sans Pro Light" charset="0"/>
               </a:rPr>
-              <a:t>: </a:t>
-            </a:r>
-            <a:r>
-              <a:rPr lang="en-US" smtClean="0">
-                <a:latin typeface="Source Sans Pro Light" charset="0"/>
-                <a:ea typeface="ヒラギノ角ゴ ProN W3" charset="0"/>
-                <a:cs typeface="Source Sans Pro Light" charset="0"/>
-              </a:rPr>
-              <a:t>Develop </a:t>
+              <a:t>: Develop </a:t>
             </a:r>
             <a:r>
               <a:rPr lang="en-US">
@@ -22479,14 +22548,7 @@
                 <a:latin typeface="Source Sans Pro Light" charset="0"/>
                 <a:cs typeface="Source Sans Pro Light" charset="0"/>
               </a:rPr>
-              <a:t>classification of official + unofficial Instagram brand profile images </a:t>
-            </a:r>
-            <a:r>
-              <a:rPr lang="de-CH">
-                <a:latin typeface="Source Sans Pro Light" charset="0"/>
-                <a:cs typeface="Source Sans Pro Light" charset="0"/>
-              </a:rPr>
-              <a:t>into </a:t>
+              <a:t>classification of official + unofficial Instagram brand profile images into </a:t>
             </a:r>
             <a:r>
               <a:rPr lang="de-CH" smtClean="0">
@@ -22500,14 +22562,7 @@
                 <a:latin typeface="Source Sans Pro Light" charset="0"/>
                 <a:cs typeface="Source Sans Pro Light" charset="0"/>
               </a:rPr>
-              <a:t>brand </a:t>
-            </a:r>
-            <a:r>
-              <a:rPr lang="de-CH">
-                <a:latin typeface="Source Sans Pro Light" charset="0"/>
-                <a:cs typeface="Source Sans Pro Light" charset="0"/>
-              </a:rPr>
-              <a:t>personality </a:t>
+              <a:t>brand personality </a:t>
             </a:r>
             <a:r>
               <a:rPr lang="de-CH" smtClean="0">
@@ -22737,7 +22792,7 @@
           <a:blip r:embed="rId23">
             <a:extLst>
               <a:ext uri="{96DAC541-7B7A-43D3-8B79-37D633B846F1}">
-                <asvg:svgBlip xmlns="" xmlns:asvg="http://schemas.microsoft.com/office/drawing/2016/SVG/main" r:embed="rId24"/>
+                <asvg:svgBlip xmlns:asvg="http://schemas.microsoft.com/office/drawing/2016/SVG/main" xmlns="" r:embed="rId24"/>
               </a:ext>
             </a:extLst>
           </a:blip>
@@ -22773,7 +22828,7 @@
           <a:blip r:embed="rId23">
             <a:extLst>
               <a:ext uri="{96DAC541-7B7A-43D3-8B79-37D633B846F1}">
-                <asvg:svgBlip xmlns="" xmlns:asvg="http://schemas.microsoft.com/office/drawing/2016/SVG/main" r:embed="rId24"/>
+                <asvg:svgBlip xmlns:asvg="http://schemas.microsoft.com/office/drawing/2016/SVG/main" xmlns="" r:embed="rId24"/>
               </a:ext>
             </a:extLst>
           </a:blip>
@@ -22809,7 +22864,7 @@
           <a:blip r:embed="rId25">
             <a:extLst>
               <a:ext uri="{96DAC541-7B7A-43D3-8B79-37D633B846F1}">
-                <asvg:svgBlip xmlns="" xmlns:asvg="http://schemas.microsoft.com/office/drawing/2016/SVG/main" r:embed="rId26"/>
+                <asvg:svgBlip xmlns:asvg="http://schemas.microsoft.com/office/drawing/2016/SVG/main" xmlns="" r:embed="rId26"/>
               </a:ext>
             </a:extLst>
           </a:blip>
@@ -22845,7 +22900,7 @@
           <a:blip r:embed="rId27">
             <a:extLst>
               <a:ext uri="{96DAC541-7B7A-43D3-8B79-37D633B846F1}">
-                <asvg:svgBlip xmlns="" xmlns:asvg="http://schemas.microsoft.com/office/drawing/2016/SVG/main" r:embed="rId28"/>
+                <asvg:svgBlip xmlns:asvg="http://schemas.microsoft.com/office/drawing/2016/SVG/main" xmlns="" r:embed="rId28"/>
               </a:ext>
             </a:extLst>
           </a:blip>
@@ -22881,7 +22936,7 @@
           <a:blip r:embed="rId29">
             <a:extLst>
               <a:ext uri="{96DAC541-7B7A-43D3-8B79-37D633B846F1}">
-                <asvg:svgBlip xmlns="" xmlns:asvg="http://schemas.microsoft.com/office/drawing/2016/SVG/main" r:embed="rId30"/>
+                <asvg:svgBlip xmlns:asvg="http://schemas.microsoft.com/office/drawing/2016/SVG/main" xmlns="" r:embed="rId30"/>
               </a:ext>
             </a:extLst>
           </a:blip>
@@ -22917,7 +22972,7 @@
           <a:blip r:embed="rId31">
             <a:extLst>
               <a:ext uri="{96DAC541-7B7A-43D3-8B79-37D633B846F1}">
-                <asvg:svgBlip xmlns="" xmlns:asvg="http://schemas.microsoft.com/office/drawing/2016/SVG/main" r:embed="rId32"/>
+                <asvg:svgBlip xmlns:asvg="http://schemas.microsoft.com/office/drawing/2016/SVG/main" xmlns="" r:embed="rId32"/>
               </a:ext>
             </a:extLst>
           </a:blip>
@@ -22972,7 +23027,7 @@
           <a:effectLst/>
           <a:extLst>
             <a:ext uri="{AF507438-7753-43e0-B8FC-AC1667EBCBE1}">
-              <a14:hiddenEffects xmlns:a14="http://schemas.microsoft.com/office/drawing/2010/main" xmlns="">
+              <a14:hiddenEffects xmlns="" xmlns:a14="http://schemas.microsoft.com/office/drawing/2010/main">
                 <a:effectLst>
                   <a:outerShdw blurRad="63500" dist="38099" dir="2700000" algn="ctr" rotWithShape="0">
                     <a:schemeClr val="bg2">
@@ -23132,7 +23187,7 @@
           <a:effectLst/>
           <a:extLst>
             <a:ext uri="{AF507438-7753-43e0-B8FC-AC1667EBCBE1}">
-              <a14:hiddenEffects xmlns:a14="http://schemas.microsoft.com/office/drawing/2010/main" xmlns="">
+              <a14:hiddenEffects xmlns="" xmlns:a14="http://schemas.microsoft.com/office/drawing/2010/main">
                 <a:effectLst>
                   <a:outerShdw blurRad="63500" dist="38099" dir="2700000" algn="ctr" rotWithShape="0">
                     <a:schemeClr val="bg2">
@@ -23224,7 +23279,7 @@
           <a:effectLst/>
           <a:extLst>
             <a:ext uri="{AF507438-7753-43e0-B8FC-AC1667EBCBE1}">
-              <a14:hiddenEffects xmlns:a14="http://schemas.microsoft.com/office/drawing/2010/main" xmlns="">
+              <a14:hiddenEffects xmlns="" xmlns:a14="http://schemas.microsoft.com/office/drawing/2010/main">
                 <a:effectLst>
                   <a:outerShdw blurRad="63500" dist="38099" dir="2700000" algn="ctr" rotWithShape="0">
                     <a:schemeClr val="bg2">
@@ -23377,7 +23432,7 @@
           <a:blip r:embed="rId33">
             <a:extLst>
               <a:ext uri="{96DAC541-7B7A-43D3-8B79-37D633B846F1}">
-                <asvg:svgBlip xmlns="" xmlns:asvg="http://schemas.microsoft.com/office/drawing/2016/SVG/main" r:embed="rId34"/>
+                <asvg:svgBlip xmlns:asvg="http://schemas.microsoft.com/office/drawing/2016/SVG/main" xmlns="" r:embed="rId34"/>
               </a:ext>
             </a:extLst>
           </a:blip>
@@ -23414,14 +23469,14 @@
           <a:noFill/>
           <a:extLst>
             <a:ext uri="{909E8E84-426E-40dd-AFC4-6F175D3DCCD1}">
-              <a14:hiddenFill xmlns:a14="http://schemas.microsoft.com/office/drawing/2010/main" xmlns="">
+              <a14:hiddenFill xmlns="" xmlns:a14="http://schemas.microsoft.com/office/drawing/2010/main">
                 <a:solidFill>
                   <a:srgbClr val="FFFFFF"/>
                 </a:solidFill>
               </a14:hiddenFill>
             </a:ext>
             <a:ext uri="{91240B29-F687-4f45-9708-019B960494DF}">
-              <a14:hiddenLine xmlns:a14="http://schemas.microsoft.com/office/drawing/2010/main" xmlns="" w="9525">
+              <a14:hiddenLine xmlns="" xmlns:a14="http://schemas.microsoft.com/office/drawing/2010/main" w="9525">
                 <a:solidFill>
                   <a:srgbClr val="000000"/>
                 </a:solidFill>
@@ -23431,7 +23486,7 @@
               </a14:hiddenLine>
             </a:ext>
             <a:ext uri="{FAA26D3D-D897-4be2-8F04-BA451C77F1D7}">
-              <ma14:placeholderFlag xmlns:ma14="http://schemas.microsoft.com/office/mac/drawingml/2011/main" xmlns="" val="1"/>
+              <ma14:placeholderFlag xmlns="" xmlns:ma14="http://schemas.microsoft.com/office/mac/drawingml/2011/main" val="1"/>
             </a:ext>
           </a:extLst>
         </p:spPr>
@@ -24079,14 +24134,14 @@
           <a:noFill/>
           <a:extLst>
             <a:ext uri="{909E8E84-426E-40dd-AFC4-6F175D3DCCD1}">
-              <a14:hiddenFill xmlns:a14="http://schemas.microsoft.com/office/drawing/2010/main" xmlns="">
+              <a14:hiddenFill xmlns="" xmlns:a14="http://schemas.microsoft.com/office/drawing/2010/main">
                 <a:solidFill>
                   <a:srgbClr val="FFFFFF"/>
                 </a:solidFill>
               </a14:hiddenFill>
             </a:ext>
             <a:ext uri="{91240B29-F687-4f45-9708-019B960494DF}">
-              <a14:hiddenLine xmlns:a14="http://schemas.microsoft.com/office/drawing/2010/main" xmlns="" w="9525">
+              <a14:hiddenLine xmlns="" xmlns:a14="http://schemas.microsoft.com/office/drawing/2010/main" w="9525">
                 <a:solidFill>
                   <a:srgbClr val="000000"/>
                 </a:solidFill>
@@ -24124,15 +24179,7 @@
                 <a:ea typeface="ヒラギノ角ゴ ProN W3" charset="0"/>
                 <a:cs typeface="Source Sans Pro Light" charset="0"/>
               </a:rPr>
-              <a:t> of a Brand Management </a:t>
-            </a:r>
-            <a:r>
-              <a:rPr lang="de-CH">
-                <a:latin typeface="Source Sans Pro Light" charset="0"/>
-                <a:ea typeface="ヒラギノ角ゴ ProN W3" charset="0"/>
-                <a:cs typeface="Source Sans Pro Light" charset="0"/>
-              </a:rPr>
-              <a:t>Web </a:t>
+              <a:t> of a Brand Management Web </a:t>
             </a:r>
             <a:r>
               <a:rPr lang="de-CH" smtClean="0">
@@ -24150,11 +24197,6 @@
               </a:rPr>
               <a:t>for Marketing Personnel </a:t>
             </a:r>
-            <a:endParaRPr lang="de-CH">
-              <a:latin typeface="Source Sans Pro Light" charset="0"/>
-              <a:ea typeface="ヒラギノ角ゴ ProN W3" charset="0"/>
-              <a:cs typeface="Source Sans Pro Light" charset="0"/>
-            </a:endParaRPr>
           </a:p>
         </p:txBody>
       </p:sp>
@@ -24208,14 +24250,14 @@
           <a:noFill/>
           <a:extLst>
             <a:ext uri="{909E8E84-426E-40dd-AFC4-6F175D3DCCD1}">
-              <a14:hiddenFill xmlns:a14="http://schemas.microsoft.com/office/drawing/2010/main" xmlns="">
+              <a14:hiddenFill xmlns="" xmlns:a14="http://schemas.microsoft.com/office/drawing/2010/main">
                 <a:solidFill>
                   <a:srgbClr val="FFFFFF"/>
                 </a:solidFill>
               </a14:hiddenFill>
             </a:ext>
             <a:ext uri="{91240B29-F687-4f45-9708-019B960494DF}">
-              <a14:hiddenLine xmlns:a14="http://schemas.microsoft.com/office/drawing/2010/main" xmlns="" w="9525">
+              <a14:hiddenLine xmlns="" xmlns:a14="http://schemas.microsoft.com/office/drawing/2010/main" w="9525">
                 <a:solidFill>
                   <a:srgbClr val="000000"/>
                 </a:solidFill>
@@ -24225,7 +24267,7 @@
               </a14:hiddenLine>
             </a:ext>
             <a:ext uri="{FAA26D3D-D897-4be2-8F04-BA451C77F1D7}">
-              <ma14:placeholderFlag xmlns:ma14="http://schemas.microsoft.com/office/mac/drawingml/2011/main" xmlns="" val="1"/>
+              <ma14:placeholderFlag xmlns="" xmlns:ma14="http://schemas.microsoft.com/office/mac/drawingml/2011/main" val="1"/>
             </a:ext>
           </a:extLst>
         </p:spPr>
@@ -24593,7 +24635,7 @@
                   <a14:useLocalDpi xmlns:a14="http://schemas.microsoft.com/office/drawing/2010/main" val="0"/>
                 </a:ext>
                 <a:ext uri="{96DAC541-7B7A-43D3-8B79-37D633B846F1}">
-                  <asvg:svgBlip xmlns:dgm="http://schemas.openxmlformats.org/drawingml/2006/diagram" xmlns:asvg="http://schemas.microsoft.com/office/drawing/2016/SVG/main" xmlns="" xmlns:lc="http://schemas.openxmlformats.org/drawingml/2006/lockedCanvas" r:embed="rId4"/>
+                  <asvg:svgBlip xmlns:lc="http://schemas.openxmlformats.org/drawingml/2006/lockedCanvas" xmlns="" xmlns:asvg="http://schemas.microsoft.com/office/drawing/2016/SVG/main" xmlns:dgm="http://schemas.openxmlformats.org/drawingml/2006/diagram" r:embed="rId4"/>
                 </a:ext>
               </a:extLst>
             </a:blip>
@@ -24656,7 +24698,7 @@
                   <a14:useLocalDpi xmlns:a14="http://schemas.microsoft.com/office/drawing/2010/main" val="0"/>
                 </a:ext>
                 <a:ext uri="{96DAC541-7B7A-43D3-8B79-37D633B846F1}">
-                  <asvg:svgBlip xmlns:dgm="http://schemas.openxmlformats.org/drawingml/2006/diagram" xmlns:asvg="http://schemas.microsoft.com/office/drawing/2016/SVG/main" xmlns="" xmlns:lc="http://schemas.openxmlformats.org/drawingml/2006/lockedCanvas" r:embed="rId6"/>
+                  <asvg:svgBlip xmlns:lc="http://schemas.openxmlformats.org/drawingml/2006/lockedCanvas" xmlns="" xmlns:asvg="http://schemas.microsoft.com/office/drawing/2016/SVG/main" xmlns:dgm="http://schemas.openxmlformats.org/drawingml/2006/diagram" r:embed="rId6"/>
                 </a:ext>
               </a:extLst>
             </a:blip>
@@ -24719,7 +24761,7 @@
                   <a14:useLocalDpi xmlns:a14="http://schemas.microsoft.com/office/drawing/2010/main" val="0"/>
                 </a:ext>
                 <a:ext uri="{96DAC541-7B7A-43D3-8B79-37D633B846F1}">
-                  <asvg:svgBlip xmlns:dgm="http://schemas.openxmlformats.org/drawingml/2006/diagram" xmlns:asvg="http://schemas.microsoft.com/office/drawing/2016/SVG/main" xmlns="" xmlns:lc="http://schemas.openxmlformats.org/drawingml/2006/lockedCanvas" r:embed="rId8"/>
+                  <asvg:svgBlip xmlns:lc="http://schemas.openxmlformats.org/drawingml/2006/lockedCanvas" xmlns="" xmlns:asvg="http://schemas.microsoft.com/office/drawing/2016/SVG/main" xmlns:dgm="http://schemas.openxmlformats.org/drawingml/2006/diagram" r:embed="rId8"/>
                 </a:ext>
               </a:extLst>
             </a:blip>
@@ -24791,11 +24833,7 @@
             </a:r>
             <a:r>
               <a:rPr lang="de-CH"/>
-              <a:t>understand consumer </a:t>
-            </a:r>
-            <a:r>
-              <a:rPr lang="de-CH"/>
-              <a:t>brand </a:t>
+              <a:t>understand consumer brand </a:t>
             </a:r>
             <a:r>
               <a:rPr lang="de-CH" smtClean="0"/>
@@ -24816,11 +24854,7 @@
             </a:r>
             <a:r>
               <a:rPr lang="de-CH"/>
-              <a:t>Brand </a:t>
-            </a:r>
-            <a:r>
-              <a:rPr lang="de-CH"/>
-              <a:t>positioning </a:t>
+              <a:t>Brand positioning </a:t>
             </a:r>
             <a:r>
               <a:rPr lang="de-CH" smtClean="0"/>
@@ -25097,14 +25131,14 @@
           <a:noFill/>
           <a:extLst>
             <a:ext uri="{909E8E84-426E-40dd-AFC4-6F175D3DCCD1}">
-              <a14:hiddenFill xmlns:a14="http://schemas.microsoft.com/office/drawing/2010/main" xmlns="">
+              <a14:hiddenFill xmlns="" xmlns:a14="http://schemas.microsoft.com/office/drawing/2010/main">
                 <a:solidFill>
                   <a:srgbClr val="FFFFFF"/>
                 </a:solidFill>
               </a14:hiddenFill>
             </a:ext>
             <a:ext uri="{91240B29-F687-4f45-9708-019B960494DF}">
-              <a14:hiddenLine xmlns:a14="http://schemas.microsoft.com/office/drawing/2010/main" xmlns="" w="9525">
+              <a14:hiddenLine xmlns="" xmlns:a14="http://schemas.microsoft.com/office/drawing/2010/main" w="9525">
                 <a:solidFill>
                   <a:srgbClr val="000000"/>
                 </a:solidFill>
@@ -25168,11 +25202,6 @@
               </a:rPr>
               <a:t> Learning Model Architecture</a:t>
             </a:r>
-            <a:endParaRPr lang="de-CH">
-              <a:latin typeface="Source Sans Pro Light" charset="0"/>
-              <a:ea typeface="ヒラギノ角ゴ ProN W3" charset="0"/>
-              <a:cs typeface="Source Sans Pro Light" charset="0"/>
-            </a:endParaRPr>
           </a:p>
         </p:txBody>
       </p:sp>
@@ -25252,15 +25281,7 @@
             </a:pPr>
             <a:r>
               <a:rPr lang="de-CH"/>
-              <a:t>C</a:t>
-            </a:r>
-            <a:r>
-              <a:rPr lang="de-CH"/>
-              <a:t>lassified manually </a:t>
-            </a:r>
-            <a:r>
-              <a:rPr lang="de-CH"/>
-              <a:t>annotated </a:t>
+              <a:t>Classified manually annotated </a:t>
             </a:r>
             <a:r>
               <a:rPr lang="de-CH" smtClean="0"/>
@@ -25272,19 +25293,11 @@
             </a:r>
             <a:r>
               <a:rPr lang="de-CH" smtClean="0"/>
-              <a:t>downloaded from Flickr using Linux-on-Windows </a:t>
-            </a:r>
-            <a:r>
-              <a:rPr lang="de-CH" smtClean="0"/>
-              <a:t>into one of </a:t>
+              <a:t>downloaded from Flickr using Linux-on-Windows into one of </a:t>
             </a:r>
             <a:r>
               <a:rPr lang="de-CH"/>
-              <a:t>the following 4 </a:t>
-            </a:r>
-            <a:r>
-              <a:rPr lang="de-CH"/>
-              <a:t>attributes </a:t>
+              <a:t>the following 4 attributes </a:t>
             </a:r>
             <a:r>
               <a:rPr lang="de-CH" smtClean="0"/>
@@ -25302,7 +25315,6 @@
               <a:rPr lang="de-CH"/>
               <a:t>probability : </a:t>
             </a:r>
-            <a:endParaRPr lang="de-CH"/>
           </a:p>
           <a:p>
             <a:pPr marL="285750" indent="-285750">
@@ -25581,7 +25593,7 @@
           <a:effectLst/>
           <a:extLst>
             <a:ext uri="{AF507438-7753-43e0-B8FC-AC1667EBCBE1}">
-              <a14:hiddenEffects xmlns:a14="http://schemas.microsoft.com/office/drawing/2010/main" xmlns="">
+              <a14:hiddenEffects xmlns="" xmlns:a14="http://schemas.microsoft.com/office/drawing/2010/main">
                 <a:effectLst>
                   <a:outerShdw blurRad="63500" dist="38099" dir="2700000" algn="ctr" rotWithShape="0">
                     <a:schemeClr val="bg2">
@@ -25708,14 +25720,14 @@
           <a:noFill/>
           <a:extLst>
             <a:ext uri="{909E8E84-426E-40dd-AFC4-6F175D3DCCD1}">
-              <a14:hiddenFill xmlns:a14="http://schemas.microsoft.com/office/drawing/2010/main" xmlns="">
+              <a14:hiddenFill xmlns="" xmlns:a14="http://schemas.microsoft.com/office/drawing/2010/main">
                 <a:solidFill>
                   <a:srgbClr val="FFFFFF"/>
                 </a:solidFill>
               </a14:hiddenFill>
             </a:ext>
             <a:ext uri="{91240B29-F687-4f45-9708-019B960494DF}">
-              <a14:hiddenLine xmlns:a14="http://schemas.microsoft.com/office/drawing/2010/main" xmlns="" w="9525">
+              <a14:hiddenLine xmlns="" xmlns:a14="http://schemas.microsoft.com/office/drawing/2010/main" w="9525">
                 <a:solidFill>
                   <a:srgbClr val="000000"/>
                 </a:solidFill>
@@ -25725,7 +25737,7 @@
               </a14:hiddenLine>
             </a:ext>
             <a:ext uri="{FAA26D3D-D897-4be2-8F04-BA451C77F1D7}">
-              <ma14:placeholderFlag xmlns:ma14="http://schemas.microsoft.com/office/mac/drawingml/2011/main" xmlns="" val="1"/>
+              <ma14:placeholderFlag xmlns="" xmlns:ma14="http://schemas.microsoft.com/office/mac/drawingml/2011/main" val="1"/>
             </a:ext>
           </a:extLst>
         </p:spPr>
@@ -26042,14 +26054,14 @@
           <a:noFill/>
           <a:extLst>
             <a:ext uri="{909E8E84-426E-40dd-AFC4-6F175D3DCCD1}">
-              <a14:hiddenFill xmlns:a14="http://schemas.microsoft.com/office/drawing/2010/main" xmlns="">
+              <a14:hiddenFill xmlns="" xmlns:a14="http://schemas.microsoft.com/office/drawing/2010/main">
                 <a:solidFill>
                   <a:srgbClr val="FFFFFF"/>
                 </a:solidFill>
               </a14:hiddenFill>
             </a:ext>
             <a:ext uri="{91240B29-F687-4f45-9708-019B960494DF}">
-              <a14:hiddenLine xmlns:a14="http://schemas.microsoft.com/office/drawing/2010/main" xmlns="" w="9525">
+              <a14:hiddenLine xmlns="" xmlns:a14="http://schemas.microsoft.com/office/drawing/2010/main" w="9525">
                 <a:solidFill>
                   <a:srgbClr val="000000"/>
                 </a:solidFill>
@@ -26169,7 +26181,7 @@
           <a:effectLst/>
           <a:extLst>
             <a:ext uri="{AF507438-7753-43e0-B8FC-AC1667EBCBE1}">
-              <a14:hiddenEffects xmlns:a14="http://schemas.microsoft.com/office/drawing/2010/main" xmlns="">
+              <a14:hiddenEffects xmlns="" xmlns:a14="http://schemas.microsoft.com/office/drawing/2010/main">
                 <a:effectLst>
                   <a:outerShdw blurRad="63500" dist="38099" dir="2700000" algn="ctr" rotWithShape="0">
                     <a:schemeClr val="bg2">
@@ -26322,7 +26334,7 @@
           <a:effectLst/>
           <a:extLst>
             <a:ext uri="{AF507438-7753-43e0-B8FC-AC1667EBCBE1}">
-              <a14:hiddenEffects xmlns:a14="http://schemas.microsoft.com/office/drawing/2010/main" xmlns="">
+              <a14:hiddenEffects xmlns="" xmlns:a14="http://schemas.microsoft.com/office/drawing/2010/main">
                 <a:effectLst>
                   <a:outerShdw blurRad="63500" dist="38099" dir="2700000" algn="ctr" rotWithShape="0">
                     <a:schemeClr val="bg2">
@@ -26413,7 +26425,7 @@
           <a:effectLst/>
           <a:extLst>
             <a:ext uri="{AF507438-7753-43e0-B8FC-AC1667EBCBE1}">
-              <a14:hiddenEffects xmlns:a14="http://schemas.microsoft.com/office/drawing/2010/main" xmlns="">
+              <a14:hiddenEffects xmlns="" xmlns:a14="http://schemas.microsoft.com/office/drawing/2010/main">
                 <a:effectLst>
                   <a:outerShdw blurRad="63500" dist="38099" dir="2700000" algn="ctr" rotWithShape="0">
                     <a:schemeClr val="bg2">
@@ -26504,7 +26516,7 @@
           <a:effectLst/>
           <a:extLst>
             <a:ext uri="{AF507438-7753-43e0-B8FC-AC1667EBCBE1}">
-              <a14:hiddenEffects xmlns:a14="http://schemas.microsoft.com/office/drawing/2010/main" xmlns="">
+              <a14:hiddenEffects xmlns="" xmlns:a14="http://schemas.microsoft.com/office/drawing/2010/main">
                 <a:effectLst>
                   <a:outerShdw blurRad="63500" dist="38099" dir="2700000" algn="ctr" rotWithShape="0">
                     <a:schemeClr val="bg2">
@@ -26595,7 +26607,7 @@
           <a:effectLst/>
           <a:extLst>
             <a:ext uri="{AF507438-7753-43e0-B8FC-AC1667EBCBE1}">
-              <a14:hiddenEffects xmlns:a14="http://schemas.microsoft.com/office/drawing/2010/main" xmlns="">
+              <a14:hiddenEffects xmlns="" xmlns:a14="http://schemas.microsoft.com/office/drawing/2010/main">
                 <a:effectLst>
                   <a:outerShdw blurRad="63500" dist="38099" dir="2700000" algn="ctr" rotWithShape="0">
                     <a:schemeClr val="bg2">
@@ -26686,7 +26698,7 @@
           <a:effectLst/>
           <a:extLst>
             <a:ext uri="{AF507438-7753-43e0-B8FC-AC1667EBCBE1}">
-              <a14:hiddenEffects xmlns:a14="http://schemas.microsoft.com/office/drawing/2010/main" xmlns="">
+              <a14:hiddenEffects xmlns="" xmlns:a14="http://schemas.microsoft.com/office/drawing/2010/main">
                 <a:effectLst>
                   <a:outerShdw blurRad="63500" dist="38099" dir="2700000" algn="ctr" rotWithShape="0">
                     <a:schemeClr val="bg2">
@@ -26778,7 +26790,7 @@
           <a:effectLst/>
           <a:extLst>
             <a:ext uri="{AF507438-7753-43e0-B8FC-AC1667EBCBE1}">
-              <a14:hiddenEffects xmlns:a14="http://schemas.microsoft.com/office/drawing/2010/main" xmlns="">
+              <a14:hiddenEffects xmlns="" xmlns:a14="http://schemas.microsoft.com/office/drawing/2010/main">
                 <a:effectLst>
                   <a:outerShdw blurRad="63500" dist="38099" dir="2700000" algn="ctr" rotWithShape="0">
                     <a:schemeClr val="bg2">
@@ -26929,7 +26941,7 @@
           <a:effectLst/>
           <a:extLst>
             <a:ext uri="{AF507438-7753-43e0-B8FC-AC1667EBCBE1}">
-              <a14:hiddenEffects xmlns:a14="http://schemas.microsoft.com/office/drawing/2010/main" xmlns="">
+              <a14:hiddenEffects xmlns="" xmlns:a14="http://schemas.microsoft.com/office/drawing/2010/main">
                 <a:effectLst>
                   <a:outerShdw blurRad="63500" dist="38099" dir="2700000" algn="ctr" rotWithShape="0">
                     <a:schemeClr val="bg2">
@@ -27020,7 +27032,7 @@
           <a:effectLst/>
           <a:extLst>
             <a:ext uri="{AF507438-7753-43e0-B8FC-AC1667EBCBE1}">
-              <a14:hiddenEffects xmlns:a14="http://schemas.microsoft.com/office/drawing/2010/main" xmlns="">
+              <a14:hiddenEffects xmlns="" xmlns:a14="http://schemas.microsoft.com/office/drawing/2010/main">
                 <a:effectLst>
                   <a:outerShdw blurRad="63500" dist="38099" dir="2700000" algn="ctr" rotWithShape="0">
                     <a:schemeClr val="bg2">
@@ -27107,7 +27119,7 @@
           <a:effectLst/>
           <a:extLst>
             <a:ext uri="{AF507438-7753-43e0-B8FC-AC1667EBCBE1}">
-              <a14:hiddenEffects xmlns:a14="http://schemas.microsoft.com/office/drawing/2010/main" xmlns="">
+              <a14:hiddenEffects xmlns="" xmlns:a14="http://schemas.microsoft.com/office/drawing/2010/main">
                 <a:effectLst>
                   <a:outerShdw blurRad="63500" dist="38099" dir="2700000" algn="ctr" rotWithShape="0">
                     <a:schemeClr val="bg2">
@@ -27196,7 +27208,7 @@
           <a:effectLst/>
           <a:extLst>
             <a:ext uri="{AF507438-7753-43e0-B8FC-AC1667EBCBE1}">
-              <a14:hiddenEffects xmlns:a14="http://schemas.microsoft.com/office/drawing/2010/main" xmlns="">
+              <a14:hiddenEffects xmlns="" xmlns:a14="http://schemas.microsoft.com/office/drawing/2010/main">
                 <a:effectLst>
                   <a:outerShdw blurRad="63500" dist="38099" dir="2700000" algn="ctr" rotWithShape="0">
                     <a:schemeClr val="bg2">
@@ -27244,7 +27256,7 @@
           <a:effectLst/>
           <a:extLst>
             <a:ext uri="{AF507438-7753-43e0-B8FC-AC1667EBCBE1}">
-              <a14:hiddenEffects xmlns:a14="http://schemas.microsoft.com/office/drawing/2010/main" xmlns="">
+              <a14:hiddenEffects xmlns="" xmlns:a14="http://schemas.microsoft.com/office/drawing/2010/main">
                 <a:effectLst>
                   <a:outerShdw blurRad="63500" dist="38099" dir="2700000" algn="ctr" rotWithShape="0">
                     <a:schemeClr val="bg2">
@@ -27295,7 +27307,7 @@
           <a:effectLst/>
           <a:extLst>
             <a:ext uri="{AF507438-7753-43e0-B8FC-AC1667EBCBE1}">
-              <a14:hiddenEffects xmlns:a14="http://schemas.microsoft.com/office/drawing/2010/main" xmlns="">
+              <a14:hiddenEffects xmlns="" xmlns:a14="http://schemas.microsoft.com/office/drawing/2010/main">
                 <a:effectLst>
                   <a:outerShdw blurRad="63500" dist="38099" dir="2700000" algn="ctr" rotWithShape="0">
                     <a:schemeClr val="bg2">
@@ -27345,7 +27357,7 @@
           <a:effectLst/>
           <a:extLst>
             <a:ext uri="{AF507438-7753-43e0-B8FC-AC1667EBCBE1}">
-              <a14:hiddenEffects xmlns:a14="http://schemas.microsoft.com/office/drawing/2010/main" xmlns="">
+              <a14:hiddenEffects xmlns="" xmlns:a14="http://schemas.microsoft.com/office/drawing/2010/main">
                 <a:effectLst>
                   <a:outerShdw blurRad="63500" dist="38099" dir="2700000" algn="ctr" rotWithShape="0">
                     <a:schemeClr val="bg2">
@@ -27395,7 +27407,7 @@
           <a:effectLst/>
           <a:extLst>
             <a:ext uri="{AF507438-7753-43e0-B8FC-AC1667EBCBE1}">
-              <a14:hiddenEffects xmlns:a14="http://schemas.microsoft.com/office/drawing/2010/main" xmlns="">
+              <a14:hiddenEffects xmlns="" xmlns:a14="http://schemas.microsoft.com/office/drawing/2010/main">
                 <a:effectLst>
                   <a:outerShdw blurRad="63500" dist="38099" dir="2700000" algn="ctr" rotWithShape="0">
                     <a:schemeClr val="bg2">
@@ -27446,7 +27458,7 @@
           <a:effectLst/>
           <a:extLst>
             <a:ext uri="{AF507438-7753-43e0-B8FC-AC1667EBCBE1}">
-              <a14:hiddenEffects xmlns:a14="http://schemas.microsoft.com/office/drawing/2010/main" xmlns="">
+              <a14:hiddenEffects xmlns="" xmlns:a14="http://schemas.microsoft.com/office/drawing/2010/main">
                 <a:effectLst>
                   <a:outerShdw blurRad="63500" dist="38099" dir="2700000" algn="ctr" rotWithShape="0">
                     <a:schemeClr val="bg2">
@@ -27497,7 +27509,7 @@
           <a:effectLst/>
           <a:extLst>
             <a:ext uri="{AF507438-7753-43e0-B8FC-AC1667EBCBE1}">
-              <a14:hiddenEffects xmlns:a14="http://schemas.microsoft.com/office/drawing/2010/main" xmlns="">
+              <a14:hiddenEffects xmlns="" xmlns:a14="http://schemas.microsoft.com/office/drawing/2010/main">
                 <a:effectLst>
                   <a:outerShdw blurRad="63500" dist="38099" dir="2700000" algn="ctr" rotWithShape="0">
                     <a:schemeClr val="bg2">
@@ -27545,7 +27557,7 @@
           <a:effectLst/>
           <a:extLst>
             <a:ext uri="{AF507438-7753-43e0-B8FC-AC1667EBCBE1}">
-              <a14:hiddenEffects xmlns:a14="http://schemas.microsoft.com/office/drawing/2010/main" xmlns="">
+              <a14:hiddenEffects xmlns="" xmlns:a14="http://schemas.microsoft.com/office/drawing/2010/main">
                 <a:effectLst>
                   <a:outerShdw blurRad="63500" dist="38099" dir="2700000" algn="ctr" rotWithShape="0">
                     <a:schemeClr val="bg2">
@@ -27632,7 +27644,7 @@
           <a:effectLst/>
           <a:extLst>
             <a:ext uri="{AF507438-7753-43e0-B8FC-AC1667EBCBE1}">
-              <a14:hiddenEffects xmlns:a14="http://schemas.microsoft.com/office/drawing/2010/main" xmlns="">
+              <a14:hiddenEffects xmlns="" xmlns:a14="http://schemas.microsoft.com/office/drawing/2010/main">
                 <a:effectLst>
                   <a:outerShdw blurRad="63500" dist="38099" dir="2700000" algn="ctr" rotWithShape="0">
                     <a:schemeClr val="bg2">
@@ -27721,7 +27733,7 @@
           <a:effectLst/>
           <a:extLst>
             <a:ext uri="{AF507438-7753-43e0-B8FC-AC1667EBCBE1}">
-              <a14:hiddenEffects xmlns:a14="http://schemas.microsoft.com/office/drawing/2010/main" xmlns="">
+              <a14:hiddenEffects xmlns="" xmlns:a14="http://schemas.microsoft.com/office/drawing/2010/main">
                 <a:effectLst>
                   <a:outerShdw blurRad="63500" dist="38099" dir="2700000" algn="ctr" rotWithShape="0">
                     <a:schemeClr val="bg2">
@@ -27843,8 +27855,8 @@
           </a:p>
         </p:txBody>
       </p:sp>
-      <mc:AlternateContent xmlns:mc="http://schemas.openxmlformats.org/markup-compatibility/2006">
-        <mc:Choice xmlns:a14="http://schemas.microsoft.com/office/drawing/2010/main" Requires="a14">
+      <mc:AlternateContent xmlns:mc="http://schemas.openxmlformats.org/markup-compatibility/2006" xmlns:a14="http://schemas.microsoft.com/office/drawing/2010/main">
+        <mc:Choice Requires="a14">
           <p:sp>
             <p:nvSpPr>
               <p:cNvPr id="30" name="Sprechblase: rechteckig mit abgerundeten Ecken 29">
@@ -27934,13 +27946,7 @@
                   <a:rPr lang="de-CH" sz="1200" smtClean="0">
                     <a:latin typeface="+mn-lt"/>
                   </a:rPr>
-                  <a:t>per</a:t>
-                </a:r>
-                <a:r>
-                  <a:rPr lang="de-CH" sz="1200" smtClean="0">
-                    <a:latin typeface="+mn-lt"/>
-                  </a:rPr>
-                  <a:t> </a:t>
+                  <a:t>per </a:t>
                 </a:r>
                 <a:r>
                   <a:rPr lang="de-CH" sz="1200">
@@ -28060,7 +28066,7 @@
             </p:txBody>
           </p:sp>
         </mc:Choice>
-        <mc:Fallback>
+        <mc:Fallback xmlns="">
           <p:sp>
             <p:nvSpPr>
               <p:cNvPr id="30" name="Sprechblase: rechteckig mit abgerundeten Ecken 29">
@@ -28167,7 +28173,7 @@
           <a:effectLst/>
           <a:extLst>
             <a:ext uri="{AF507438-7753-43e0-B8FC-AC1667EBCBE1}">
-              <a14:hiddenEffects xmlns:a14="http://schemas.microsoft.com/office/drawing/2010/main" xmlns="">
+              <a14:hiddenEffects xmlns="" xmlns:a14="http://schemas.microsoft.com/office/drawing/2010/main">
                 <a:effectLst>
                   <a:outerShdw blurRad="63500" dist="38099" dir="2700000" algn="ctr" rotWithShape="0">
                     <a:schemeClr val="bg2">
@@ -28305,14 +28311,14 @@
           <a:noFill/>
           <a:extLst>
             <a:ext uri="{909E8E84-426E-40dd-AFC4-6F175D3DCCD1}">
-              <a14:hiddenFill xmlns:a14="http://schemas.microsoft.com/office/drawing/2010/main" xmlns="">
+              <a14:hiddenFill xmlns="" xmlns:a14="http://schemas.microsoft.com/office/drawing/2010/main">
                 <a:solidFill>
                   <a:srgbClr val="FFFFFF"/>
                 </a:solidFill>
               </a14:hiddenFill>
             </a:ext>
             <a:ext uri="{91240B29-F687-4f45-9708-019B960494DF}">
-              <a14:hiddenLine xmlns:a14="http://schemas.microsoft.com/office/drawing/2010/main" xmlns="" w="9525">
+              <a14:hiddenLine xmlns="" xmlns:a14="http://schemas.microsoft.com/office/drawing/2010/main" w="9525">
                 <a:solidFill>
                   <a:srgbClr val="000000"/>
                 </a:solidFill>
@@ -28322,7 +28328,7 @@
               </a14:hiddenLine>
             </a:ext>
             <a:ext uri="{FAA26D3D-D897-4be2-8F04-BA451C77F1D7}">
-              <ma14:placeholderFlag xmlns:ma14="http://schemas.microsoft.com/office/mac/drawingml/2011/main" xmlns="" val="1"/>
+              <ma14:placeholderFlag xmlns="" xmlns:ma14="http://schemas.microsoft.com/office/mac/drawingml/2011/main" val="1"/>
             </a:ext>
           </a:extLst>
         </p:spPr>
@@ -28417,14 +28423,14 @@
           <a:noFill/>
           <a:extLst>
             <a:ext uri="{909E8E84-426E-40dd-AFC4-6F175D3DCCD1}">
-              <a14:hiddenFill xmlns:a14="http://schemas.microsoft.com/office/drawing/2010/main" xmlns="">
+              <a14:hiddenFill xmlns="" xmlns:a14="http://schemas.microsoft.com/office/drawing/2010/main">
                 <a:solidFill>
                   <a:srgbClr val="FFFFFF"/>
                 </a:solidFill>
               </a14:hiddenFill>
             </a:ext>
             <a:ext uri="{91240B29-F687-4f45-9708-019B960494DF}">
-              <a14:hiddenLine xmlns:a14="http://schemas.microsoft.com/office/drawing/2010/main" xmlns="" w="9525">
+              <a14:hiddenLine xmlns="" xmlns:a14="http://schemas.microsoft.com/office/drawing/2010/main" w="9525">
                 <a:solidFill>
                   <a:srgbClr val="000000"/>
                 </a:solidFill>
@@ -28434,7 +28440,7 @@
               </a14:hiddenLine>
             </a:ext>
             <a:ext uri="{FAA26D3D-D897-4be2-8F04-BA451C77F1D7}">
-              <ma14:placeholderFlag xmlns:ma14="http://schemas.microsoft.com/office/mac/drawingml/2011/main" xmlns="" val="1"/>
+              <ma14:placeholderFlag xmlns="" xmlns:ma14="http://schemas.microsoft.com/office/mac/drawingml/2011/main" val="1"/>
             </a:ext>
           </a:extLst>
         </p:spPr>
@@ -28574,7 +28580,23 @@
             </a:r>
             <a:r>
               <a:rPr lang="de-CH" smtClean="0"/>
-              <a:t>throughput: ameliorated model accuracy (or F1-score) to 91.13% for healthy attribute, but necessitates complexity vs. slimmed-down model design for user-friendliness and fast computing results</a:t>
+              <a:t>throughput: ameliorated model accuracy (or F1-score) to 91.13% for </a:t>
+            </a:r>
+            <a:r>
+              <a:rPr lang="de-CH"/>
+              <a:t>attribute «</a:t>
+            </a:r>
+            <a:r>
+              <a:rPr lang="de-CH"/>
+              <a:t>healthy</a:t>
+            </a:r>
+            <a:r>
+              <a:rPr lang="de-CH" smtClean="0"/>
+              <a:t>», </a:t>
+            </a:r>
+            <a:r>
+              <a:rPr lang="de-CH" smtClean="0"/>
+              <a:t>but necessitates complexity vs. slimmed-down model design for user-friendliness and fast computing results</a:t>
             </a:r>
           </a:p>
           <a:p>
@@ -28587,11 +28609,7 @@
             </a:pPr>
             <a:r>
               <a:rPr lang="de-CH"/>
-              <a:t>Trained Model reiterations: changed approach from one model to OneVsRest models, used different </a:t>
-            </a:r>
-            <a:r>
-              <a:rPr lang="de-CH"/>
-              <a:t>pretrained </a:t>
+              <a:t>Trained Model reiterations: changed approach from one model to OneVsRest models, used different pretrained </a:t>
             </a:r>
             <a:r>
               <a:rPr lang="de-CH" smtClean="0"/>
@@ -28674,14 +28692,14 @@
           <a:noFill/>
           <a:extLst>
             <a:ext uri="{909E8E84-426E-40dd-AFC4-6F175D3DCCD1}">
-              <a14:hiddenFill xmlns:a14="http://schemas.microsoft.com/office/drawing/2010/main" xmlns="">
+              <a14:hiddenFill xmlns="" xmlns:a14="http://schemas.microsoft.com/office/drawing/2010/main">
                 <a:solidFill>
                   <a:srgbClr val="FFFFFF"/>
                 </a:solidFill>
               </a14:hiddenFill>
             </a:ext>
             <a:ext uri="{91240B29-F687-4f45-9708-019B960494DF}">
-              <a14:hiddenLine xmlns:a14="http://schemas.microsoft.com/office/drawing/2010/main" xmlns="" w="9525">
+              <a14:hiddenLine xmlns="" xmlns:a14="http://schemas.microsoft.com/office/drawing/2010/main" w="9525">
                 <a:solidFill>
                   <a:srgbClr val="000000"/>
                 </a:solidFill>
@@ -28691,7 +28709,7 @@
               </a14:hiddenLine>
             </a:ext>
             <a:ext uri="{FAA26D3D-D897-4be2-8F04-BA451C77F1D7}">
-              <ma14:placeholderFlag xmlns:ma14="http://schemas.microsoft.com/office/mac/drawingml/2011/main" xmlns="" val="1"/>
+              <ma14:placeholderFlag xmlns="" xmlns:ma14="http://schemas.microsoft.com/office/mac/drawingml/2011/main" val="1"/>
             </a:ext>
           </a:extLst>
         </p:spPr>
@@ -28781,14 +28799,14 @@
           <a:noFill/>
           <a:extLst>
             <a:ext uri="{909E8E84-426E-40dd-AFC4-6F175D3DCCD1}">
-              <a14:hiddenFill xmlns:a14="http://schemas.microsoft.com/office/drawing/2010/main" xmlns="">
+              <a14:hiddenFill xmlns="" xmlns:a14="http://schemas.microsoft.com/office/drawing/2010/main">
                 <a:solidFill>
                   <a:srgbClr val="FFFFFF"/>
                 </a:solidFill>
               </a14:hiddenFill>
             </a:ext>
             <a:ext uri="{91240B29-F687-4f45-9708-019B960494DF}">
-              <a14:hiddenLine xmlns:a14="http://schemas.microsoft.com/office/drawing/2010/main" xmlns="" w="9525">
+              <a14:hiddenLine xmlns="" xmlns:a14="http://schemas.microsoft.com/office/drawing/2010/main" w="9525">
                 <a:solidFill>
                   <a:srgbClr val="000000"/>
                 </a:solidFill>
@@ -28876,14 +28894,14 @@
           <a:noFill/>
           <a:extLst>
             <a:ext uri="{909E8E84-426E-40dd-AFC4-6F175D3DCCD1}">
-              <a14:hiddenFill xmlns:a14="http://schemas.microsoft.com/office/drawing/2010/main" xmlns="">
+              <a14:hiddenFill xmlns="" xmlns:a14="http://schemas.microsoft.com/office/drawing/2010/main">
                 <a:solidFill>
                   <a:srgbClr val="FFFFFF"/>
                 </a:solidFill>
               </a14:hiddenFill>
             </a:ext>
             <a:ext uri="{91240B29-F687-4f45-9708-019B960494DF}">
-              <a14:hiddenLine xmlns:a14="http://schemas.microsoft.com/office/drawing/2010/main" xmlns="" w="9525">
+              <a14:hiddenLine xmlns="" xmlns:a14="http://schemas.microsoft.com/office/drawing/2010/main" w="9525">
                 <a:solidFill>
                   <a:srgbClr val="000000"/>
                 </a:solidFill>
@@ -29227,7 +29245,7 @@
         <a:effectLst/>
         <a:extLst>
           <a:ext uri="{AF507438-7753-43e0-B8FC-AC1667EBCBE1}">
-            <a14:hiddenEffects xmlns:a14="http://schemas.microsoft.com/office/drawing/2010/main" xmlns="">
+            <a14:hiddenEffects xmlns="" xmlns:a14="http://schemas.microsoft.com/office/drawing/2010/main">
               <a:effectLst>
                 <a:outerShdw blurRad="63500" dist="38099" dir="2700000" algn="ctr" rotWithShape="0">
                   <a:schemeClr val="bg2">
@@ -29305,7 +29323,7 @@
         <a:effectLst/>
         <a:extLst>
           <a:ext uri="{AF507438-7753-43e0-B8FC-AC1667EBCBE1}">
-            <a14:hiddenEffects xmlns:a14="http://schemas.microsoft.com/office/drawing/2010/main" xmlns="">
+            <a14:hiddenEffects xmlns="" xmlns:a14="http://schemas.microsoft.com/office/drawing/2010/main">
               <a:effectLst>
                 <a:outerShdw blurRad="63500" dist="38099" dir="2700000" algn="ctr" rotWithShape="0">
                   <a:schemeClr val="bg2">

</xml_diff>

<commit_message>
Update Visual Listening In_Draft_LS.pptx
</commit_message>
<xml_diff>
--- a/about_me/Visual Listening In_Draft_LS.pptx
+++ b/about_me/Visual Listening In_Draft_LS.pptx
@@ -14609,7 +14609,6 @@
               <a:rPr lang="de-CH" baseline="0" smtClean="0"/>
               <a:t> Image Portrayed on Social Media. </a:t>
             </a:r>
-            <a:endParaRPr lang="de-CH" baseline="0" smtClean="0"/>
           </a:p>
           <a:p>
             <a:r>
@@ -14677,7 +14676,7 @@
                 <a:ea typeface="MS PGothic" panose="020B0600070205080204" pitchFamily="34" charset="-128"/>
                 <a:cs typeface="MS PGothic" charset="0"/>
               </a:rPr>
-              <a:t>Our project</a:t>
+              <a:t>This involves replicating a </a:t>
             </a:r>
             <a:r>
               <a:rPr lang="en-US" sz="1200" kern="1200" baseline="0" smtClean="0">
@@ -14689,7 +14688,19 @@
                 <a:ea typeface="MS PGothic" panose="020B0600070205080204" pitchFamily="34" charset="-128"/>
                 <a:cs typeface="MS PGothic" charset="0"/>
               </a:rPr>
-              <a:t> aims to replicate the study done by </a:t>
+              <a:t>study </a:t>
+            </a:r>
+            <a:r>
+              <a:rPr lang="en-US" sz="1200" kern="1200" baseline="0" smtClean="0">
+                <a:solidFill>
+                  <a:schemeClr val="tx1"/>
+                </a:solidFill>
+                <a:effectLst/>
+                <a:latin typeface="+mn-lt"/>
+                <a:ea typeface="MS PGothic" panose="020B0600070205080204" pitchFamily="34" charset="-128"/>
+                <a:cs typeface="MS PGothic" charset="0"/>
+              </a:rPr>
+              <a:t>done by </a:t>
             </a:r>
             <a:r>
               <a:rPr lang="en-US" sz="1200" kern="1200" smtClean="0">
@@ -14756,11 +14767,7 @@
           <a:p>
             <a:r>
               <a:rPr lang="de-CH" baseline="0" smtClean="0"/>
-              <a:t>Our team members consists of Neeraj, Linda, Theebana and Vincent. </a:t>
-            </a:r>
-            <a:r>
-              <a:rPr lang="de-CH" baseline="0" smtClean="0"/>
-              <a:t>Neeraj formed a deep learning architecture for automating image classification of annotated Flickr images as either being healthy, natural, fun, rugged or not. </a:t>
+              <a:t>Our team members consists of Neeraj, Linda, Theebana and Vincent. Neeraj formed a deep learning architecture for automating image classification of annotated Flickr images as either being healthy, natural, fun, rugged or not. </a:t>
             </a:r>
           </a:p>
           <a:p>
@@ -15316,7 +15323,55 @@
                 <a:ea typeface="ヒラギノ角ゴ ProN W3" charset="0"/>
                 <a:cs typeface="Source Sans Pro Light" charset="0"/>
               </a:rPr>
-              <a:t>Machine Learning</a:t>
+              <a:t>TODO @</a:t>
+            </a:r>
+            <a:r>
+              <a:rPr lang="de-CH" b="1" i="0" baseline="0" smtClean="0">
+                <a:latin typeface="Source Sans Pro Light" charset="0"/>
+                <a:ea typeface="ヒラギノ角ゴ ProN W3" charset="0"/>
+                <a:cs typeface="Source Sans Pro Light" charset="0"/>
+              </a:rPr>
+              <a:t> Neeraj </a:t>
+            </a:r>
+            <a:endParaRPr lang="de-CH" b="1" i="0" smtClean="0">
+              <a:latin typeface="Source Sans Pro Light" charset="0"/>
+              <a:ea typeface="ヒラギノ角ゴ ProN W3" charset="0"/>
+              <a:cs typeface="Source Sans Pro Light" charset="0"/>
+            </a:endParaRPr>
+          </a:p>
+          <a:p>
+            <a:pPr marL="0" marR="0" lvl="0" indent="0" algn="l" defTabSz="455613" rtl="0" eaLnBrk="0" fontAlgn="base" latinLnBrk="0" hangingPunct="0">
+              <a:lnSpc>
+                <a:spcPct val="100000"/>
+              </a:lnSpc>
+              <a:spcBef>
+                <a:spcPct val="30000"/>
+              </a:spcBef>
+              <a:spcAft>
+                <a:spcPct val="0"/>
+              </a:spcAft>
+              <a:buClrTx/>
+              <a:buSzTx/>
+              <a:buFontTx/>
+              <a:buNone/>
+              <a:tabLst/>
+              <a:defRPr/>
+            </a:pPr>
+            <a:r>
+              <a:rPr lang="de-CH" b="1" i="0" smtClean="0">
+                <a:latin typeface="Source Sans Pro Light" charset="0"/>
+                <a:ea typeface="ヒラギノ角ゴ ProN W3" charset="0"/>
+                <a:cs typeface="Source Sans Pro Light" charset="0"/>
+              </a:rPr>
+              <a:t>Machine </a:t>
+            </a:r>
+            <a:r>
+              <a:rPr lang="de-CH" b="1" i="0" smtClean="0">
+                <a:latin typeface="Source Sans Pro Light" charset="0"/>
+                <a:ea typeface="ヒラギノ角ゴ ProN W3" charset="0"/>
+                <a:cs typeface="Source Sans Pro Light" charset="0"/>
+              </a:rPr>
+              <a:t>Learning</a:t>
             </a:r>
             <a:r>
               <a:rPr lang="de-CH" smtClean="0">
@@ -15438,9 +15493,43 @@
           <a:bodyPr/>
           <a:lstStyle/>
           <a:p>
+            <a:pPr marL="0" marR="0" lvl="0" indent="0" algn="l" defTabSz="455613" rtl="0" eaLnBrk="0" fontAlgn="base" latinLnBrk="0" hangingPunct="0">
+              <a:lnSpc>
+                <a:spcPct val="100000"/>
+              </a:lnSpc>
+              <a:spcBef>
+                <a:spcPct val="30000"/>
+              </a:spcBef>
+              <a:spcAft>
+                <a:spcPct val="0"/>
+              </a:spcAft>
+              <a:buClrTx/>
+              <a:buSzTx/>
+              <a:buFontTx/>
+              <a:buNone/>
+              <a:tabLst/>
+              <a:defRPr/>
+            </a:pPr>
+            <a:r>
+              <a:rPr lang="de-CH" smtClean="0"/>
+              <a:t>TODO</a:t>
+            </a:r>
+            <a:r>
+              <a:rPr lang="de-CH" baseline="0" smtClean="0"/>
+              <a:t> </a:t>
+            </a:r>
+          </a:p>
+          <a:p>
+            <a:endParaRPr lang="en-US" smtClean="0"/>
+          </a:p>
+          <a:p>
             <a:r>
               <a:rPr lang="en-US" smtClean="0"/>
-              <a:t>one vs rest approach of multiclass classification, we need to create 4 classifiers one for each attribute.</a:t>
+              <a:t>one </a:t>
+            </a:r>
+            <a:r>
+              <a:rPr lang="en-US" smtClean="0"/>
+              <a:t>vs rest approach of multiclass classification, we need to create 4 classifiers one for each attribute.</a:t>
             </a:r>
             <a:endParaRPr lang="en-US"/>
           </a:p>
@@ -15524,7 +15613,9 @@
         </p:nvSpPr>
         <p:spPr/>
         <p:txBody>
-          <a:bodyPr/>
+          <a:bodyPr>
+            <a:normAutofit lnSpcReduction="10000"/>
+          </a:bodyPr>
           <a:lstStyle/>
           <a:p>
             <a:pPr marL="0" marR="0" lvl="0" indent="0" algn="l" defTabSz="455613" rtl="0" eaLnBrk="0" fontAlgn="base" latinLnBrk="0" hangingPunct="0">
@@ -15546,7 +15637,11 @@
             </a:pPr>
             <a:r>
               <a:rPr lang="de-CH" smtClean="0"/>
-              <a:t>Twitter vs. Pinterest</a:t>
+              <a:t>TODO</a:t>
+            </a:r>
+            <a:r>
+              <a:rPr lang="de-CH" baseline="0" smtClean="0"/>
+              <a:t> </a:t>
             </a:r>
           </a:p>
           <a:p>
@@ -15589,30 +15684,19 @@
             </a:pPr>
             <a:r>
               <a:rPr lang="de-CH" smtClean="0"/>
-              <a:t>12 attributes (calm, cheerful, confident, creative, exciting, fiery, happy, intelligent, natural, reliable, strong, wholesome) </a:t>
-            </a:r>
-          </a:p>
-          <a:p>
-            <a:pPr marL="0" marR="0" lvl="0" indent="0" algn="l" defTabSz="455613" rtl="0" eaLnBrk="0" fontAlgn="base" latinLnBrk="0" hangingPunct="0">
-              <a:lnSpc>
-                <a:spcPct val="100000"/>
-              </a:lnSpc>
-              <a:spcBef>
-                <a:spcPct val="30000"/>
-              </a:spcBef>
-              <a:spcAft>
-                <a:spcPct val="0"/>
-              </a:spcAft>
-              <a:buClrTx/>
-              <a:buSzTx/>
-              <a:buFontTx/>
-              <a:buNone/>
-              <a:tabLst/>
-              <a:defRPr/>
-            </a:pPr>
-            <a:r>
-              <a:rPr lang="en-US" smtClean="0"/>
-              <a:t>This is the reason why **we can only have brands that are listed in this dataframe** and **no other brands**.</a:t>
+              <a:t>Besides Flickr and Instagram, we considered getting images from Twitter and</a:t>
+            </a:r>
+            <a:r>
+              <a:rPr lang="de-CH" baseline="0" smtClean="0"/>
+              <a:t> </a:t>
+            </a:r>
+            <a:r>
+              <a:rPr lang="de-CH" smtClean="0"/>
+              <a:t>Pinterest. In our discussion about Twitter and Pinterest, we realized that Pinterest would be the better platform to source images because of the image content they supply</a:t>
+            </a:r>
+            <a:r>
+              <a:rPr lang="de-CH" baseline="0" smtClean="0"/>
+              <a:t> which is much more straightforward and tightyl linked to the keyword searched than on Twitter. Efforts towards getting the Pinterest API were made, but the application is still pending as of now. </a:t>
             </a:r>
             <a:endParaRPr lang="de-CH" smtClean="0"/>
           </a:p>
@@ -15634,10 +15718,6 @@
               <a:tabLst/>
               <a:defRPr/>
             </a:pPr>
-            <a:r>
-              <a:rPr lang="en-US" smtClean="0"/>
-              <a:t>respecting user’s rights when downloading copyrighted content - not using images/videos from Instagram for commercial intent</a:t>
-            </a:r>
             <a:endParaRPr lang="de-CH" smtClean="0"/>
           </a:p>
           <a:p>
@@ -15659,9 +15739,56 @@
               <a:defRPr/>
             </a:pPr>
             <a:r>
-              <a:rPr lang="en-US" smtClean="0"/>
-              <a:t>google app engine it does not give me any errors but when you click on the link it times out and returns a '502 bad gateway' error</a:t>
-            </a:r>
+              <a:rPr lang="de-CH" smtClean="0"/>
+              <a:t>Extending the original brand personality attributes, fun,</a:t>
+            </a:r>
+            <a:r>
+              <a:rPr lang="de-CH" baseline="0" smtClean="0"/>
+              <a:t> healthy, rugged and glamorous to twelve</a:t>
+            </a:r>
+            <a:r>
+              <a:rPr lang="de-CH" smtClean="0"/>
+              <a:t> more attributes were</a:t>
+            </a:r>
+            <a:r>
+              <a:rPr lang="de-CH" baseline="0" smtClean="0"/>
+              <a:t> based on the eight standard brand personality categories found in the marketing literature: </a:t>
+            </a:r>
+            <a:r>
+              <a:rPr lang="de-CH" smtClean="0"/>
+              <a:t> calm</a:t>
+            </a:r>
+            <a:r>
+              <a:rPr lang="de-CH" smtClean="0"/>
+              <a:t>, cheerful, confident, creative, exciting, fiery, happy, intelligent, natural, reliable, strong, </a:t>
+            </a:r>
+            <a:r>
+              <a:rPr lang="de-CH" smtClean="0"/>
+              <a:t>wholesome.</a:t>
+            </a:r>
+            <a:r>
+              <a:rPr lang="de-CH" baseline="0" smtClean="0"/>
+              <a:t> Each of these attributes can be mapped to one category such that one category does not have more than two attributes. In total, we have sixteen attributes up and running. </a:t>
+            </a:r>
+          </a:p>
+          <a:p>
+            <a:pPr marL="0" marR="0" lvl="0" indent="0" algn="l" defTabSz="455613" rtl="0" eaLnBrk="0" fontAlgn="base" latinLnBrk="0" hangingPunct="0">
+              <a:lnSpc>
+                <a:spcPct val="100000"/>
+              </a:lnSpc>
+              <a:spcBef>
+                <a:spcPct val="30000"/>
+              </a:spcBef>
+              <a:spcAft>
+                <a:spcPct val="0"/>
+              </a:spcAft>
+              <a:buClrTx/>
+              <a:buSzTx/>
+              <a:buFontTx/>
+              <a:buNone/>
+              <a:tabLst/>
+              <a:defRPr/>
+            </a:pPr>
             <a:endParaRPr lang="de-CH" smtClean="0"/>
           </a:p>
           <a:p>
@@ -15683,8 +15810,60 @@
               <a:defRPr/>
             </a:pPr>
             <a:r>
-              <a:rPr lang="de-CH" smtClean="0"/>
-              <a:t>prefixed time horizon with tentative considersations about </a:t>
+              <a:rPr lang="en-US" smtClean="0"/>
+              <a:t>Another challenge</a:t>
+            </a:r>
+            <a:r>
+              <a:rPr lang="en-US" baseline="0" smtClean="0"/>
+              <a:t> we faced was video posts on Instagram brand profiles instead of images, 16/18 or 21-year-of-age limit that blocked access to the Instagram posts and the official brand’s Instagram account name that could be anything from sanpellegrino_official to gap_usa. </a:t>
+            </a:r>
+            <a:r>
+              <a:rPr lang="en-US" smtClean="0"/>
+              <a:t>This </a:t>
+            </a:r>
+            <a:r>
+              <a:rPr lang="en-US" smtClean="0"/>
+              <a:t>is the reason why </a:t>
+            </a:r>
+            <a:r>
+              <a:rPr lang="en-US" smtClean="0"/>
+              <a:t>we considered to provide </a:t>
+            </a:r>
+            <a:r>
+              <a:rPr lang="en-US" smtClean="0"/>
+              <a:t>only </a:t>
+            </a:r>
+            <a:r>
+              <a:rPr lang="en-US" smtClean="0"/>
+              <a:t>brands </a:t>
+            </a:r>
+            <a:r>
+              <a:rPr lang="en-US" smtClean="0"/>
+              <a:t>that are listed in </a:t>
+            </a:r>
+            <a:r>
+              <a:rPr lang="en-US" smtClean="0"/>
+              <a:t>a dataframe </a:t>
+            </a:r>
+            <a:r>
+              <a:rPr lang="en-US" smtClean="0"/>
+              <a:t>and </a:t>
+            </a:r>
+            <a:r>
+              <a:rPr lang="en-US" smtClean="0"/>
+              <a:t>no </a:t>
+            </a:r>
+            <a:r>
+              <a:rPr lang="en-US" smtClean="0"/>
+              <a:t>other </a:t>
+            </a:r>
+            <a:r>
+              <a:rPr lang="en-US" smtClean="0"/>
+              <a:t>brands. But finally, we chose to let the user look up the exact Instagram account name</a:t>
+            </a:r>
+            <a:r>
+              <a:rPr lang="en-US" baseline="0" smtClean="0"/>
+              <a:t> of their requested brand by themselves. Only then will the user be able to start a search request on our web tool online. </a:t>
             </a:r>
           </a:p>
           <a:p>
@@ -15705,17 +15884,190 @@
               <a:tabLst/>
               <a:defRPr/>
             </a:pPr>
-            <a:r>
-              <a:rPr lang="de-CH" smtClean="0"/>
-              <a:t>multimedia document embedding – </a:t>
-            </a:r>
+            <a:endParaRPr lang="de-CH" smtClean="0"/>
           </a:p>
           <a:p>
+            <a:pPr marL="0" marR="0" lvl="0" indent="0" algn="l" defTabSz="455613" rtl="0" eaLnBrk="0" fontAlgn="base" latinLnBrk="0" hangingPunct="0">
+              <a:lnSpc>
+                <a:spcPct val="100000"/>
+              </a:lnSpc>
+              <a:spcBef>
+                <a:spcPct val="30000"/>
+              </a:spcBef>
+              <a:spcAft>
+                <a:spcPct val="0"/>
+              </a:spcAft>
+              <a:buClrTx/>
+              <a:buSzTx/>
+              <a:buFontTx/>
+              <a:buNone/>
+              <a:tabLst/>
+              <a:defRPr/>
+            </a:pPr>
+            <a:r>
+              <a:rPr lang="en-US" smtClean="0"/>
+              <a:t>Another issue we need</a:t>
+            </a:r>
+            <a:r>
+              <a:rPr lang="en-US" baseline="0" smtClean="0"/>
+              <a:t> to consider is </a:t>
+            </a:r>
+            <a:r>
+              <a:rPr lang="en-US" smtClean="0"/>
+              <a:t>respecting </a:t>
+            </a:r>
+            <a:r>
+              <a:rPr lang="en-US" smtClean="0"/>
+              <a:t>user’s rights when downloading copyrighted content </a:t>
+            </a:r>
+            <a:r>
+              <a:rPr lang="en-US" smtClean="0"/>
+              <a:t>or </a:t>
+            </a:r>
+            <a:r>
+              <a:rPr lang="en-US" smtClean="0"/>
+              <a:t>not using images/videos from Instagram for commercial </a:t>
+            </a:r>
+            <a:r>
+              <a:rPr lang="en-US" smtClean="0"/>
+              <a:t>intent. Although the web tool is meant for commercial use, the project’s outer make-up will make any real-world</a:t>
+            </a:r>
+            <a:r>
+              <a:rPr lang="en-US" baseline="0" smtClean="0"/>
+              <a:t> commercialization of the final product a less likely probability. </a:t>
+            </a:r>
+            <a:endParaRPr lang="en-US" smtClean="0"/>
+          </a:p>
+          <a:p>
+            <a:pPr marL="0" marR="0" lvl="0" indent="0" algn="l" defTabSz="455613" rtl="0" eaLnBrk="0" fontAlgn="base" latinLnBrk="0" hangingPunct="0">
+              <a:lnSpc>
+                <a:spcPct val="100000"/>
+              </a:lnSpc>
+              <a:spcBef>
+                <a:spcPct val="30000"/>
+              </a:spcBef>
+              <a:spcAft>
+                <a:spcPct val="0"/>
+              </a:spcAft>
+              <a:buClrTx/>
+              <a:buSzTx/>
+              <a:buFontTx/>
+              <a:buNone/>
+              <a:tabLst/>
+              <a:defRPr/>
+            </a:pPr>
+            <a:endParaRPr lang="de-CH" smtClean="0"/>
+          </a:p>
+          <a:p>
+            <a:pPr marL="0" marR="0" lvl="0" indent="0" algn="l" defTabSz="455613" rtl="0" eaLnBrk="0" fontAlgn="base" latinLnBrk="0" hangingPunct="0">
+              <a:lnSpc>
+                <a:spcPct val="100000"/>
+              </a:lnSpc>
+              <a:spcBef>
+                <a:spcPct val="30000"/>
+              </a:spcBef>
+              <a:spcAft>
+                <a:spcPct val="0"/>
+              </a:spcAft>
+              <a:buClrTx/>
+              <a:buSzTx/>
+              <a:buFontTx/>
+              <a:buNone/>
+              <a:tabLst/>
+              <a:defRPr/>
+            </a:pPr>
+            <a:r>
+              <a:rPr lang="en-US" smtClean="0"/>
+              <a:t>The reason we could not deploy the webtool on the Google App Engine is because of a time-out </a:t>
+            </a:r>
+            <a:r>
+              <a:rPr lang="en-US" smtClean="0"/>
+              <a:t>'502 bad gateway' </a:t>
+            </a:r>
+            <a:r>
+              <a:rPr lang="en-US" smtClean="0"/>
+              <a:t>error or a credit card details demand</a:t>
+            </a:r>
+            <a:r>
+              <a:rPr lang="en-US" baseline="0" smtClean="0"/>
+              <a:t> that could not be satisfied due to personal reasons</a:t>
+            </a:r>
+            <a:r>
+              <a:rPr lang="en-US" smtClean="0"/>
+              <a:t>. Also, our model is too large to deploy it on Heroku. </a:t>
+            </a:r>
+          </a:p>
+          <a:p>
+            <a:pPr marL="0" marR="0" lvl="0" indent="0" algn="l" defTabSz="455613" rtl="0" eaLnBrk="0" fontAlgn="base" latinLnBrk="0" hangingPunct="0">
+              <a:lnSpc>
+                <a:spcPct val="100000"/>
+              </a:lnSpc>
+              <a:spcBef>
+                <a:spcPct val="30000"/>
+              </a:spcBef>
+              <a:spcAft>
+                <a:spcPct val="0"/>
+              </a:spcAft>
+              <a:buClrTx/>
+              <a:buSzTx/>
+              <a:buFontTx/>
+              <a:buNone/>
+              <a:tabLst/>
+              <a:defRPr/>
+            </a:pPr>
+            <a:endParaRPr lang="de-CH" smtClean="0"/>
+          </a:p>
+          <a:p>
+            <a:pPr marL="0" marR="0" lvl="0" indent="0" algn="l" defTabSz="455613" rtl="0" eaLnBrk="0" fontAlgn="base" latinLnBrk="0" hangingPunct="0">
+              <a:lnSpc>
+                <a:spcPct val="100000"/>
+              </a:lnSpc>
+              <a:spcBef>
+                <a:spcPct val="30000"/>
+              </a:spcBef>
+              <a:spcAft>
+                <a:spcPct val="0"/>
+              </a:spcAft>
+              <a:buClrTx/>
+              <a:buSzTx/>
+              <a:buFontTx/>
+              <a:buNone/>
+              <a:tabLst/>
+              <a:defRPr/>
+            </a:pPr>
             <a:r>
               <a:rPr lang="de-CH" smtClean="0"/>
-              <a:t>adding images requires databank setup </a:t>
-            </a:r>
-            <a:endParaRPr lang="en-US"/>
+              <a:t>Our preset </a:t>
+            </a:r>
+            <a:r>
+              <a:rPr lang="de-CH" smtClean="0"/>
+              <a:t>time horizon </a:t>
+            </a:r>
+            <a:r>
+              <a:rPr lang="de-CH" smtClean="0"/>
+              <a:t>did</a:t>
+            </a:r>
+            <a:r>
+              <a:rPr lang="de-CH" baseline="0" smtClean="0"/>
+              <a:t> not allow us to follow up on our mock-ups, nevertheless </a:t>
+            </a:r>
+            <a:r>
+              <a:rPr lang="de-CH" smtClean="0"/>
+              <a:t>we tentatively  considered a multimedia </a:t>
+            </a:r>
+            <a:r>
+              <a:rPr lang="de-CH" smtClean="0"/>
+              <a:t>document embedding </a:t>
+            </a:r>
+            <a:r>
+              <a:rPr lang="de-CH" smtClean="0"/>
+              <a:t>for our webtool – showing both official and unofficial Instagram images with</a:t>
+            </a:r>
+            <a:r>
+              <a:rPr lang="de-CH" baseline="0" smtClean="0"/>
+              <a:t> predicted labels on a separete website. But this would have required a databank back-up for which we would not have the time to see it through to the end. Also priority was given to make the deep learning model workflow as good as possible. </a:t>
+            </a:r>
+            <a:endParaRPr lang="de-CH" smtClean="0"/>
           </a:p>
         </p:txBody>
       </p:sp>
@@ -15747,6 +16099,117 @@
     <p:extLst>
       <p:ext uri="{BB962C8B-B14F-4D97-AF65-F5344CB8AC3E}">
         <p14:creationId xmlns:p14="http://schemas.microsoft.com/office/powerpoint/2010/main" val="4262539697"/>
+      </p:ext>
+    </p:extLst>
+  </p:cSld>
+  <p:clrMapOvr>
+    <a:masterClrMapping/>
+  </p:clrMapOvr>
+</p:notes>
+</file>
+
+<file path=ppt/notesSlides/notesSlide8.xml><?xml version="1.0" encoding="utf-8"?>
+<p:notes xmlns:a="http://schemas.openxmlformats.org/drawingml/2006/main" xmlns:r="http://schemas.openxmlformats.org/officeDocument/2006/relationships" xmlns:p="http://schemas.openxmlformats.org/presentationml/2006/main">
+  <p:cSld>
+    <p:spTree>
+      <p:nvGrpSpPr>
+        <p:cNvPr id="1" name=""/>
+        <p:cNvGrpSpPr/>
+        <p:nvPr/>
+      </p:nvGrpSpPr>
+      <p:grpSpPr>
+        <a:xfrm>
+          <a:off x="0" y="0"/>
+          <a:ext cx="0" cy="0"/>
+          <a:chOff x="0" y="0"/>
+          <a:chExt cx="0" cy="0"/>
+        </a:xfrm>
+      </p:grpSpPr>
+      <p:sp>
+        <p:nvSpPr>
+          <p:cNvPr id="2" name="Slide Image Placeholder 1"/>
+          <p:cNvSpPr>
+            <a:spLocks noGrp="1" noRot="1" noChangeAspect="1"/>
+          </p:cNvSpPr>
+          <p:nvPr>
+            <p:ph type="sldImg"/>
+          </p:nvPr>
+        </p:nvSpPr>
+        <p:spPr/>
+      </p:sp>
+      <p:sp>
+        <p:nvSpPr>
+          <p:cNvPr id="3" name="Notes Placeholder 2"/>
+          <p:cNvSpPr>
+            <a:spLocks noGrp="1"/>
+          </p:cNvSpPr>
+          <p:nvPr>
+            <p:ph type="body" idx="1"/>
+          </p:nvPr>
+        </p:nvSpPr>
+        <p:spPr/>
+        <p:txBody>
+          <a:bodyPr/>
+          <a:lstStyle/>
+          <a:p>
+            <a:r>
+              <a:rPr lang="de-CH" smtClean="0"/>
+              <a:t>With</a:t>
+            </a:r>
+            <a:r>
+              <a:rPr lang="de-CH" baseline="0" smtClean="0"/>
+              <a:t> this, we have come to the end of our presentation about the project we have been working on for the last couple of weeks. We have learned a lot about image processing, python and java programming, finding workarounds, web scraping, deep learning models, API management, the Github universe, and web programming. Thank you. </a:t>
+            </a:r>
+          </a:p>
+          <a:p>
+            <a:endParaRPr lang="de-CH" baseline="0" smtClean="0"/>
+          </a:p>
+          <a:p>
+            <a:r>
+              <a:rPr lang="de-CH" baseline="0" smtClean="0"/>
+              <a:t>Should you have questions about our project, please to not hesitate to ask them in the follow-up section. </a:t>
+            </a:r>
+          </a:p>
+          <a:p>
+            <a:endParaRPr lang="de-CH" baseline="0" smtClean="0"/>
+          </a:p>
+          <a:p>
+            <a:r>
+              <a:rPr lang="de-CH" baseline="0" smtClean="0"/>
+              <a:t>Thank you for your attention. </a:t>
+            </a:r>
+            <a:endParaRPr lang="en-US"/>
+          </a:p>
+        </p:txBody>
+      </p:sp>
+      <p:sp>
+        <p:nvSpPr>
+          <p:cNvPr id="4" name="Slide Number Placeholder 3"/>
+          <p:cNvSpPr>
+            <a:spLocks noGrp="1"/>
+          </p:cNvSpPr>
+          <p:nvPr>
+            <p:ph type="sldNum" sz="quarter" idx="10"/>
+          </p:nvPr>
+        </p:nvSpPr>
+        <p:spPr/>
+        <p:txBody>
+          <a:bodyPr/>
+          <a:lstStyle/>
+          <a:p>
+            <a:fld id="{2A9D45BF-071E-7C44-BE90-B011D0240A3E}" type="slidenum">
+              <a:rPr lang="en-US" smtClean="0"/>
+              <a:pPr/>
+              <a:t>8</a:t>
+            </a:fld>
+            <a:endParaRPr lang="en-US"/>
+          </a:p>
+        </p:txBody>
+      </p:sp>
+    </p:spTree>
+    <p:extLst>
+      <p:ext uri="{BB962C8B-B14F-4D97-AF65-F5344CB8AC3E}">
+        <p14:creationId xmlns:p14="http://schemas.microsoft.com/office/powerpoint/2010/main" val="2272279325"/>
       </p:ext>
     </p:extLst>
   </p:cSld>
@@ -16220,7 +16683,7 @@
           </a:ln>
           <a:extLst>
             <a:ext uri="{91240B29-F687-4f45-9708-019B960494DF}">
-              <a14:hiddenLine xmlns:a14="http://schemas.microsoft.com/office/drawing/2010/main" xmlns="" w="9525">
+              <a14:hiddenLine xmlns="" xmlns:a14="http://schemas.microsoft.com/office/drawing/2010/main" w="9525">
                 <a:solidFill>
                   <a:srgbClr val="000000"/>
                 </a:solidFill>
@@ -16380,7 +16843,7 @@
           <a:graphicData uri="http://schemas.openxmlformats.org/presentationml/2006/ole">
             <mc:AlternateContent xmlns:mc="http://schemas.openxmlformats.org/markup-compatibility/2006">
               <mc:Choice xmlns:v="urn:schemas-microsoft-com:vml" Requires="v">
-                <p:oleObj spid="_x0000_s27828" name="think-cell Slide" r:id="rId7" imgW="38100" imgH="38100" progId="TCLayout.ActiveDocument.1">
+                <p:oleObj spid="_x0000_s27836" name="think-cell Slide" r:id="rId7" imgW="38100" imgH="38100" progId="TCLayout.ActiveDocument.1">
                   <p:embed/>
                 </p:oleObj>
               </mc:Choice>
@@ -16422,14 +16885,14 @@
                       </a:ln>
                       <a:extLst>
                         <a:ext uri="{909E8E84-426E-40dd-AFC4-6F175D3DCCD1}">
-                          <a14:hiddenFill xmlns:a14="http://schemas.microsoft.com/office/drawing/2010/main" xmlns="">
+                          <a14:hiddenFill xmlns="" xmlns:a14="http://schemas.microsoft.com/office/drawing/2010/main">
                             <a:solidFill>
                               <a:srgbClr val="FFFFFF"/>
                             </a:solidFill>
                           </a14:hiddenFill>
                         </a:ext>
                         <a:ext uri="{91240B29-F687-4f45-9708-019B960494DF}">
-                          <a14:hiddenLine xmlns:a14="http://schemas.microsoft.com/office/drawing/2010/main" xmlns="" w="9525">
+                          <a14:hiddenLine xmlns="" xmlns:a14="http://schemas.microsoft.com/office/drawing/2010/main" w="9525">
                             <a:solidFill>
                               <a:srgbClr val="000000"/>
                             </a:solidFill>
@@ -16912,14 +17375,14 @@
           </a:ln>
           <a:extLst>
             <a:ext uri="{909E8E84-426E-40dd-AFC4-6F175D3DCCD1}">
-              <a14:hiddenFill xmlns:a14="http://schemas.microsoft.com/office/drawing/2010/main" xmlns="">
+              <a14:hiddenFill xmlns="" xmlns:a14="http://schemas.microsoft.com/office/drawing/2010/main">
                 <a:solidFill>
                   <a:srgbClr val="FFFFFF"/>
                 </a:solidFill>
               </a14:hiddenFill>
             </a:ext>
             <a:ext uri="{91240B29-F687-4f45-9708-019B960494DF}">
-              <a14:hiddenLine xmlns:a14="http://schemas.microsoft.com/office/drawing/2010/main" xmlns="" w="9525">
+              <a14:hiddenLine xmlns="" xmlns:a14="http://schemas.microsoft.com/office/drawing/2010/main" w="9525">
                 <a:solidFill>
                   <a:srgbClr val="000000"/>
                 </a:solidFill>
@@ -17110,7 +17573,7 @@
           </a:ln>
           <a:extLst>
             <a:ext uri="{91240B29-F687-4f45-9708-019B960494DF}">
-              <a14:hiddenLine xmlns:a14="http://schemas.microsoft.com/office/drawing/2010/main" xmlns="" w="9525">
+              <a14:hiddenLine xmlns="" xmlns:a14="http://schemas.microsoft.com/office/drawing/2010/main" w="9525">
                 <a:solidFill>
                   <a:srgbClr val="000000"/>
                 </a:solidFill>
@@ -17270,7 +17733,7 @@
           <a:graphicData uri="http://schemas.openxmlformats.org/presentationml/2006/ole">
             <mc:AlternateContent xmlns:mc="http://schemas.openxmlformats.org/markup-compatibility/2006">
               <mc:Choice xmlns:v="urn:schemas-microsoft-com:vml" Requires="v">
-                <p:oleObj spid="_x0000_s28852" name="think-cell Slide" r:id="rId7" imgW="38100" imgH="38100" progId="TCLayout.ActiveDocument.1">
+                <p:oleObj spid="_x0000_s28860" name="think-cell Slide" r:id="rId7" imgW="38100" imgH="38100" progId="TCLayout.ActiveDocument.1">
                   <p:embed/>
                 </p:oleObj>
               </mc:Choice>
@@ -17312,14 +17775,14 @@
                       </a:ln>
                       <a:extLst>
                         <a:ext uri="{909E8E84-426E-40dd-AFC4-6F175D3DCCD1}">
-                          <a14:hiddenFill xmlns:a14="http://schemas.microsoft.com/office/drawing/2010/main" xmlns="">
+                          <a14:hiddenFill xmlns="" xmlns:a14="http://schemas.microsoft.com/office/drawing/2010/main">
                             <a:solidFill>
                               <a:srgbClr val="FFFFFF"/>
                             </a:solidFill>
                           </a14:hiddenFill>
                         </a:ext>
                         <a:ext uri="{91240B29-F687-4f45-9708-019B960494DF}">
-                          <a14:hiddenLine xmlns:a14="http://schemas.microsoft.com/office/drawing/2010/main" xmlns="" w="9525">
+                          <a14:hiddenLine xmlns="" xmlns:a14="http://schemas.microsoft.com/office/drawing/2010/main" w="9525">
                             <a:solidFill>
                               <a:srgbClr val="000000"/>
                             </a:solidFill>
@@ -17802,14 +18265,14 @@
           </a:ln>
           <a:extLst>
             <a:ext uri="{909E8E84-426E-40dd-AFC4-6F175D3DCCD1}">
-              <a14:hiddenFill xmlns:a14="http://schemas.microsoft.com/office/drawing/2010/main" xmlns="">
+              <a14:hiddenFill xmlns="" xmlns:a14="http://schemas.microsoft.com/office/drawing/2010/main">
                 <a:solidFill>
                   <a:srgbClr val="FFFFFF"/>
                 </a:solidFill>
               </a14:hiddenFill>
             </a:ext>
             <a:ext uri="{91240B29-F687-4f45-9708-019B960494DF}">
-              <a14:hiddenLine xmlns:a14="http://schemas.microsoft.com/office/drawing/2010/main" xmlns="" w="9525">
+              <a14:hiddenLine xmlns="" xmlns:a14="http://schemas.microsoft.com/office/drawing/2010/main" w="9525">
                 <a:solidFill>
                   <a:srgbClr val="000000"/>
                 </a:solidFill>
@@ -18014,14 +18477,14 @@
           </a:ln>
           <a:extLst>
             <a:ext uri="{909E8E84-426E-40dd-AFC4-6F175D3DCCD1}">
-              <a14:hiddenFill xmlns:a14="http://schemas.microsoft.com/office/drawing/2010/main" xmlns="">
+              <a14:hiddenFill xmlns="" xmlns:a14="http://schemas.microsoft.com/office/drawing/2010/main">
                 <a:solidFill>
                   <a:srgbClr val="FFFFFF"/>
                 </a:solidFill>
               </a14:hiddenFill>
             </a:ext>
             <a:ext uri="{91240B29-F687-4f45-9708-019B960494DF}">
-              <a14:hiddenLine xmlns:a14="http://schemas.microsoft.com/office/drawing/2010/main" xmlns="" w="9525">
+              <a14:hiddenLine xmlns="" xmlns:a14="http://schemas.microsoft.com/office/drawing/2010/main" w="9525">
                 <a:solidFill>
                   <a:srgbClr val="000000"/>
                 </a:solidFill>
@@ -21129,14 +21592,14 @@
           </a:ln>
           <a:extLst>
             <a:ext uri="{909E8E84-426E-40dd-AFC4-6F175D3DCCD1}">
-              <a14:hiddenFill xmlns:a14="http://schemas.microsoft.com/office/drawing/2010/main" xmlns="">
+              <a14:hiddenFill xmlns="" xmlns:a14="http://schemas.microsoft.com/office/drawing/2010/main">
                 <a:solidFill>
                   <a:srgbClr val="FFFFFF"/>
                 </a:solidFill>
               </a14:hiddenFill>
             </a:ext>
             <a:ext uri="{91240B29-F687-4f45-9708-019B960494DF}">
-              <a14:hiddenLine xmlns:a14="http://schemas.microsoft.com/office/drawing/2010/main" xmlns="" w="9525">
+              <a14:hiddenLine xmlns="" xmlns:a14="http://schemas.microsoft.com/office/drawing/2010/main" w="9525">
                 <a:solidFill>
                   <a:srgbClr val="000000"/>
                 </a:solidFill>
@@ -21831,7 +22294,7 @@
           </a:xfrm>
           <a:extLst>
             <a:ext uri="{91240B29-F687-4f45-9708-019B960494DF}">
-              <a14:hiddenLine xmlns:a14="http://schemas.microsoft.com/office/drawing/2010/main" xmlns="" w="9525">
+              <a14:hiddenLine xmlns="" xmlns:a14="http://schemas.microsoft.com/office/drawing/2010/main" w="9525">
                 <a:solidFill>
                   <a:srgbClr val="000000"/>
                 </a:solidFill>
@@ -21953,14 +22416,14 @@
           <a:noFill/>
           <a:extLst>
             <a:ext uri="{909E8E84-426E-40dd-AFC4-6F175D3DCCD1}">
-              <a14:hiddenFill xmlns:a14="http://schemas.microsoft.com/office/drawing/2010/main" xmlns="">
+              <a14:hiddenFill xmlns="" xmlns:a14="http://schemas.microsoft.com/office/drawing/2010/main">
                 <a:solidFill>
                   <a:srgbClr val="FFFFFF"/>
                 </a:solidFill>
               </a14:hiddenFill>
             </a:ext>
             <a:ext uri="{91240B29-F687-4f45-9708-019B960494DF}">
-              <a14:hiddenLine xmlns:a14="http://schemas.microsoft.com/office/drawing/2010/main" xmlns="" w="9525">
+              <a14:hiddenLine xmlns="" xmlns:a14="http://schemas.microsoft.com/office/drawing/2010/main" w="9525">
                 <a:solidFill>
                   <a:srgbClr val="000000"/>
                 </a:solidFill>
@@ -21970,7 +22433,7 @@
               </a14:hiddenLine>
             </a:ext>
             <a:ext uri="{FAA26D3D-D897-4be2-8F04-BA451C77F1D7}">
-              <ma14:placeholderFlag xmlns:ma14="http://schemas.microsoft.com/office/mac/drawingml/2011/main" xmlns="" val="1"/>
+              <ma14:placeholderFlag xmlns="" xmlns:ma14="http://schemas.microsoft.com/office/mac/drawingml/2011/main" val="1"/>
             </a:ext>
           </a:extLst>
         </p:spPr>
@@ -22028,14 +22491,14 @@
           <a:noFill/>
           <a:extLst>
             <a:ext uri="{909E8E84-426E-40dd-AFC4-6F175D3DCCD1}">
-              <a14:hiddenFill xmlns:a14="http://schemas.microsoft.com/office/drawing/2010/main" xmlns="">
+              <a14:hiddenFill xmlns="" xmlns:a14="http://schemas.microsoft.com/office/drawing/2010/main">
                 <a:solidFill>
                   <a:srgbClr val="FFFFFF"/>
                 </a:solidFill>
               </a14:hiddenFill>
             </a:ext>
             <a:ext uri="{91240B29-F687-4f45-9708-019B960494DF}">
-              <a14:hiddenLine xmlns:a14="http://schemas.microsoft.com/office/drawing/2010/main" xmlns="" w="9525">
+              <a14:hiddenLine xmlns="" xmlns:a14="http://schemas.microsoft.com/office/drawing/2010/main" w="9525">
                 <a:solidFill>
                   <a:srgbClr val="000000"/>
                 </a:solidFill>
@@ -22099,7 +22562,7 @@
           <a:effectLst/>
           <a:extLst>
             <a:ext uri="{AF507438-7753-43e0-B8FC-AC1667EBCBE1}">
-              <a14:hiddenEffects xmlns:a14="http://schemas.microsoft.com/office/drawing/2010/main" xmlns="">
+              <a14:hiddenEffects xmlns="" xmlns:a14="http://schemas.microsoft.com/office/drawing/2010/main">
                 <a:effectLst>
                   <a:outerShdw blurRad="63500" dist="38099" dir="2700000" algn="ctr" rotWithShape="0">
                     <a:schemeClr val="bg2">
@@ -22181,6 +22644,136 @@
           </a:p>
           <a:p>
             <a:endParaRPr lang="en-US" sz="1200"/>
+          </a:p>
+        </p:txBody>
+      </p:sp>
+      <p:sp>
+        <p:nvSpPr>
+          <p:cNvPr id="4" name="Rectangle 3"/>
+          <p:cNvSpPr/>
+          <p:nvPr/>
+        </p:nvSpPr>
+        <p:spPr>
+          <a:xfrm>
+            <a:off x="10052645" y="0"/>
+            <a:ext cx="4953000" cy="6001643"/>
+          </a:xfrm>
+          <a:prstGeom prst="rect">
+            <a:avLst/>
+          </a:prstGeom>
+          <a:solidFill>
+            <a:srgbClr val="FFD13F"/>
+          </a:solidFill>
+        </p:spPr>
+        <p:txBody>
+          <a:bodyPr>
+            <a:spAutoFit/>
+          </a:bodyPr>
+          <a:lstStyle/>
+          <a:p>
+            <a:r>
+              <a:rPr lang="en-US" sz="1200"/>
+              <a:t>• Please send us your final presentation by Monday, 27/04/2020, 18:00.</a:t>
+            </a:r>
+            <a:br>
+              <a:rPr lang="en-US" sz="1200"/>
+            </a:br>
+            <a:r>
+              <a:rPr lang="en-US" sz="1200"/>
+              <a:t>• We only accept a single PPTX file as attachment.</a:t>
+            </a:r>
+            <a:br>
+              <a:rPr lang="en-US" sz="1200"/>
+            </a:br>
+            <a:r>
+              <a:rPr lang="en-US" sz="1200"/>
+              <a:t>• Add slide notes to EVERY slide of the PPTX file. These slide notes should contain your complete script for your talk</a:t>
+            </a:r>
+            <a:r>
+              <a:rPr lang="en-US" sz="1200"/>
+              <a:t>. </a:t>
+            </a:r>
+            <a:r>
+              <a:rPr lang="en-US" sz="1200"/>
+              <a:t/>
+            </a:r>
+            <a:br>
+              <a:rPr lang="en-US" sz="1200"/>
+            </a:br>
+            <a:r>
+              <a:rPr lang="en-US" sz="1200"/>
+              <a:t>Further, include in this email the following 3 links: </a:t>
+            </a:r>
+            <a:br>
+              <a:rPr lang="en-US" sz="1200"/>
+            </a:br>
+            <a:r>
+              <a:rPr lang="en-US" sz="1200"/>
+              <a:t>• A link to your deployed data product on Google App Engine, Microsoft Azure, Heroku, …</a:t>
+            </a:r>
+            <a:br>
+              <a:rPr lang="en-US" sz="1200"/>
+            </a:br>
+            <a:r>
+              <a:rPr lang="en-US" sz="1200"/>
+              <a:t>• A link to a ZIP file on www.wetransfer.com, which contains all scripts and data of your data product. Please include a detailed step by step tutorial how to install all requirements and how to run the analysis locally. </a:t>
+            </a:r>
+            <a:br>
+              <a:rPr lang="en-US" sz="1200"/>
+            </a:br>
+            <a:r>
+              <a:rPr lang="en-US" sz="1200"/>
+              <a:t>• A link to GitHub where the code for your application can be found. As some datasets might be too large, you can upload/use only a sample for this. Please ensure that your code still runs with this sample. </a:t>
+            </a:r>
+            <a:br>
+              <a:rPr lang="en-US" sz="1200"/>
+            </a:br>
+            <a:r>
+              <a:rPr lang="en-US" sz="1200"/>
+              <a:t/>
+            </a:r>
+            <a:br>
+              <a:rPr lang="en-US" sz="1200"/>
+            </a:br>
+            <a:r>
+              <a:rPr lang="en-US" sz="1200"/>
+              <a:t>After receiving your presentation, we will generate videos based on these files (like the video lectures on deep learning), upload these videos to YouTube (unlisted, thus only people with the link can find them), and send the links to the videos to all seminar participants. If you are curious how your text will sound, you can test it in advance by using the widget on the following homepage: https://cloud.google.com/text-to-speech. Further, we plan on sending the links of the deployed prototypes to all seminar participants.</a:t>
+            </a:r>
+            <a:br>
+              <a:rPr lang="en-US" sz="1200"/>
+            </a:br>
+            <a:r>
+              <a:rPr lang="en-US" sz="1200"/>
+              <a:t/>
+            </a:r>
+            <a:br>
+              <a:rPr lang="en-US" sz="1200"/>
+            </a:br>
+            <a:r>
+              <a:rPr lang="en-US" sz="1200"/>
+              <a:t>Next, we will setup individual video meetings with each group to give us a live demo of their project. Thus, please block the following date/time in your calendar:</a:t>
+            </a:r>
+            <a:br>
+              <a:rPr lang="en-US" sz="1200"/>
+            </a:br>
+            <a:r>
+              <a:rPr lang="en-US" sz="1200"/>
+              <a:t>• Group “Brand Management”: Thursday, 30/04/2020, 11:00</a:t>
+            </a:r>
+            <a:br>
+              <a:rPr lang="en-US" sz="1200"/>
+            </a:br>
+            <a:r>
+              <a:rPr lang="en-US" sz="1200"/>
+              <a:t>• Group “Recommender“: Thursday, 30/04/2020, 13:00</a:t>
+            </a:r>
+            <a:br>
+              <a:rPr lang="en-US" sz="1200"/>
+            </a:br>
+            <a:r>
+              <a:rPr lang="en-US" sz="1200"/>
+              <a:t>• Group “Product Shots”: Thursday, 30/04/2020, 15:00</a:t>
+            </a:r>
           </a:p>
         </p:txBody>
       </p:sp>
@@ -22228,14 +22821,14 @@
           <a:noFill/>
           <a:extLst>
             <a:ext uri="{909E8E84-426E-40dd-AFC4-6F175D3DCCD1}">
-              <a14:hiddenFill xmlns:a14="http://schemas.microsoft.com/office/drawing/2010/main" xmlns="">
+              <a14:hiddenFill xmlns="" xmlns:a14="http://schemas.microsoft.com/office/drawing/2010/main">
                 <a:solidFill>
                   <a:srgbClr val="FFFFFF"/>
                 </a:solidFill>
               </a14:hiddenFill>
             </a:ext>
             <a:ext uri="{91240B29-F687-4f45-9708-019B960494DF}">
-              <a14:hiddenLine xmlns:a14="http://schemas.microsoft.com/office/drawing/2010/main" xmlns="" w="9525">
+              <a14:hiddenLine xmlns="" xmlns:a14="http://schemas.microsoft.com/office/drawing/2010/main" w="9525">
                 <a:solidFill>
                   <a:srgbClr val="000000"/>
                 </a:solidFill>
@@ -22288,14 +22881,14 @@
           <a:noFill/>
           <a:extLst>
             <a:ext uri="{909E8E84-426E-40dd-AFC4-6F175D3DCCD1}">
-              <a14:hiddenFill xmlns:a14="http://schemas.microsoft.com/office/drawing/2010/main" xmlns="">
+              <a14:hiddenFill xmlns="" xmlns:a14="http://schemas.microsoft.com/office/drawing/2010/main">
                 <a:solidFill>
                   <a:srgbClr val="FFFFFF"/>
                 </a:solidFill>
               </a14:hiddenFill>
             </a:ext>
             <a:ext uri="{91240B29-F687-4f45-9708-019B960494DF}">
-              <a14:hiddenLine xmlns:a14="http://schemas.microsoft.com/office/drawing/2010/main" xmlns="" w="9525">
+              <a14:hiddenLine xmlns="" xmlns:a14="http://schemas.microsoft.com/office/drawing/2010/main" w="9525">
                 <a:solidFill>
                   <a:srgbClr val="000000"/>
                 </a:solidFill>
@@ -22584,14 +23177,14 @@
           <a:noFill/>
           <a:extLst>
             <a:ext uri="{909E8E84-426E-40dd-AFC4-6F175D3DCCD1}">
-              <a14:hiddenFill xmlns:a14="http://schemas.microsoft.com/office/drawing/2010/main" xmlns="">
+              <a14:hiddenFill xmlns="" xmlns:a14="http://schemas.microsoft.com/office/drawing/2010/main">
                 <a:solidFill>
                   <a:srgbClr val="FFFFFF"/>
                 </a:solidFill>
               </a14:hiddenFill>
             </a:ext>
             <a:ext uri="{91240B29-F687-4f45-9708-019B960494DF}">
-              <a14:hiddenLine xmlns:a14="http://schemas.microsoft.com/office/drawing/2010/main" xmlns="" w="9525">
+              <a14:hiddenLine xmlns="" xmlns:a14="http://schemas.microsoft.com/office/drawing/2010/main" w="9525">
                 <a:solidFill>
                   <a:srgbClr val="000000"/>
                 </a:solidFill>
@@ -22601,7 +23194,7 @@
               </a14:hiddenLine>
             </a:ext>
             <a:ext uri="{FAA26D3D-D897-4be2-8F04-BA451C77F1D7}">
-              <ma14:placeholderFlag xmlns:ma14="http://schemas.microsoft.com/office/mac/drawingml/2011/main" xmlns="" val="1"/>
+              <ma14:placeholderFlag xmlns="" xmlns:ma14="http://schemas.microsoft.com/office/mac/drawingml/2011/main" val="1"/>
             </a:ext>
           </a:extLst>
         </p:spPr>
@@ -22680,14 +23273,14 @@
           <a:noFill/>
           <a:extLst>
             <a:ext uri="{909E8E84-426E-40dd-AFC4-6F175D3DCCD1}">
-              <a14:hiddenFill xmlns:a14="http://schemas.microsoft.com/office/drawing/2010/main" xmlns="">
+              <a14:hiddenFill xmlns="" xmlns:a14="http://schemas.microsoft.com/office/drawing/2010/main">
                 <a:solidFill>
                   <a:srgbClr val="FFFFFF"/>
                 </a:solidFill>
               </a14:hiddenFill>
             </a:ext>
             <a:ext uri="{91240B29-F687-4f45-9708-019B960494DF}">
-              <a14:hiddenLine xmlns:a14="http://schemas.microsoft.com/office/drawing/2010/main" xmlns="" w="9525">
+              <a14:hiddenLine xmlns="" xmlns:a14="http://schemas.microsoft.com/office/drawing/2010/main" w="9525">
                 <a:solidFill>
                   <a:srgbClr val="000000"/>
                 </a:solidFill>
@@ -22740,14 +23333,14 @@
           <a:noFill/>
           <a:extLst>
             <a:ext uri="{909E8E84-426E-40dd-AFC4-6F175D3DCCD1}">
-              <a14:hiddenFill xmlns:a14="http://schemas.microsoft.com/office/drawing/2010/main" xmlns="">
+              <a14:hiddenFill xmlns="" xmlns:a14="http://schemas.microsoft.com/office/drawing/2010/main">
                 <a:solidFill>
                   <a:srgbClr val="FFFFFF"/>
                 </a:solidFill>
               </a14:hiddenFill>
             </a:ext>
             <a:ext uri="{91240B29-F687-4f45-9708-019B960494DF}">
-              <a14:hiddenLine xmlns:a14="http://schemas.microsoft.com/office/drawing/2010/main" xmlns="" w="9525">
+              <a14:hiddenLine xmlns="" xmlns:a14="http://schemas.microsoft.com/office/drawing/2010/main" w="9525">
                 <a:solidFill>
                   <a:srgbClr val="000000"/>
                 </a:solidFill>
@@ -22792,23 +23385,7 @@
                 <a:ea typeface="ヒラギノ角ゴ ProN W3" charset="0"/>
                 <a:cs typeface="Source Sans Pro Light" charset="0"/>
               </a:rPr>
-              <a:t>: </a:t>
-            </a:r>
-            <a:r>
-              <a:rPr lang="en-US" smtClean="0">
-                <a:latin typeface="Source Sans Pro Light" charset="0"/>
-                <a:ea typeface="ヒラギノ角ゴ ProN W3" charset="0"/>
-                <a:cs typeface="Source Sans Pro Light" charset="0"/>
-              </a:rPr>
-              <a:t>Build </a:t>
-            </a:r>
-            <a:r>
-              <a:rPr lang="en-US" smtClean="0">
-                <a:latin typeface="Source Sans Pro Light" charset="0"/>
-                <a:ea typeface="ヒラギノ角ゴ ProN W3" charset="0"/>
-                <a:cs typeface="Source Sans Pro Light" charset="0"/>
-              </a:rPr>
-              <a:t>an AI-powered </a:t>
+              <a:t>: Build an AI-powered </a:t>
             </a:r>
             <a:r>
               <a:rPr lang="en-US" i="1">
@@ -22832,15 +23409,7 @@
                 <a:ea typeface="ヒラギノ角ゴ ProN W3" charset="0"/>
                 <a:cs typeface="Source Sans Pro Light" charset="0"/>
               </a:rPr>
-              <a:t>to </a:t>
-            </a:r>
-            <a:r>
-              <a:rPr lang="en-US" smtClean="0">
-                <a:latin typeface="Source Sans Pro Light" charset="0"/>
-                <a:ea typeface="ヒラギノ角ゴ ProN W3" charset="0"/>
-                <a:cs typeface="Source Sans Pro Light" charset="0"/>
-              </a:rPr>
-              <a:t>categorize images of official and unofficial #brand profiles on </a:t>
+              <a:t>to categorize images of official and unofficial #brand profiles on </a:t>
             </a:r>
             <a:r>
               <a:rPr lang="en-US" i="1" smtClean="0">
@@ -22888,15 +23457,7 @@
                 <a:ea typeface="ヒラギノ角ゴ ProN W3" charset="0"/>
                 <a:cs typeface="Source Sans Pro Light" charset="0"/>
               </a:rPr>
-              <a:t>: </a:t>
-            </a:r>
-            <a:r>
-              <a:rPr lang="en-US" smtClean="0">
-                <a:latin typeface="Source Sans Pro Light" charset="0"/>
-                <a:ea typeface="ヒラギノ角ゴ ProN W3" charset="0"/>
-                <a:cs typeface="Source Sans Pro Light" charset="0"/>
-              </a:rPr>
-              <a:t>supervised machine learning (feed in BPA-tagged Flickr images, tweak </a:t>
+              <a:t>: supervised machine learning (feed in BPA-tagged Flickr images, tweak </a:t>
             </a:r>
             <a:r>
               <a:rPr lang="en-US">
@@ -22928,15 +23489,7 @@
                 <a:ea typeface="ヒラギノ角ゴ ProN W3" charset="0"/>
                 <a:cs typeface="Source Sans Pro Light" charset="0"/>
               </a:rPr>
-              <a:t>earning </a:t>
-            </a:r>
-            <a:r>
-              <a:rPr lang="en-US" i="1" smtClean="0">
-                <a:latin typeface="Source Sans Pro Light" charset="0"/>
-                <a:ea typeface="ヒラギノ角ゴ ProN W3" charset="0"/>
-                <a:cs typeface="Source Sans Pro Light" charset="0"/>
-              </a:rPr>
-              <a:t>model </a:t>
+              <a:t>earning model </a:t>
             </a:r>
             <a:r>
               <a:rPr lang="en-US" smtClean="0">
@@ -22966,15 +23519,7 @@
                 <a:ea typeface="ヒラギノ角ゴ ProN W3" charset="0"/>
                 <a:cs typeface="Source Sans Pro Light" charset="0"/>
               </a:rPr>
-              <a:t>Web </a:t>
-            </a:r>
-            <a:r>
-              <a:rPr lang="en-US" b="1" smtClean="0">
-                <a:latin typeface="Source Sans Pro Light" charset="0"/>
-                <a:ea typeface="ヒラギノ角ゴ ProN W3" charset="0"/>
-                <a:cs typeface="Source Sans Pro Light" charset="0"/>
-              </a:rPr>
-              <a:t>App: </a:t>
+              <a:t>Web App: </a:t>
             </a:r>
             <a:r>
               <a:rPr lang="de-CH" smtClean="0">
@@ -23193,7 +23738,7 @@
           <a:blip r:embed="rId23">
             <a:extLst>
               <a:ext uri="{96DAC541-7B7A-43D3-8B79-37D633B846F1}">
-                <asvg:svgBlip xmlns="" xmlns:asvg="http://schemas.microsoft.com/office/drawing/2016/SVG/main" r:embed="rId24"/>
+                <asvg:svgBlip xmlns:asvg="http://schemas.microsoft.com/office/drawing/2016/SVG/main" xmlns="" r:embed="rId24"/>
               </a:ext>
             </a:extLst>
           </a:blip>
@@ -23229,7 +23774,7 @@
           <a:blip r:embed="rId23">
             <a:extLst>
               <a:ext uri="{96DAC541-7B7A-43D3-8B79-37D633B846F1}">
-                <asvg:svgBlip xmlns="" xmlns:asvg="http://schemas.microsoft.com/office/drawing/2016/SVG/main" r:embed="rId24"/>
+                <asvg:svgBlip xmlns:asvg="http://schemas.microsoft.com/office/drawing/2016/SVG/main" xmlns="" r:embed="rId24"/>
               </a:ext>
             </a:extLst>
           </a:blip>
@@ -23265,7 +23810,7 @@
           <a:blip r:embed="rId25">
             <a:extLst>
               <a:ext uri="{96DAC541-7B7A-43D3-8B79-37D633B846F1}">
-                <asvg:svgBlip xmlns="" xmlns:asvg="http://schemas.microsoft.com/office/drawing/2016/SVG/main" r:embed="rId26"/>
+                <asvg:svgBlip xmlns:asvg="http://schemas.microsoft.com/office/drawing/2016/SVG/main" xmlns="" r:embed="rId26"/>
               </a:ext>
             </a:extLst>
           </a:blip>
@@ -23301,7 +23846,7 @@
           <a:blip r:embed="rId27">
             <a:extLst>
               <a:ext uri="{96DAC541-7B7A-43D3-8B79-37D633B846F1}">
-                <asvg:svgBlip xmlns="" xmlns:asvg="http://schemas.microsoft.com/office/drawing/2016/SVG/main" r:embed="rId28"/>
+                <asvg:svgBlip xmlns:asvg="http://schemas.microsoft.com/office/drawing/2016/SVG/main" xmlns="" r:embed="rId28"/>
               </a:ext>
             </a:extLst>
           </a:blip>
@@ -23337,7 +23882,7 @@
           <a:blip r:embed="rId29">
             <a:extLst>
               <a:ext uri="{96DAC541-7B7A-43D3-8B79-37D633B846F1}">
-                <asvg:svgBlip xmlns="" xmlns:asvg="http://schemas.microsoft.com/office/drawing/2016/SVG/main" r:embed="rId30"/>
+                <asvg:svgBlip xmlns:asvg="http://schemas.microsoft.com/office/drawing/2016/SVG/main" xmlns="" r:embed="rId30"/>
               </a:ext>
             </a:extLst>
           </a:blip>
@@ -23373,7 +23918,7 @@
           <a:blip r:embed="rId31">
             <a:extLst>
               <a:ext uri="{96DAC541-7B7A-43D3-8B79-37D633B846F1}">
-                <asvg:svgBlip xmlns="" xmlns:asvg="http://schemas.microsoft.com/office/drawing/2016/SVG/main" r:embed="rId32"/>
+                <asvg:svgBlip xmlns:asvg="http://schemas.microsoft.com/office/drawing/2016/SVG/main" xmlns="" r:embed="rId32"/>
               </a:ext>
             </a:extLst>
           </a:blip>
@@ -23428,7 +23973,7 @@
           <a:effectLst/>
           <a:extLst>
             <a:ext uri="{AF507438-7753-43e0-B8FC-AC1667EBCBE1}">
-              <a14:hiddenEffects xmlns:a14="http://schemas.microsoft.com/office/drawing/2010/main" xmlns="">
+              <a14:hiddenEffects xmlns="" xmlns:a14="http://schemas.microsoft.com/office/drawing/2010/main">
                 <a:effectLst>
                   <a:outerShdw blurRad="63500" dist="38099" dir="2700000" algn="ctr" rotWithShape="0">
                     <a:schemeClr val="bg2">
@@ -23466,15 +24011,7 @@
             </a:pPr>
             <a:r>
               <a:rPr lang="de-CH" sz="1200" smtClean="0"/>
-              <a:t>Key in brand </a:t>
-            </a:r>
-            <a:r>
-              <a:rPr lang="de-CH" sz="1200" smtClean="0"/>
-              <a:t>name: official + </a:t>
-            </a:r>
-            <a:r>
-              <a:rPr lang="de-CH" sz="1200" smtClean="0"/>
-              <a:t>unofficial social media profile</a:t>
+              <a:t>Key in brand name: official + unofficial social media profile</a:t>
             </a:r>
           </a:p>
           <a:p>
@@ -23561,7 +24098,7 @@
           <a:effectLst/>
           <a:extLst>
             <a:ext uri="{AF507438-7753-43e0-B8FC-AC1667EBCBE1}">
-              <a14:hiddenEffects xmlns:a14="http://schemas.microsoft.com/office/drawing/2010/main" xmlns="">
+              <a14:hiddenEffects xmlns="" xmlns:a14="http://schemas.microsoft.com/office/drawing/2010/main">
                 <a:effectLst>
                   <a:outerShdw blurRad="63500" dist="38099" dir="2700000" algn="ctr" rotWithShape="0">
                     <a:schemeClr val="bg2">
@@ -23653,7 +24190,7 @@
           <a:effectLst/>
           <a:extLst>
             <a:ext uri="{AF507438-7753-43e0-B8FC-AC1667EBCBE1}">
-              <a14:hiddenEffects xmlns:a14="http://schemas.microsoft.com/office/drawing/2010/main" xmlns="">
+              <a14:hiddenEffects xmlns="" xmlns:a14="http://schemas.microsoft.com/office/drawing/2010/main">
                 <a:effectLst>
                   <a:outerShdw blurRad="63500" dist="38099" dir="2700000" algn="ctr" rotWithShape="0">
                     <a:schemeClr val="bg2">
@@ -23767,23 +24304,7 @@
                 <a:cs typeface="ヒラギノ角ゴ ProN W3" charset="0"/>
                 <a:sym typeface="Neutraface Text Book" charset="0"/>
               </a:rPr>
-              <a:t> into </a:t>
-            </a:r>
-            <a:r>
-              <a:rPr kumimoji="0" lang="de-CH" sz="1200" b="0" i="0" u="none" strike="noStrike" cap="none" normalizeH="0" baseline="0" smtClean="0">
-                <a:ln>
-                  <a:noFill/>
-                </a:ln>
-                <a:solidFill>
-                  <a:srgbClr val="000000"/>
-                </a:solidFill>
-                <a:effectLst/>
-                <a:latin typeface="Neutraface Text Book" charset="0"/>
-                <a:ea typeface="ヒラギノ角ゴ ProN W3" charset="0"/>
-                <a:cs typeface="ヒラギノ角ゴ ProN W3" charset="0"/>
-                <a:sym typeface="Neutraface Text Book" charset="0"/>
-              </a:rPr>
-              <a:t>fixed brand </a:t>
+              <a:t> into fixed brand </a:t>
             </a:r>
             <a:r>
               <a:rPr kumimoji="0" lang="de-CH" sz="1200" b="0" i="0" u="none" strike="noStrike" cap="none" normalizeH="0" baseline="0">
@@ -23822,7 +24343,7 @@
           <a:blip r:embed="rId33">
             <a:extLst>
               <a:ext uri="{96DAC541-7B7A-43D3-8B79-37D633B846F1}">
-                <asvg:svgBlip xmlns="" xmlns:asvg="http://schemas.microsoft.com/office/drawing/2016/SVG/main" r:embed="rId34"/>
+                <asvg:svgBlip xmlns:asvg="http://schemas.microsoft.com/office/drawing/2016/SVG/main" xmlns="" r:embed="rId34"/>
               </a:ext>
             </a:extLst>
           </a:blip>
@@ -23859,14 +24380,14 @@
           <a:noFill/>
           <a:extLst>
             <a:ext uri="{909E8E84-426E-40dd-AFC4-6F175D3DCCD1}">
-              <a14:hiddenFill xmlns:a14="http://schemas.microsoft.com/office/drawing/2010/main" xmlns="">
+              <a14:hiddenFill xmlns="" xmlns:a14="http://schemas.microsoft.com/office/drawing/2010/main">
                 <a:solidFill>
                   <a:srgbClr val="FFFFFF"/>
                 </a:solidFill>
               </a14:hiddenFill>
             </a:ext>
             <a:ext uri="{91240B29-F687-4f45-9708-019B960494DF}">
-              <a14:hiddenLine xmlns:a14="http://schemas.microsoft.com/office/drawing/2010/main" xmlns="" w="9525">
+              <a14:hiddenLine xmlns="" xmlns:a14="http://schemas.microsoft.com/office/drawing/2010/main" w="9525">
                 <a:solidFill>
                   <a:srgbClr val="000000"/>
                 </a:solidFill>
@@ -23876,7 +24397,7 @@
               </a14:hiddenLine>
             </a:ext>
             <a:ext uri="{FAA26D3D-D897-4be2-8F04-BA451C77F1D7}">
-              <ma14:placeholderFlag xmlns:ma14="http://schemas.microsoft.com/office/mac/drawingml/2011/main" xmlns="" val="1"/>
+              <ma14:placeholderFlag xmlns="" xmlns:ma14="http://schemas.microsoft.com/office/mac/drawingml/2011/main" val="1"/>
             </a:ext>
           </a:extLst>
         </p:spPr>
@@ -24131,18 +24652,7 @@
                 <a:ea typeface="ヒラギノ角ゴ ProN W3" charset="0"/>
                 <a:cs typeface="Source Sans Pro Light" charset="0"/>
               </a:rPr>
-              <a:t>How to use Deep Learning for </a:t>
-            </a:r>
-            <a:r>
-              <a:rPr lang="de-DE" kern="0" smtClean="0">
-                <a:solidFill>
-                  <a:srgbClr val="D9D9D9"/>
-                </a:solidFill>
-                <a:latin typeface="Source Sans Pro Light" charset="0"/>
-                <a:ea typeface="ヒラギノ角ゴ ProN W3" charset="0"/>
-                <a:cs typeface="Source Sans Pro Light" charset="0"/>
-              </a:rPr>
-              <a:t>Marketing?</a:t>
+              <a:t>How to use Deep Learning for Marketing?</a:t>
             </a:r>
             <a:endParaRPr lang="de-DE" b="1" kern="0">
               <a:solidFill>
@@ -24739,14 +25249,14 @@
           <a:noFill/>
           <a:extLst>
             <a:ext uri="{909E8E84-426E-40dd-AFC4-6F175D3DCCD1}">
-              <a14:hiddenFill xmlns:a14="http://schemas.microsoft.com/office/drawing/2010/main" xmlns="">
+              <a14:hiddenFill xmlns="" xmlns:a14="http://schemas.microsoft.com/office/drawing/2010/main">
                 <a:solidFill>
                   <a:srgbClr val="FFFFFF"/>
                 </a:solidFill>
               </a14:hiddenFill>
             </a:ext>
             <a:ext uri="{91240B29-F687-4f45-9708-019B960494DF}">
-              <a14:hiddenLine xmlns:a14="http://schemas.microsoft.com/office/drawing/2010/main" xmlns="" w="9525">
+              <a14:hiddenLine xmlns="" xmlns:a14="http://schemas.microsoft.com/office/drawing/2010/main" w="9525">
                 <a:solidFill>
                   <a:srgbClr val="000000"/>
                 </a:solidFill>
@@ -24855,14 +25365,14 @@
           <a:noFill/>
           <a:extLst>
             <a:ext uri="{909E8E84-426E-40dd-AFC4-6F175D3DCCD1}">
-              <a14:hiddenFill xmlns:a14="http://schemas.microsoft.com/office/drawing/2010/main" xmlns="">
+              <a14:hiddenFill xmlns="" xmlns:a14="http://schemas.microsoft.com/office/drawing/2010/main">
                 <a:solidFill>
                   <a:srgbClr val="FFFFFF"/>
                 </a:solidFill>
               </a14:hiddenFill>
             </a:ext>
             <a:ext uri="{91240B29-F687-4f45-9708-019B960494DF}">
-              <a14:hiddenLine xmlns:a14="http://schemas.microsoft.com/office/drawing/2010/main" xmlns="" w="9525">
+              <a14:hiddenLine xmlns="" xmlns:a14="http://schemas.microsoft.com/office/drawing/2010/main" w="9525">
                 <a:solidFill>
                   <a:srgbClr val="000000"/>
                 </a:solidFill>
@@ -24872,7 +25382,7 @@
               </a14:hiddenLine>
             </a:ext>
             <a:ext uri="{FAA26D3D-D897-4be2-8F04-BA451C77F1D7}">
-              <ma14:placeholderFlag xmlns:ma14="http://schemas.microsoft.com/office/mac/drawingml/2011/main" xmlns="" val="1"/>
+              <ma14:placeholderFlag xmlns="" xmlns:ma14="http://schemas.microsoft.com/office/mac/drawingml/2011/main" val="1"/>
             </a:ext>
           </a:extLst>
         </p:spPr>
@@ -25240,7 +25750,7 @@
                   <a14:useLocalDpi xmlns:a14="http://schemas.microsoft.com/office/drawing/2010/main" val="0"/>
                 </a:ext>
                 <a:ext uri="{96DAC541-7B7A-43D3-8B79-37D633B846F1}">
-                  <asvg:svgBlip xmlns:dgm="http://schemas.openxmlformats.org/drawingml/2006/diagram" xmlns:asvg="http://schemas.microsoft.com/office/drawing/2016/SVG/main" xmlns="" xmlns:lc="http://schemas.openxmlformats.org/drawingml/2006/lockedCanvas" r:embed="rId5"/>
+                  <asvg:svgBlip xmlns:lc="http://schemas.openxmlformats.org/drawingml/2006/lockedCanvas" xmlns="" xmlns:asvg="http://schemas.microsoft.com/office/drawing/2016/SVG/main" xmlns:dgm="http://schemas.openxmlformats.org/drawingml/2006/diagram" r:embed="rId5"/>
                 </a:ext>
               </a:extLst>
             </a:blip>
@@ -25303,7 +25813,7 @@
                   <a14:useLocalDpi xmlns:a14="http://schemas.microsoft.com/office/drawing/2010/main" val="0"/>
                 </a:ext>
                 <a:ext uri="{96DAC541-7B7A-43D3-8B79-37D633B846F1}">
-                  <asvg:svgBlip xmlns:dgm="http://schemas.openxmlformats.org/drawingml/2006/diagram" xmlns:asvg="http://schemas.microsoft.com/office/drawing/2016/SVG/main" xmlns="" xmlns:lc="http://schemas.openxmlformats.org/drawingml/2006/lockedCanvas" r:embed="rId7"/>
+                  <asvg:svgBlip xmlns:lc="http://schemas.openxmlformats.org/drawingml/2006/lockedCanvas" xmlns="" xmlns:asvg="http://schemas.microsoft.com/office/drawing/2016/SVG/main" xmlns:dgm="http://schemas.openxmlformats.org/drawingml/2006/diagram" r:embed="rId7"/>
                 </a:ext>
               </a:extLst>
             </a:blip>
@@ -25366,7 +25876,7 @@
                   <a14:useLocalDpi xmlns:a14="http://schemas.microsoft.com/office/drawing/2010/main" val="0"/>
                 </a:ext>
                 <a:ext uri="{96DAC541-7B7A-43D3-8B79-37D633B846F1}">
-                  <asvg:svgBlip xmlns:dgm="http://schemas.openxmlformats.org/drawingml/2006/diagram" xmlns:asvg="http://schemas.microsoft.com/office/drawing/2016/SVG/main" xmlns="" xmlns:lc="http://schemas.openxmlformats.org/drawingml/2006/lockedCanvas" r:embed="rId9"/>
+                  <asvg:svgBlip xmlns:lc="http://schemas.openxmlformats.org/drawingml/2006/lockedCanvas" xmlns="" xmlns:asvg="http://schemas.microsoft.com/office/drawing/2016/SVG/main" xmlns:dgm="http://schemas.openxmlformats.org/drawingml/2006/diagram" r:embed="rId9"/>
                 </a:ext>
               </a:extLst>
             </a:blip>
@@ -25736,14 +26246,14 @@
           <a:noFill/>
           <a:extLst>
             <a:ext uri="{909E8E84-426E-40dd-AFC4-6F175D3DCCD1}">
-              <a14:hiddenFill xmlns:a14="http://schemas.microsoft.com/office/drawing/2010/main" xmlns="">
+              <a14:hiddenFill xmlns="" xmlns:a14="http://schemas.microsoft.com/office/drawing/2010/main">
                 <a:solidFill>
                   <a:srgbClr val="FFFFFF"/>
                 </a:solidFill>
               </a14:hiddenFill>
             </a:ext>
             <a:ext uri="{91240B29-F687-4f45-9708-019B960494DF}">
-              <a14:hiddenLine xmlns:a14="http://schemas.microsoft.com/office/drawing/2010/main" xmlns="" w="9525">
+              <a14:hiddenLine xmlns="" xmlns:a14="http://schemas.microsoft.com/office/drawing/2010/main" w="9525">
                 <a:solidFill>
                   <a:srgbClr val="000000"/>
                 </a:solidFill>
@@ -26198,7 +26708,7 @@
           <a:effectLst/>
           <a:extLst>
             <a:ext uri="{AF507438-7753-43e0-B8FC-AC1667EBCBE1}">
-              <a14:hiddenEffects xmlns:a14="http://schemas.microsoft.com/office/drawing/2010/main" xmlns="">
+              <a14:hiddenEffects xmlns="" xmlns:a14="http://schemas.microsoft.com/office/drawing/2010/main">
                 <a:effectLst>
                   <a:outerShdw blurRad="63500" dist="38099" dir="2700000" algn="ctr" rotWithShape="0">
                     <a:schemeClr val="bg2">
@@ -26325,14 +26835,14 @@
           <a:noFill/>
           <a:extLst>
             <a:ext uri="{909E8E84-426E-40dd-AFC4-6F175D3DCCD1}">
-              <a14:hiddenFill xmlns:a14="http://schemas.microsoft.com/office/drawing/2010/main" xmlns="">
+              <a14:hiddenFill xmlns="" xmlns:a14="http://schemas.microsoft.com/office/drawing/2010/main">
                 <a:solidFill>
                   <a:srgbClr val="FFFFFF"/>
                 </a:solidFill>
               </a14:hiddenFill>
             </a:ext>
             <a:ext uri="{91240B29-F687-4f45-9708-019B960494DF}">
-              <a14:hiddenLine xmlns:a14="http://schemas.microsoft.com/office/drawing/2010/main" xmlns="" w="9525">
+              <a14:hiddenLine xmlns="" xmlns:a14="http://schemas.microsoft.com/office/drawing/2010/main" w="9525">
                 <a:solidFill>
                   <a:srgbClr val="000000"/>
                 </a:solidFill>
@@ -26342,7 +26852,7 @@
               </a14:hiddenLine>
             </a:ext>
             <a:ext uri="{FAA26D3D-D897-4be2-8F04-BA451C77F1D7}">
-              <ma14:placeholderFlag xmlns:ma14="http://schemas.microsoft.com/office/mac/drawingml/2011/main" xmlns="" val="1"/>
+              <ma14:placeholderFlag xmlns="" xmlns:ma14="http://schemas.microsoft.com/office/mac/drawingml/2011/main" val="1"/>
             </a:ext>
           </a:extLst>
         </p:spPr>
@@ -26659,14 +27169,14 @@
           <a:noFill/>
           <a:extLst>
             <a:ext uri="{909E8E84-426E-40dd-AFC4-6F175D3DCCD1}">
-              <a14:hiddenFill xmlns:a14="http://schemas.microsoft.com/office/drawing/2010/main" xmlns="">
+              <a14:hiddenFill xmlns="" xmlns:a14="http://schemas.microsoft.com/office/drawing/2010/main">
                 <a:solidFill>
                   <a:srgbClr val="FFFFFF"/>
                 </a:solidFill>
               </a14:hiddenFill>
             </a:ext>
             <a:ext uri="{91240B29-F687-4f45-9708-019B960494DF}">
-              <a14:hiddenLine xmlns:a14="http://schemas.microsoft.com/office/drawing/2010/main" xmlns="" w="9525">
+              <a14:hiddenLine xmlns="" xmlns:a14="http://schemas.microsoft.com/office/drawing/2010/main" w="9525">
                 <a:solidFill>
                   <a:srgbClr val="000000"/>
                 </a:solidFill>
@@ -26786,7 +27296,7 @@
           <a:effectLst/>
           <a:extLst>
             <a:ext uri="{AF507438-7753-43e0-B8FC-AC1667EBCBE1}">
-              <a14:hiddenEffects xmlns:a14="http://schemas.microsoft.com/office/drawing/2010/main" xmlns="">
+              <a14:hiddenEffects xmlns="" xmlns:a14="http://schemas.microsoft.com/office/drawing/2010/main">
                 <a:effectLst>
                   <a:outerShdw blurRad="63500" dist="38099" dir="2700000" algn="ctr" rotWithShape="0">
                     <a:schemeClr val="bg2">
@@ -26939,7 +27449,7 @@
           <a:effectLst/>
           <a:extLst>
             <a:ext uri="{AF507438-7753-43e0-B8FC-AC1667EBCBE1}">
-              <a14:hiddenEffects xmlns:a14="http://schemas.microsoft.com/office/drawing/2010/main" xmlns="">
+              <a14:hiddenEffects xmlns="" xmlns:a14="http://schemas.microsoft.com/office/drawing/2010/main">
                 <a:effectLst>
                   <a:outerShdw blurRad="63500" dist="38099" dir="2700000" algn="ctr" rotWithShape="0">
                     <a:schemeClr val="bg2">
@@ -27030,7 +27540,7 @@
           <a:effectLst/>
           <a:extLst>
             <a:ext uri="{AF507438-7753-43e0-B8FC-AC1667EBCBE1}">
-              <a14:hiddenEffects xmlns:a14="http://schemas.microsoft.com/office/drawing/2010/main" xmlns="">
+              <a14:hiddenEffects xmlns="" xmlns:a14="http://schemas.microsoft.com/office/drawing/2010/main">
                 <a:effectLst>
                   <a:outerShdw blurRad="63500" dist="38099" dir="2700000" algn="ctr" rotWithShape="0">
                     <a:schemeClr val="bg2">
@@ -27121,7 +27631,7 @@
           <a:effectLst/>
           <a:extLst>
             <a:ext uri="{AF507438-7753-43e0-B8FC-AC1667EBCBE1}">
-              <a14:hiddenEffects xmlns:a14="http://schemas.microsoft.com/office/drawing/2010/main" xmlns="">
+              <a14:hiddenEffects xmlns="" xmlns:a14="http://schemas.microsoft.com/office/drawing/2010/main">
                 <a:effectLst>
                   <a:outerShdw blurRad="63500" dist="38099" dir="2700000" algn="ctr" rotWithShape="0">
                     <a:schemeClr val="bg2">
@@ -27212,7 +27722,7 @@
           <a:effectLst/>
           <a:extLst>
             <a:ext uri="{AF507438-7753-43e0-B8FC-AC1667EBCBE1}">
-              <a14:hiddenEffects xmlns:a14="http://schemas.microsoft.com/office/drawing/2010/main" xmlns="">
+              <a14:hiddenEffects xmlns="" xmlns:a14="http://schemas.microsoft.com/office/drawing/2010/main">
                 <a:effectLst>
                   <a:outerShdw blurRad="63500" dist="38099" dir="2700000" algn="ctr" rotWithShape="0">
                     <a:schemeClr val="bg2">
@@ -27303,7 +27813,7 @@
           <a:effectLst/>
           <a:extLst>
             <a:ext uri="{AF507438-7753-43e0-B8FC-AC1667EBCBE1}">
-              <a14:hiddenEffects xmlns:a14="http://schemas.microsoft.com/office/drawing/2010/main" xmlns="">
+              <a14:hiddenEffects xmlns="" xmlns:a14="http://schemas.microsoft.com/office/drawing/2010/main">
                 <a:effectLst>
                   <a:outerShdw blurRad="63500" dist="38099" dir="2700000" algn="ctr" rotWithShape="0">
                     <a:schemeClr val="bg2">
@@ -27395,7 +27905,7 @@
           <a:effectLst/>
           <a:extLst>
             <a:ext uri="{AF507438-7753-43e0-B8FC-AC1667EBCBE1}">
-              <a14:hiddenEffects xmlns:a14="http://schemas.microsoft.com/office/drawing/2010/main" xmlns="">
+              <a14:hiddenEffects xmlns="" xmlns:a14="http://schemas.microsoft.com/office/drawing/2010/main">
                 <a:effectLst>
                   <a:outerShdw blurRad="63500" dist="38099" dir="2700000" algn="ctr" rotWithShape="0">
                     <a:schemeClr val="bg2">
@@ -27546,7 +28056,7 @@
           <a:effectLst/>
           <a:extLst>
             <a:ext uri="{AF507438-7753-43e0-B8FC-AC1667EBCBE1}">
-              <a14:hiddenEffects xmlns:a14="http://schemas.microsoft.com/office/drawing/2010/main" xmlns="">
+              <a14:hiddenEffects xmlns="" xmlns:a14="http://schemas.microsoft.com/office/drawing/2010/main">
                 <a:effectLst>
                   <a:outerShdw blurRad="63500" dist="38099" dir="2700000" algn="ctr" rotWithShape="0">
                     <a:schemeClr val="bg2">
@@ -27637,7 +28147,7 @@
           <a:effectLst/>
           <a:extLst>
             <a:ext uri="{AF507438-7753-43e0-B8FC-AC1667EBCBE1}">
-              <a14:hiddenEffects xmlns:a14="http://schemas.microsoft.com/office/drawing/2010/main" xmlns="">
+              <a14:hiddenEffects xmlns="" xmlns:a14="http://schemas.microsoft.com/office/drawing/2010/main">
                 <a:effectLst>
                   <a:outerShdw blurRad="63500" dist="38099" dir="2700000" algn="ctr" rotWithShape="0">
                     <a:schemeClr val="bg2">
@@ -27724,7 +28234,7 @@
           <a:effectLst/>
           <a:extLst>
             <a:ext uri="{AF507438-7753-43e0-B8FC-AC1667EBCBE1}">
-              <a14:hiddenEffects xmlns:a14="http://schemas.microsoft.com/office/drawing/2010/main" xmlns="">
+              <a14:hiddenEffects xmlns="" xmlns:a14="http://schemas.microsoft.com/office/drawing/2010/main">
                 <a:effectLst>
                   <a:outerShdw blurRad="63500" dist="38099" dir="2700000" algn="ctr" rotWithShape="0">
                     <a:schemeClr val="bg2">
@@ -27813,7 +28323,7 @@
           <a:effectLst/>
           <a:extLst>
             <a:ext uri="{AF507438-7753-43e0-B8FC-AC1667EBCBE1}">
-              <a14:hiddenEffects xmlns:a14="http://schemas.microsoft.com/office/drawing/2010/main" xmlns="">
+              <a14:hiddenEffects xmlns="" xmlns:a14="http://schemas.microsoft.com/office/drawing/2010/main">
                 <a:effectLst>
                   <a:outerShdw blurRad="63500" dist="38099" dir="2700000" algn="ctr" rotWithShape="0">
                     <a:schemeClr val="bg2">
@@ -27861,7 +28371,7 @@
           <a:effectLst/>
           <a:extLst>
             <a:ext uri="{AF507438-7753-43e0-B8FC-AC1667EBCBE1}">
-              <a14:hiddenEffects xmlns:a14="http://schemas.microsoft.com/office/drawing/2010/main" xmlns="">
+              <a14:hiddenEffects xmlns="" xmlns:a14="http://schemas.microsoft.com/office/drawing/2010/main">
                 <a:effectLst>
                   <a:outerShdw blurRad="63500" dist="38099" dir="2700000" algn="ctr" rotWithShape="0">
                     <a:schemeClr val="bg2">
@@ -27912,7 +28422,7 @@
           <a:effectLst/>
           <a:extLst>
             <a:ext uri="{AF507438-7753-43e0-B8FC-AC1667EBCBE1}">
-              <a14:hiddenEffects xmlns:a14="http://schemas.microsoft.com/office/drawing/2010/main" xmlns="">
+              <a14:hiddenEffects xmlns="" xmlns:a14="http://schemas.microsoft.com/office/drawing/2010/main">
                 <a:effectLst>
                   <a:outerShdw blurRad="63500" dist="38099" dir="2700000" algn="ctr" rotWithShape="0">
                     <a:schemeClr val="bg2">
@@ -27962,7 +28472,7 @@
           <a:effectLst/>
           <a:extLst>
             <a:ext uri="{AF507438-7753-43e0-B8FC-AC1667EBCBE1}">
-              <a14:hiddenEffects xmlns:a14="http://schemas.microsoft.com/office/drawing/2010/main" xmlns="">
+              <a14:hiddenEffects xmlns="" xmlns:a14="http://schemas.microsoft.com/office/drawing/2010/main">
                 <a:effectLst>
                   <a:outerShdw blurRad="63500" dist="38099" dir="2700000" algn="ctr" rotWithShape="0">
                     <a:schemeClr val="bg2">
@@ -28012,7 +28522,7 @@
           <a:effectLst/>
           <a:extLst>
             <a:ext uri="{AF507438-7753-43e0-B8FC-AC1667EBCBE1}">
-              <a14:hiddenEffects xmlns:a14="http://schemas.microsoft.com/office/drawing/2010/main" xmlns="">
+              <a14:hiddenEffects xmlns="" xmlns:a14="http://schemas.microsoft.com/office/drawing/2010/main">
                 <a:effectLst>
                   <a:outerShdw blurRad="63500" dist="38099" dir="2700000" algn="ctr" rotWithShape="0">
                     <a:schemeClr val="bg2">
@@ -28063,7 +28573,7 @@
           <a:effectLst/>
           <a:extLst>
             <a:ext uri="{AF507438-7753-43e0-B8FC-AC1667EBCBE1}">
-              <a14:hiddenEffects xmlns:a14="http://schemas.microsoft.com/office/drawing/2010/main" xmlns="">
+              <a14:hiddenEffects xmlns="" xmlns:a14="http://schemas.microsoft.com/office/drawing/2010/main">
                 <a:effectLst>
                   <a:outerShdw blurRad="63500" dist="38099" dir="2700000" algn="ctr" rotWithShape="0">
                     <a:schemeClr val="bg2">
@@ -28114,7 +28624,7 @@
           <a:effectLst/>
           <a:extLst>
             <a:ext uri="{AF507438-7753-43e0-B8FC-AC1667EBCBE1}">
-              <a14:hiddenEffects xmlns:a14="http://schemas.microsoft.com/office/drawing/2010/main" xmlns="">
+              <a14:hiddenEffects xmlns="" xmlns:a14="http://schemas.microsoft.com/office/drawing/2010/main">
                 <a:effectLst>
                   <a:outerShdw blurRad="63500" dist="38099" dir="2700000" algn="ctr" rotWithShape="0">
                     <a:schemeClr val="bg2">
@@ -28162,7 +28672,7 @@
           <a:effectLst/>
           <a:extLst>
             <a:ext uri="{AF507438-7753-43e0-B8FC-AC1667EBCBE1}">
-              <a14:hiddenEffects xmlns:a14="http://schemas.microsoft.com/office/drawing/2010/main" xmlns="">
+              <a14:hiddenEffects xmlns="" xmlns:a14="http://schemas.microsoft.com/office/drawing/2010/main">
                 <a:effectLst>
                   <a:outerShdw blurRad="63500" dist="38099" dir="2700000" algn="ctr" rotWithShape="0">
                     <a:schemeClr val="bg2">
@@ -28249,7 +28759,7 @@
           <a:effectLst/>
           <a:extLst>
             <a:ext uri="{AF507438-7753-43e0-B8FC-AC1667EBCBE1}">
-              <a14:hiddenEffects xmlns:a14="http://schemas.microsoft.com/office/drawing/2010/main" xmlns="">
+              <a14:hiddenEffects xmlns="" xmlns:a14="http://schemas.microsoft.com/office/drawing/2010/main">
                 <a:effectLst>
                   <a:outerShdw blurRad="63500" dist="38099" dir="2700000" algn="ctr" rotWithShape="0">
                     <a:schemeClr val="bg2">
@@ -28338,7 +28848,7 @@
           <a:effectLst/>
           <a:extLst>
             <a:ext uri="{AF507438-7753-43e0-B8FC-AC1667EBCBE1}">
-              <a14:hiddenEffects xmlns:a14="http://schemas.microsoft.com/office/drawing/2010/main" xmlns="">
+              <a14:hiddenEffects xmlns="" xmlns:a14="http://schemas.microsoft.com/office/drawing/2010/main">
                 <a:effectLst>
                   <a:outerShdw blurRad="63500" dist="38099" dir="2700000" algn="ctr" rotWithShape="0">
                     <a:schemeClr val="bg2">
@@ -28778,7 +29288,7 @@
           <a:effectLst/>
           <a:extLst>
             <a:ext uri="{AF507438-7753-43e0-B8FC-AC1667EBCBE1}">
-              <a14:hiddenEffects xmlns:a14="http://schemas.microsoft.com/office/drawing/2010/main" xmlns="">
+              <a14:hiddenEffects xmlns="" xmlns:a14="http://schemas.microsoft.com/office/drawing/2010/main">
                 <a:effectLst>
                   <a:outerShdw blurRad="63500" dist="38099" dir="2700000" algn="ctr" rotWithShape="0">
                     <a:schemeClr val="bg2">
@@ -28916,14 +29426,14 @@
           <a:noFill/>
           <a:extLst>
             <a:ext uri="{909E8E84-426E-40dd-AFC4-6F175D3DCCD1}">
-              <a14:hiddenFill xmlns:a14="http://schemas.microsoft.com/office/drawing/2010/main" xmlns="">
+              <a14:hiddenFill xmlns="" xmlns:a14="http://schemas.microsoft.com/office/drawing/2010/main">
                 <a:solidFill>
                   <a:srgbClr val="FFFFFF"/>
                 </a:solidFill>
               </a14:hiddenFill>
             </a:ext>
             <a:ext uri="{91240B29-F687-4f45-9708-019B960494DF}">
-              <a14:hiddenLine xmlns:a14="http://schemas.microsoft.com/office/drawing/2010/main" xmlns="" w="9525">
+              <a14:hiddenLine xmlns="" xmlns:a14="http://schemas.microsoft.com/office/drawing/2010/main" w="9525">
                 <a:solidFill>
                   <a:srgbClr val="000000"/>
                 </a:solidFill>
@@ -28933,7 +29443,7 @@
               </a14:hiddenLine>
             </a:ext>
             <a:ext uri="{FAA26D3D-D897-4be2-8F04-BA451C77F1D7}">
-              <ma14:placeholderFlag xmlns:ma14="http://schemas.microsoft.com/office/mac/drawingml/2011/main" xmlns="" val="1"/>
+              <ma14:placeholderFlag xmlns="" xmlns:ma14="http://schemas.microsoft.com/office/mac/drawingml/2011/main" val="1"/>
             </a:ext>
           </a:extLst>
         </p:spPr>
@@ -29413,14 +29923,14 @@
           <a:noFill/>
           <a:extLst>
             <a:ext uri="{909E8E84-426E-40dd-AFC4-6F175D3DCCD1}">
-              <a14:hiddenFill xmlns:a14="http://schemas.microsoft.com/office/drawing/2010/main" xmlns="">
+              <a14:hiddenFill xmlns="" xmlns:a14="http://schemas.microsoft.com/office/drawing/2010/main">
                 <a:solidFill>
                   <a:srgbClr val="FFFFFF"/>
                 </a:solidFill>
               </a14:hiddenFill>
             </a:ext>
             <a:ext uri="{91240B29-F687-4f45-9708-019B960494DF}">
-              <a14:hiddenLine xmlns:a14="http://schemas.microsoft.com/office/drawing/2010/main" xmlns="" w="9525">
+              <a14:hiddenLine xmlns="" xmlns:a14="http://schemas.microsoft.com/office/drawing/2010/main" w="9525">
                 <a:solidFill>
                   <a:srgbClr val="000000"/>
                 </a:solidFill>
@@ -29430,7 +29940,7 @@
               </a14:hiddenLine>
             </a:ext>
             <a:ext uri="{FAA26D3D-D897-4be2-8F04-BA451C77F1D7}">
-              <ma14:placeholderFlag xmlns:ma14="http://schemas.microsoft.com/office/mac/drawingml/2011/main" xmlns="" val="1"/>
+              <ma14:placeholderFlag xmlns="" xmlns:ma14="http://schemas.microsoft.com/office/mac/drawingml/2011/main" val="1"/>
             </a:ext>
           </a:extLst>
         </p:spPr>
@@ -29599,8 +30109,33 @@
             </a:r>
             <a:r>
               <a:rPr lang="de-CH"/>
-              <a:t>vgg16 and weights and sized them up through cross-validation, batch-trained , use multilabel instead of multiclass </a:t>
-            </a:r>
+              <a:t>vgg16 and </a:t>
+            </a:r>
+            <a:r>
+              <a:rPr lang="de-CH" smtClean="0"/>
+              <a:t>weights, batch-trained, in the future use </a:t>
+            </a:r>
+            <a:r>
+              <a:rPr lang="de-CH"/>
+              <a:t>multilabel instead of </a:t>
+            </a:r>
+            <a:r>
+              <a:rPr lang="de-CH"/>
+              <a:t>multiclass</a:t>
+            </a:r>
+            <a:r>
+              <a:rPr lang="de-CH"/>
+              <a:t>, </a:t>
+            </a:r>
+            <a:r>
+              <a:rPr lang="de-CH" smtClean="0"/>
+              <a:t>size models </a:t>
+            </a:r>
+            <a:r>
+              <a:rPr lang="de-CH"/>
+              <a:t>up through cross-validation</a:t>
+            </a:r>
+            <a:endParaRPr lang="de-CH"/>
           </a:p>
           <a:p>
             <a:pPr marL="285750" indent="-285750">
@@ -29674,14 +30209,14 @@
           <a:noFill/>
           <a:extLst>
             <a:ext uri="{909E8E84-426E-40dd-AFC4-6F175D3DCCD1}">
-              <a14:hiddenFill xmlns:a14="http://schemas.microsoft.com/office/drawing/2010/main" xmlns="">
+              <a14:hiddenFill xmlns="" xmlns:a14="http://schemas.microsoft.com/office/drawing/2010/main">
                 <a:solidFill>
                   <a:srgbClr val="FFFFFF"/>
                 </a:solidFill>
               </a14:hiddenFill>
             </a:ext>
             <a:ext uri="{91240B29-F687-4f45-9708-019B960494DF}">
-              <a14:hiddenLine xmlns:a14="http://schemas.microsoft.com/office/drawing/2010/main" xmlns="" w="9525">
+              <a14:hiddenLine xmlns="" xmlns:a14="http://schemas.microsoft.com/office/drawing/2010/main" w="9525">
                 <a:solidFill>
                   <a:srgbClr val="000000"/>
                 </a:solidFill>
@@ -29691,7 +30226,7 @@
               </a14:hiddenLine>
             </a:ext>
             <a:ext uri="{FAA26D3D-D897-4be2-8F04-BA451C77F1D7}">
-              <ma14:placeholderFlag xmlns:ma14="http://schemas.microsoft.com/office/mac/drawingml/2011/main" xmlns="" val="1"/>
+              <ma14:placeholderFlag xmlns="" xmlns:ma14="http://schemas.microsoft.com/office/mac/drawingml/2011/main" val="1"/>
             </a:ext>
           </a:extLst>
         </p:spPr>
@@ -29781,14 +30316,14 @@
           <a:noFill/>
           <a:extLst>
             <a:ext uri="{909E8E84-426E-40dd-AFC4-6F175D3DCCD1}">
-              <a14:hiddenFill xmlns:a14="http://schemas.microsoft.com/office/drawing/2010/main" xmlns="">
+              <a14:hiddenFill xmlns="" xmlns:a14="http://schemas.microsoft.com/office/drawing/2010/main">
                 <a:solidFill>
                   <a:srgbClr val="FFFFFF"/>
                 </a:solidFill>
               </a14:hiddenFill>
             </a:ext>
             <a:ext uri="{91240B29-F687-4f45-9708-019B960494DF}">
-              <a14:hiddenLine xmlns:a14="http://schemas.microsoft.com/office/drawing/2010/main" xmlns="" w="9525">
+              <a14:hiddenLine xmlns="" xmlns:a14="http://schemas.microsoft.com/office/drawing/2010/main" w="9525">
                 <a:solidFill>
                   <a:srgbClr val="000000"/>
                 </a:solidFill>
@@ -29876,14 +30411,14 @@
           <a:noFill/>
           <a:extLst>
             <a:ext uri="{909E8E84-426E-40dd-AFC4-6F175D3DCCD1}">
-              <a14:hiddenFill xmlns:a14="http://schemas.microsoft.com/office/drawing/2010/main" xmlns="">
+              <a14:hiddenFill xmlns="" xmlns:a14="http://schemas.microsoft.com/office/drawing/2010/main">
                 <a:solidFill>
                   <a:srgbClr val="FFFFFF"/>
                 </a:solidFill>
               </a14:hiddenFill>
             </a:ext>
             <a:ext uri="{91240B29-F687-4f45-9708-019B960494DF}">
-              <a14:hiddenLine xmlns:a14="http://schemas.microsoft.com/office/drawing/2010/main" xmlns="" w="9525">
+              <a14:hiddenLine xmlns="" xmlns:a14="http://schemas.microsoft.com/office/drawing/2010/main" w="9525">
                 <a:solidFill>
                   <a:srgbClr val="000000"/>
                 </a:solidFill>
@@ -30227,7 +30762,7 @@
         <a:effectLst/>
         <a:extLst>
           <a:ext uri="{AF507438-7753-43e0-B8FC-AC1667EBCBE1}">
-            <a14:hiddenEffects xmlns:a14="http://schemas.microsoft.com/office/drawing/2010/main" xmlns="">
+            <a14:hiddenEffects xmlns="" xmlns:a14="http://schemas.microsoft.com/office/drawing/2010/main">
               <a:effectLst>
                 <a:outerShdw blurRad="63500" dist="38099" dir="2700000" algn="ctr" rotWithShape="0">
                   <a:schemeClr val="bg2">
@@ -30305,7 +30840,7 @@
         <a:effectLst/>
         <a:extLst>
           <a:ext uri="{AF507438-7753-43e0-B8FC-AC1667EBCBE1}">
-            <a14:hiddenEffects xmlns:a14="http://schemas.microsoft.com/office/drawing/2010/main" xmlns="">
+            <a14:hiddenEffects xmlns="" xmlns:a14="http://schemas.microsoft.com/office/drawing/2010/main">
               <a:effectLst>
                 <a:outerShdw blurRad="63500" dist="38099" dir="2700000" algn="ctr" rotWithShape="0">
                   <a:schemeClr val="bg2">

</xml_diff>

<commit_message>
san pellegrino vs evian update
</commit_message>
<xml_diff>
--- a/about_me/Visual Listening In_Draft_LS.pptx
+++ b/about_me/Visual Listening In_Draft_LS.pptx
@@ -14053,7 +14053,7 @@
             <a:fld id="{1766B9EA-E083-A94D-96A5-C5476B884CFE}" type="datetime1">
               <a:rPr lang="en-US"/>
               <a:pPr/>
-              <a:t>4/21/2020</a:t>
+              <a:t>4/22/2020</a:t>
             </a:fld>
             <a:endParaRPr lang="en-US"/>
           </a:p>
@@ -14244,7 +14244,7 @@
             <a:fld id="{3598794E-35F3-8D48-B244-F21DA91EADA9}" type="datetime1">
               <a:rPr lang="en-US"/>
               <a:pPr/>
-              <a:t>4/21/2020</a:t>
+              <a:t>4/22/2020</a:t>
             </a:fld>
             <a:endParaRPr lang="en-US"/>
           </a:p>
@@ -14688,19 +14688,7 @@
                 <a:ea typeface="MS PGothic" panose="020B0600070205080204" pitchFamily="34" charset="-128"/>
                 <a:cs typeface="MS PGothic" charset="0"/>
               </a:rPr>
-              <a:t>study </a:t>
-            </a:r>
-            <a:r>
-              <a:rPr lang="en-US" sz="1200" kern="1200" baseline="0" smtClean="0">
-                <a:solidFill>
-                  <a:schemeClr val="tx1"/>
-                </a:solidFill>
-                <a:effectLst/>
-                <a:latin typeface="+mn-lt"/>
-                <a:ea typeface="MS PGothic" panose="020B0600070205080204" pitchFamily="34" charset="-128"/>
-                <a:cs typeface="MS PGothic" charset="0"/>
-              </a:rPr>
-              <a:t>done by </a:t>
+              <a:t>study done by </a:t>
             </a:r>
             <a:r>
               <a:rPr lang="en-US" sz="1200" kern="1200" smtClean="0">
@@ -15164,7 +15152,9 @@
         </p:nvSpPr>
         <p:spPr/>
         <p:txBody>
-          <a:bodyPr/>
+          <a:bodyPr>
+            <a:normAutofit lnSpcReduction="10000"/>
+          </a:bodyPr>
           <a:lstStyle/>
           <a:p>
             <a:r>
@@ -15185,8 +15175,37 @@
           <a:p>
             <a:r>
               <a:rPr lang="de-CH" baseline="0" smtClean="0"/>
-              <a:t>For example, San Pellegrino’s officialy aims to come across as healthy and fun in the images they release on their Instagram channel. However, an official take of their images reveals that their brand is not considered as healthy as much as it is for being perceived as fun. </a:t>
-            </a:r>
+              <a:t>For example, San Pellegrino’s officialy aims to come across as healthy and fun in the images they release on their Instagram </a:t>
+            </a:r>
+            <a:r>
+              <a:rPr lang="de-CH" baseline="0" smtClean="0"/>
+              <a:t>channel at will. </a:t>
+            </a:r>
+            <a:r>
+              <a:rPr lang="de-CH" baseline="0" smtClean="0"/>
+              <a:t>However, an </a:t>
+            </a:r>
+            <a:r>
+              <a:rPr lang="de-CH" baseline="0" smtClean="0"/>
+              <a:t>unofficial </a:t>
+            </a:r>
+            <a:r>
+              <a:rPr lang="de-CH" baseline="0" smtClean="0"/>
+              <a:t>take of their images reveals that their brand is not considered as </a:t>
+            </a:r>
+            <a:r>
+              <a:rPr lang="de-CH" baseline="0" smtClean="0"/>
+              <a:t>fun </a:t>
+            </a:r>
+            <a:r>
+              <a:rPr lang="de-CH" baseline="0" smtClean="0"/>
+              <a:t>as much as it is for being perceived as </a:t>
+            </a:r>
+            <a:r>
+              <a:rPr lang="de-CH" baseline="0" smtClean="0"/>
+              <a:t>healthy. There is much more polarization in the unofficial brand perception than there is with the official image.  </a:t>
+            </a:r>
+            <a:endParaRPr lang="de-CH" baseline="0" smtClean="0"/>
           </a:p>
           <a:p>
             <a:r>
@@ -15199,15 +15218,32 @@
               <a:rPr lang="de-CH" baseline="0" smtClean="0"/>
               <a:t>Our webtool can be used to benchmark different brands for a cross-over, comparative analysis of brand personalities. </a:t>
             </a:r>
+            <a:r>
+              <a:rPr lang="de-CH" baseline="0" smtClean="0"/>
+              <a:t>For instance, San Pellegrino could be compared to Evian, an other fresh water supplier on the beverages market. We analyze both brand profiles to acknolwedge that unofficially, Evian is perceived as less healthy than San Pellegrino. However, officially, the reverse is true in both brands’ marketing efforts: San Pellegrino falls back less on making their brand appear healthy than Evian. </a:t>
+            </a:r>
+            <a:endParaRPr lang="de-CH" baseline="0" smtClean="0"/>
           </a:p>
           <a:p>
             <a:r>
               <a:rPr lang="de-CH" smtClean="0"/>
-              <a:t>Boosting</a:t>
+              <a:t>Also, boosting</a:t>
             </a:r>
             <a:r>
               <a:rPr lang="de-CH" baseline="0" smtClean="0"/>
-              <a:t> the coporate image relies on a solid analysis of one’s brand’s standing in its respective market sector. </a:t>
+              <a:t> </a:t>
+            </a:r>
+            <a:r>
+              <a:rPr lang="de-CH" baseline="0" smtClean="0"/>
+              <a:t>the coporate image </a:t>
+            </a:r>
+            <a:r>
+              <a:rPr lang="de-CH" baseline="0" smtClean="0"/>
+              <a:t>should not go without reliance </a:t>
+            </a:r>
+            <a:r>
+              <a:rPr lang="de-CH" baseline="0" smtClean="0"/>
+              <a:t>on a solid analysis of one’s brand’s standing in its respective market sector. </a:t>
             </a:r>
           </a:p>
           <a:p>
@@ -15363,15 +15399,7 @@
                 <a:ea typeface="ヒラギノ角ゴ ProN W3" charset="0"/>
                 <a:cs typeface="Source Sans Pro Light" charset="0"/>
               </a:rPr>
-              <a:t>Machine </a:t>
-            </a:r>
-            <a:r>
-              <a:rPr lang="de-CH" b="1" i="0" smtClean="0">
-                <a:latin typeface="Source Sans Pro Light" charset="0"/>
-                <a:ea typeface="ヒラギノ角ゴ ProN W3" charset="0"/>
-                <a:cs typeface="Source Sans Pro Light" charset="0"/>
-              </a:rPr>
-              <a:t>Learning</a:t>
+              <a:t>Machine Learning</a:t>
             </a:r>
             <a:r>
               <a:rPr lang="de-CH" smtClean="0">
@@ -15525,11 +15553,7 @@
           <a:p>
             <a:r>
               <a:rPr lang="en-US" smtClean="0"/>
-              <a:t>one </a:t>
-            </a:r>
-            <a:r>
-              <a:rPr lang="en-US" smtClean="0"/>
-              <a:t>vs rest approach of multiclass classification, we need to create 4 classifiers one for each attribute.</a:t>
+              <a:t>one vs rest approach of multiclass classification, we need to create 4 classifiers one for each attribute.</a:t>
             </a:r>
             <a:endParaRPr lang="en-US"/>
           </a:p>
@@ -15614,7 +15638,7 @@
         <p:spPr/>
         <p:txBody>
           <a:bodyPr>
-            <a:normAutofit lnSpcReduction="10000"/>
+            <a:normAutofit fontScale="77500" lnSpcReduction="20000"/>
           </a:bodyPr>
           <a:lstStyle/>
           <a:p>
@@ -15756,15 +15780,7 @@
             </a:r>
             <a:r>
               <a:rPr lang="de-CH" smtClean="0"/>
-              <a:t> calm</a:t>
-            </a:r>
-            <a:r>
-              <a:rPr lang="de-CH" smtClean="0"/>
-              <a:t>, cheerful, confident, creative, exciting, fiery, happy, intelligent, natural, reliable, strong, </a:t>
-            </a:r>
-            <a:r>
-              <a:rPr lang="de-CH" smtClean="0"/>
-              <a:t>wholesome.</a:t>
+              <a:t> calm, cheerful, confident, creative, exciting, fiery, happy, intelligent, natural, reliable, strong, wholesome.</a:t>
             </a:r>
             <a:r>
               <a:rPr lang="de-CH" baseline="0" smtClean="0"/>
@@ -15819,47 +15835,7 @@
             </a:r>
             <a:r>
               <a:rPr lang="en-US" smtClean="0"/>
-              <a:t>This </a:t>
-            </a:r>
-            <a:r>
-              <a:rPr lang="en-US" smtClean="0"/>
-              <a:t>is the reason why </a:t>
-            </a:r>
-            <a:r>
-              <a:rPr lang="en-US" smtClean="0"/>
-              <a:t>we considered to provide </a:t>
-            </a:r>
-            <a:r>
-              <a:rPr lang="en-US" smtClean="0"/>
-              <a:t>only </a:t>
-            </a:r>
-            <a:r>
-              <a:rPr lang="en-US" smtClean="0"/>
-              <a:t>brands </a:t>
-            </a:r>
-            <a:r>
-              <a:rPr lang="en-US" smtClean="0"/>
-              <a:t>that are listed in </a:t>
-            </a:r>
-            <a:r>
-              <a:rPr lang="en-US" smtClean="0"/>
-              <a:t>a dataframe </a:t>
-            </a:r>
-            <a:r>
-              <a:rPr lang="en-US" smtClean="0"/>
-              <a:t>and </a:t>
-            </a:r>
-            <a:r>
-              <a:rPr lang="en-US" smtClean="0"/>
-              <a:t>no </a:t>
-            </a:r>
-            <a:r>
-              <a:rPr lang="en-US" smtClean="0"/>
-              <a:t>other </a:t>
-            </a:r>
-            <a:r>
-              <a:rPr lang="en-US" smtClean="0"/>
-              <a:t>brands. But finally, we chose to let the user look up the exact Instagram account name</a:t>
+              <a:t>This is the reason why we considered to provide only brands that are listed in a dataframe and no other brands. But finally, we chose to let the user look up the exact Instagram account name</a:t>
             </a:r>
             <a:r>
               <a:rPr lang="en-US" baseline="0" smtClean="0"/>
@@ -15914,23 +15890,7 @@
             </a:r>
             <a:r>
               <a:rPr lang="en-US" smtClean="0"/>
-              <a:t>respecting </a:t>
-            </a:r>
-            <a:r>
-              <a:rPr lang="en-US" smtClean="0"/>
-              <a:t>user’s rights when downloading copyrighted content </a:t>
-            </a:r>
-            <a:r>
-              <a:rPr lang="en-US" smtClean="0"/>
-              <a:t>or </a:t>
-            </a:r>
-            <a:r>
-              <a:rPr lang="en-US" smtClean="0"/>
-              <a:t>not using images/videos from Instagram for commercial </a:t>
-            </a:r>
-            <a:r>
-              <a:rPr lang="en-US" smtClean="0"/>
-              <a:t>intent. Although the web tool is meant for commercial use, the project’s outer make-up will make any real-world</a:t>
+              <a:t>respecting user’s rights when downloading copyrighted content or not using images/videos from Instagram for commercial intent. Although the web tool is meant for commercial use, the project’s outer make-up will make any real-world</a:t>
             </a:r>
             <a:r>
               <a:rPr lang="en-US" baseline="0" smtClean="0"/>
@@ -15978,15 +15938,7 @@
             </a:pPr>
             <a:r>
               <a:rPr lang="en-US" smtClean="0"/>
-              <a:t>The reason we could not deploy the webtool on the Google App Engine is because of a time-out </a:t>
-            </a:r>
-            <a:r>
-              <a:rPr lang="en-US" smtClean="0"/>
-              <a:t>'502 bad gateway' </a:t>
-            </a:r>
-            <a:r>
-              <a:rPr lang="en-US" smtClean="0"/>
-              <a:t>error or a credit card details demand</a:t>
+              <a:t>The reason we could not deploy the webtool on the Google App Engine is because of a time-out '502 bad gateway' error or a credit card details demand</a:t>
             </a:r>
             <a:r>
               <a:rPr lang="en-US" baseline="0" smtClean="0"/>
@@ -16037,15 +15989,7 @@
             </a:pPr>
             <a:r>
               <a:rPr lang="de-CH" smtClean="0"/>
-              <a:t>Our preset </a:t>
-            </a:r>
-            <a:r>
-              <a:rPr lang="de-CH" smtClean="0"/>
-              <a:t>time horizon </a:t>
-            </a:r>
-            <a:r>
-              <a:rPr lang="de-CH" smtClean="0"/>
-              <a:t>did</a:t>
+              <a:t>Our preset time horizon did</a:t>
             </a:r>
             <a:r>
               <a:rPr lang="de-CH" baseline="0" smtClean="0"/>
@@ -16053,15 +15997,7 @@
             </a:r>
             <a:r>
               <a:rPr lang="de-CH" smtClean="0"/>
-              <a:t>we tentatively  considered a multimedia </a:t>
-            </a:r>
-            <a:r>
-              <a:rPr lang="de-CH" smtClean="0"/>
-              <a:t>document embedding </a:t>
-            </a:r>
-            <a:r>
-              <a:rPr lang="de-CH" smtClean="0"/>
-              <a:t>for our webtool – showing both official and unofficial Instagram images with</a:t>
+              <a:t>we tentatively  considered a multimedia document embedding for our webtool – showing both official and unofficial Instagram images with</a:t>
             </a:r>
             <a:r>
               <a:rPr lang="de-CH" baseline="0" smtClean="0"/>
@@ -16683,7 +16619,7 @@
           </a:ln>
           <a:extLst>
             <a:ext uri="{91240B29-F687-4f45-9708-019B960494DF}">
-              <a14:hiddenLine xmlns="" xmlns:a14="http://schemas.microsoft.com/office/drawing/2010/main" w="9525">
+              <a14:hiddenLine xmlns:a14="http://schemas.microsoft.com/office/drawing/2010/main" xmlns="" w="9525">
                 <a:solidFill>
                   <a:srgbClr val="000000"/>
                 </a:solidFill>
@@ -16843,7 +16779,7 @@
           <a:graphicData uri="http://schemas.openxmlformats.org/presentationml/2006/ole">
             <mc:AlternateContent xmlns:mc="http://schemas.openxmlformats.org/markup-compatibility/2006">
               <mc:Choice xmlns:v="urn:schemas-microsoft-com:vml" Requires="v">
-                <p:oleObj spid="_x0000_s27836" name="think-cell Slide" r:id="rId7" imgW="38100" imgH="38100" progId="TCLayout.ActiveDocument.1">
+                <p:oleObj spid="_x0000_s27840" name="think-cell Slide" r:id="rId7" imgW="38100" imgH="38100" progId="TCLayout.ActiveDocument.1">
                   <p:embed/>
                 </p:oleObj>
               </mc:Choice>
@@ -16885,14 +16821,14 @@
                       </a:ln>
                       <a:extLst>
                         <a:ext uri="{909E8E84-426E-40dd-AFC4-6F175D3DCCD1}">
-                          <a14:hiddenFill xmlns="" xmlns:a14="http://schemas.microsoft.com/office/drawing/2010/main">
+                          <a14:hiddenFill xmlns:a14="http://schemas.microsoft.com/office/drawing/2010/main" xmlns="">
                             <a:solidFill>
                               <a:srgbClr val="FFFFFF"/>
                             </a:solidFill>
                           </a14:hiddenFill>
                         </a:ext>
                         <a:ext uri="{91240B29-F687-4f45-9708-019B960494DF}">
-                          <a14:hiddenLine xmlns="" xmlns:a14="http://schemas.microsoft.com/office/drawing/2010/main" w="9525">
+                          <a14:hiddenLine xmlns:a14="http://schemas.microsoft.com/office/drawing/2010/main" xmlns="" w="9525">
                             <a:solidFill>
                               <a:srgbClr val="000000"/>
                             </a:solidFill>
@@ -17375,14 +17311,14 @@
           </a:ln>
           <a:extLst>
             <a:ext uri="{909E8E84-426E-40dd-AFC4-6F175D3DCCD1}">
-              <a14:hiddenFill xmlns="" xmlns:a14="http://schemas.microsoft.com/office/drawing/2010/main">
+              <a14:hiddenFill xmlns:a14="http://schemas.microsoft.com/office/drawing/2010/main" xmlns="">
                 <a:solidFill>
                   <a:srgbClr val="FFFFFF"/>
                 </a:solidFill>
               </a14:hiddenFill>
             </a:ext>
             <a:ext uri="{91240B29-F687-4f45-9708-019B960494DF}">
-              <a14:hiddenLine xmlns="" xmlns:a14="http://schemas.microsoft.com/office/drawing/2010/main" w="9525">
+              <a14:hiddenLine xmlns:a14="http://schemas.microsoft.com/office/drawing/2010/main" xmlns="" w="9525">
                 <a:solidFill>
                   <a:srgbClr val="000000"/>
                 </a:solidFill>
@@ -17573,7 +17509,7 @@
           </a:ln>
           <a:extLst>
             <a:ext uri="{91240B29-F687-4f45-9708-019B960494DF}">
-              <a14:hiddenLine xmlns="" xmlns:a14="http://schemas.microsoft.com/office/drawing/2010/main" w="9525">
+              <a14:hiddenLine xmlns:a14="http://schemas.microsoft.com/office/drawing/2010/main" xmlns="" w="9525">
                 <a:solidFill>
                   <a:srgbClr val="000000"/>
                 </a:solidFill>
@@ -17733,7 +17669,7 @@
           <a:graphicData uri="http://schemas.openxmlformats.org/presentationml/2006/ole">
             <mc:AlternateContent xmlns:mc="http://schemas.openxmlformats.org/markup-compatibility/2006">
               <mc:Choice xmlns:v="urn:schemas-microsoft-com:vml" Requires="v">
-                <p:oleObj spid="_x0000_s28860" name="think-cell Slide" r:id="rId7" imgW="38100" imgH="38100" progId="TCLayout.ActiveDocument.1">
+                <p:oleObj spid="_x0000_s28864" name="think-cell Slide" r:id="rId7" imgW="38100" imgH="38100" progId="TCLayout.ActiveDocument.1">
                   <p:embed/>
                 </p:oleObj>
               </mc:Choice>
@@ -17775,14 +17711,14 @@
                       </a:ln>
                       <a:extLst>
                         <a:ext uri="{909E8E84-426E-40dd-AFC4-6F175D3DCCD1}">
-                          <a14:hiddenFill xmlns="" xmlns:a14="http://schemas.microsoft.com/office/drawing/2010/main">
+                          <a14:hiddenFill xmlns:a14="http://schemas.microsoft.com/office/drawing/2010/main" xmlns="">
                             <a:solidFill>
                               <a:srgbClr val="FFFFFF"/>
                             </a:solidFill>
                           </a14:hiddenFill>
                         </a:ext>
                         <a:ext uri="{91240B29-F687-4f45-9708-019B960494DF}">
-                          <a14:hiddenLine xmlns="" xmlns:a14="http://schemas.microsoft.com/office/drawing/2010/main" w="9525">
+                          <a14:hiddenLine xmlns:a14="http://schemas.microsoft.com/office/drawing/2010/main" xmlns="" w="9525">
                             <a:solidFill>
                               <a:srgbClr val="000000"/>
                             </a:solidFill>
@@ -18265,14 +18201,14 @@
           </a:ln>
           <a:extLst>
             <a:ext uri="{909E8E84-426E-40dd-AFC4-6F175D3DCCD1}">
-              <a14:hiddenFill xmlns="" xmlns:a14="http://schemas.microsoft.com/office/drawing/2010/main">
+              <a14:hiddenFill xmlns:a14="http://schemas.microsoft.com/office/drawing/2010/main" xmlns="">
                 <a:solidFill>
                   <a:srgbClr val="FFFFFF"/>
                 </a:solidFill>
               </a14:hiddenFill>
             </a:ext>
             <a:ext uri="{91240B29-F687-4f45-9708-019B960494DF}">
-              <a14:hiddenLine xmlns="" xmlns:a14="http://schemas.microsoft.com/office/drawing/2010/main" w="9525">
+              <a14:hiddenLine xmlns:a14="http://schemas.microsoft.com/office/drawing/2010/main" xmlns="" w="9525">
                 <a:solidFill>
                   <a:srgbClr val="000000"/>
                 </a:solidFill>
@@ -18477,14 +18413,14 @@
           </a:ln>
           <a:extLst>
             <a:ext uri="{909E8E84-426E-40dd-AFC4-6F175D3DCCD1}">
-              <a14:hiddenFill xmlns="" xmlns:a14="http://schemas.microsoft.com/office/drawing/2010/main">
+              <a14:hiddenFill xmlns:a14="http://schemas.microsoft.com/office/drawing/2010/main" xmlns="">
                 <a:solidFill>
                   <a:srgbClr val="FFFFFF"/>
                 </a:solidFill>
               </a14:hiddenFill>
             </a:ext>
             <a:ext uri="{91240B29-F687-4f45-9708-019B960494DF}">
-              <a14:hiddenLine xmlns="" xmlns:a14="http://schemas.microsoft.com/office/drawing/2010/main" w="9525">
+              <a14:hiddenLine xmlns:a14="http://schemas.microsoft.com/office/drawing/2010/main" xmlns="" w="9525">
                 <a:solidFill>
                   <a:srgbClr val="000000"/>
                 </a:solidFill>
@@ -21592,14 +21528,14 @@
           </a:ln>
           <a:extLst>
             <a:ext uri="{909E8E84-426E-40dd-AFC4-6F175D3DCCD1}">
-              <a14:hiddenFill xmlns="" xmlns:a14="http://schemas.microsoft.com/office/drawing/2010/main">
+              <a14:hiddenFill xmlns:a14="http://schemas.microsoft.com/office/drawing/2010/main" xmlns="">
                 <a:solidFill>
                   <a:srgbClr val="FFFFFF"/>
                 </a:solidFill>
               </a14:hiddenFill>
             </a:ext>
             <a:ext uri="{91240B29-F687-4f45-9708-019B960494DF}">
-              <a14:hiddenLine xmlns="" xmlns:a14="http://schemas.microsoft.com/office/drawing/2010/main" w="9525">
+              <a14:hiddenLine xmlns:a14="http://schemas.microsoft.com/office/drawing/2010/main" xmlns="" w="9525">
                 <a:solidFill>
                   <a:srgbClr val="000000"/>
                 </a:solidFill>
@@ -22294,7 +22230,7 @@
           </a:xfrm>
           <a:extLst>
             <a:ext uri="{91240B29-F687-4f45-9708-019B960494DF}">
-              <a14:hiddenLine xmlns="" xmlns:a14="http://schemas.microsoft.com/office/drawing/2010/main" w="9525">
+              <a14:hiddenLine xmlns:a14="http://schemas.microsoft.com/office/drawing/2010/main" xmlns="" w="9525">
                 <a:solidFill>
                   <a:srgbClr val="000000"/>
                 </a:solidFill>
@@ -22416,14 +22352,14 @@
           <a:noFill/>
           <a:extLst>
             <a:ext uri="{909E8E84-426E-40dd-AFC4-6F175D3DCCD1}">
-              <a14:hiddenFill xmlns="" xmlns:a14="http://schemas.microsoft.com/office/drawing/2010/main">
+              <a14:hiddenFill xmlns:a14="http://schemas.microsoft.com/office/drawing/2010/main" xmlns="">
                 <a:solidFill>
                   <a:srgbClr val="FFFFFF"/>
                 </a:solidFill>
               </a14:hiddenFill>
             </a:ext>
             <a:ext uri="{91240B29-F687-4f45-9708-019B960494DF}">
-              <a14:hiddenLine xmlns="" xmlns:a14="http://schemas.microsoft.com/office/drawing/2010/main" w="9525">
+              <a14:hiddenLine xmlns:a14="http://schemas.microsoft.com/office/drawing/2010/main" xmlns="" w="9525">
                 <a:solidFill>
                   <a:srgbClr val="000000"/>
                 </a:solidFill>
@@ -22433,7 +22369,7 @@
               </a14:hiddenLine>
             </a:ext>
             <a:ext uri="{FAA26D3D-D897-4be2-8F04-BA451C77F1D7}">
-              <ma14:placeholderFlag xmlns="" xmlns:ma14="http://schemas.microsoft.com/office/mac/drawingml/2011/main" val="1"/>
+              <ma14:placeholderFlag xmlns:ma14="http://schemas.microsoft.com/office/mac/drawingml/2011/main" xmlns="" val="1"/>
             </a:ext>
           </a:extLst>
         </p:spPr>
@@ -22491,14 +22427,14 @@
           <a:noFill/>
           <a:extLst>
             <a:ext uri="{909E8E84-426E-40dd-AFC4-6F175D3DCCD1}">
-              <a14:hiddenFill xmlns="" xmlns:a14="http://schemas.microsoft.com/office/drawing/2010/main">
+              <a14:hiddenFill xmlns:a14="http://schemas.microsoft.com/office/drawing/2010/main" xmlns="">
                 <a:solidFill>
                   <a:srgbClr val="FFFFFF"/>
                 </a:solidFill>
               </a14:hiddenFill>
             </a:ext>
             <a:ext uri="{91240B29-F687-4f45-9708-019B960494DF}">
-              <a14:hiddenLine xmlns="" xmlns:a14="http://schemas.microsoft.com/office/drawing/2010/main" w="9525">
+              <a14:hiddenLine xmlns:a14="http://schemas.microsoft.com/office/drawing/2010/main" xmlns="" w="9525">
                 <a:solidFill>
                   <a:srgbClr val="000000"/>
                 </a:solidFill>
@@ -22562,7 +22498,7 @@
           <a:effectLst/>
           <a:extLst>
             <a:ext uri="{AF507438-7753-43e0-B8FC-AC1667EBCBE1}">
-              <a14:hiddenEffects xmlns="" xmlns:a14="http://schemas.microsoft.com/office/drawing/2010/main">
+              <a14:hiddenEffects xmlns:a14="http://schemas.microsoft.com/office/drawing/2010/main" xmlns="">
                 <a:effectLst>
                   <a:outerShdw blurRad="63500" dist="38099" dir="2700000" algn="ctr" rotWithShape="0">
                     <a:schemeClr val="bg2">
@@ -22687,15 +22623,7 @@
             </a:br>
             <a:r>
               <a:rPr lang="en-US" sz="1200"/>
-              <a:t>• Add slide notes to EVERY slide of the PPTX file. These slide notes should contain your complete script for your talk</a:t>
-            </a:r>
-            <a:r>
-              <a:rPr lang="en-US" sz="1200"/>
-              <a:t>. </a:t>
-            </a:r>
-            <a:r>
-              <a:rPr lang="en-US" sz="1200"/>
-              <a:t/>
+              <a:t>• Add slide notes to EVERY slide of the PPTX file. These slide notes should contain your complete script for your talk. </a:t>
             </a:r>
             <a:br>
               <a:rPr lang="en-US" sz="1200"/>
@@ -22821,14 +22749,14 @@
           <a:noFill/>
           <a:extLst>
             <a:ext uri="{909E8E84-426E-40dd-AFC4-6F175D3DCCD1}">
-              <a14:hiddenFill xmlns="" xmlns:a14="http://schemas.microsoft.com/office/drawing/2010/main">
+              <a14:hiddenFill xmlns:a14="http://schemas.microsoft.com/office/drawing/2010/main" xmlns="">
                 <a:solidFill>
                   <a:srgbClr val="FFFFFF"/>
                 </a:solidFill>
               </a14:hiddenFill>
             </a:ext>
             <a:ext uri="{91240B29-F687-4f45-9708-019B960494DF}">
-              <a14:hiddenLine xmlns="" xmlns:a14="http://schemas.microsoft.com/office/drawing/2010/main" w="9525">
+              <a14:hiddenLine xmlns:a14="http://schemas.microsoft.com/office/drawing/2010/main" xmlns="" w="9525">
                 <a:solidFill>
                   <a:srgbClr val="000000"/>
                 </a:solidFill>
@@ -22881,14 +22809,14 @@
           <a:noFill/>
           <a:extLst>
             <a:ext uri="{909E8E84-426E-40dd-AFC4-6F175D3DCCD1}">
-              <a14:hiddenFill xmlns="" xmlns:a14="http://schemas.microsoft.com/office/drawing/2010/main">
+              <a14:hiddenFill xmlns:a14="http://schemas.microsoft.com/office/drawing/2010/main" xmlns="">
                 <a:solidFill>
                   <a:srgbClr val="FFFFFF"/>
                 </a:solidFill>
               </a14:hiddenFill>
             </a:ext>
             <a:ext uri="{91240B29-F687-4f45-9708-019B960494DF}">
-              <a14:hiddenLine xmlns="" xmlns:a14="http://schemas.microsoft.com/office/drawing/2010/main" w="9525">
+              <a14:hiddenLine xmlns:a14="http://schemas.microsoft.com/office/drawing/2010/main" xmlns="" w="9525">
                 <a:solidFill>
                   <a:srgbClr val="000000"/>
                 </a:solidFill>
@@ -23177,14 +23105,14 @@
           <a:noFill/>
           <a:extLst>
             <a:ext uri="{909E8E84-426E-40dd-AFC4-6F175D3DCCD1}">
-              <a14:hiddenFill xmlns="" xmlns:a14="http://schemas.microsoft.com/office/drawing/2010/main">
+              <a14:hiddenFill xmlns:a14="http://schemas.microsoft.com/office/drawing/2010/main" xmlns="">
                 <a:solidFill>
                   <a:srgbClr val="FFFFFF"/>
                 </a:solidFill>
               </a14:hiddenFill>
             </a:ext>
             <a:ext uri="{91240B29-F687-4f45-9708-019B960494DF}">
-              <a14:hiddenLine xmlns="" xmlns:a14="http://schemas.microsoft.com/office/drawing/2010/main" w="9525">
+              <a14:hiddenLine xmlns:a14="http://schemas.microsoft.com/office/drawing/2010/main" xmlns="" w="9525">
                 <a:solidFill>
                   <a:srgbClr val="000000"/>
                 </a:solidFill>
@@ -23194,7 +23122,7 @@
               </a14:hiddenLine>
             </a:ext>
             <a:ext uri="{FAA26D3D-D897-4be2-8F04-BA451C77F1D7}">
-              <ma14:placeholderFlag xmlns="" xmlns:ma14="http://schemas.microsoft.com/office/mac/drawingml/2011/main" val="1"/>
+              <ma14:placeholderFlag xmlns:ma14="http://schemas.microsoft.com/office/mac/drawingml/2011/main" xmlns="" val="1"/>
             </a:ext>
           </a:extLst>
         </p:spPr>
@@ -23273,14 +23201,14 @@
           <a:noFill/>
           <a:extLst>
             <a:ext uri="{909E8E84-426E-40dd-AFC4-6F175D3DCCD1}">
-              <a14:hiddenFill xmlns="" xmlns:a14="http://schemas.microsoft.com/office/drawing/2010/main">
+              <a14:hiddenFill xmlns:a14="http://schemas.microsoft.com/office/drawing/2010/main" xmlns="">
                 <a:solidFill>
                   <a:srgbClr val="FFFFFF"/>
                 </a:solidFill>
               </a14:hiddenFill>
             </a:ext>
             <a:ext uri="{91240B29-F687-4f45-9708-019B960494DF}">
-              <a14:hiddenLine xmlns="" xmlns:a14="http://schemas.microsoft.com/office/drawing/2010/main" w="9525">
+              <a14:hiddenLine xmlns:a14="http://schemas.microsoft.com/office/drawing/2010/main" xmlns="" w="9525">
                 <a:solidFill>
                   <a:srgbClr val="000000"/>
                 </a:solidFill>
@@ -23333,14 +23261,14 @@
           <a:noFill/>
           <a:extLst>
             <a:ext uri="{909E8E84-426E-40dd-AFC4-6F175D3DCCD1}">
-              <a14:hiddenFill xmlns="" xmlns:a14="http://schemas.microsoft.com/office/drawing/2010/main">
+              <a14:hiddenFill xmlns:a14="http://schemas.microsoft.com/office/drawing/2010/main" xmlns="">
                 <a:solidFill>
                   <a:srgbClr val="FFFFFF"/>
                 </a:solidFill>
               </a14:hiddenFill>
             </a:ext>
             <a:ext uri="{91240B29-F687-4f45-9708-019B960494DF}">
-              <a14:hiddenLine xmlns="" xmlns:a14="http://schemas.microsoft.com/office/drawing/2010/main" w="9525">
+              <a14:hiddenLine xmlns:a14="http://schemas.microsoft.com/office/drawing/2010/main" xmlns="" w="9525">
                 <a:solidFill>
                   <a:srgbClr val="000000"/>
                 </a:solidFill>
@@ -23738,7 +23666,7 @@
           <a:blip r:embed="rId23">
             <a:extLst>
               <a:ext uri="{96DAC541-7B7A-43D3-8B79-37D633B846F1}">
-                <asvg:svgBlip xmlns:asvg="http://schemas.microsoft.com/office/drawing/2016/SVG/main" xmlns="" r:embed="rId24"/>
+                <asvg:svgBlip xmlns="" xmlns:asvg="http://schemas.microsoft.com/office/drawing/2016/SVG/main" r:embed="rId24"/>
               </a:ext>
             </a:extLst>
           </a:blip>
@@ -23774,7 +23702,7 @@
           <a:blip r:embed="rId23">
             <a:extLst>
               <a:ext uri="{96DAC541-7B7A-43D3-8B79-37D633B846F1}">
-                <asvg:svgBlip xmlns:asvg="http://schemas.microsoft.com/office/drawing/2016/SVG/main" xmlns="" r:embed="rId24"/>
+                <asvg:svgBlip xmlns="" xmlns:asvg="http://schemas.microsoft.com/office/drawing/2016/SVG/main" r:embed="rId24"/>
               </a:ext>
             </a:extLst>
           </a:blip>
@@ -23810,7 +23738,7 @@
           <a:blip r:embed="rId25">
             <a:extLst>
               <a:ext uri="{96DAC541-7B7A-43D3-8B79-37D633B846F1}">
-                <asvg:svgBlip xmlns:asvg="http://schemas.microsoft.com/office/drawing/2016/SVG/main" xmlns="" r:embed="rId26"/>
+                <asvg:svgBlip xmlns="" xmlns:asvg="http://schemas.microsoft.com/office/drawing/2016/SVG/main" r:embed="rId26"/>
               </a:ext>
             </a:extLst>
           </a:blip>
@@ -23846,7 +23774,7 @@
           <a:blip r:embed="rId27">
             <a:extLst>
               <a:ext uri="{96DAC541-7B7A-43D3-8B79-37D633B846F1}">
-                <asvg:svgBlip xmlns:asvg="http://schemas.microsoft.com/office/drawing/2016/SVG/main" xmlns="" r:embed="rId28"/>
+                <asvg:svgBlip xmlns="" xmlns:asvg="http://schemas.microsoft.com/office/drawing/2016/SVG/main" r:embed="rId28"/>
               </a:ext>
             </a:extLst>
           </a:blip>
@@ -23882,7 +23810,7 @@
           <a:blip r:embed="rId29">
             <a:extLst>
               <a:ext uri="{96DAC541-7B7A-43D3-8B79-37D633B846F1}">
-                <asvg:svgBlip xmlns:asvg="http://schemas.microsoft.com/office/drawing/2016/SVG/main" xmlns="" r:embed="rId30"/>
+                <asvg:svgBlip xmlns="" xmlns:asvg="http://schemas.microsoft.com/office/drawing/2016/SVG/main" r:embed="rId30"/>
               </a:ext>
             </a:extLst>
           </a:blip>
@@ -23918,7 +23846,7 @@
           <a:blip r:embed="rId31">
             <a:extLst>
               <a:ext uri="{96DAC541-7B7A-43D3-8B79-37D633B846F1}">
-                <asvg:svgBlip xmlns:asvg="http://schemas.microsoft.com/office/drawing/2016/SVG/main" xmlns="" r:embed="rId32"/>
+                <asvg:svgBlip xmlns="" xmlns:asvg="http://schemas.microsoft.com/office/drawing/2016/SVG/main" r:embed="rId32"/>
               </a:ext>
             </a:extLst>
           </a:blip>
@@ -23973,7 +23901,7 @@
           <a:effectLst/>
           <a:extLst>
             <a:ext uri="{AF507438-7753-43e0-B8FC-AC1667EBCBE1}">
-              <a14:hiddenEffects xmlns="" xmlns:a14="http://schemas.microsoft.com/office/drawing/2010/main">
+              <a14:hiddenEffects xmlns:a14="http://schemas.microsoft.com/office/drawing/2010/main" xmlns="">
                 <a:effectLst>
                   <a:outerShdw blurRad="63500" dist="38099" dir="2700000" algn="ctr" rotWithShape="0">
                     <a:schemeClr val="bg2">
@@ -24098,7 +24026,7 @@
           <a:effectLst/>
           <a:extLst>
             <a:ext uri="{AF507438-7753-43e0-B8FC-AC1667EBCBE1}">
-              <a14:hiddenEffects xmlns="" xmlns:a14="http://schemas.microsoft.com/office/drawing/2010/main">
+              <a14:hiddenEffects xmlns:a14="http://schemas.microsoft.com/office/drawing/2010/main" xmlns="">
                 <a:effectLst>
                   <a:outerShdw blurRad="63500" dist="38099" dir="2700000" algn="ctr" rotWithShape="0">
                     <a:schemeClr val="bg2">
@@ -24190,7 +24118,7 @@
           <a:effectLst/>
           <a:extLst>
             <a:ext uri="{AF507438-7753-43e0-B8FC-AC1667EBCBE1}">
-              <a14:hiddenEffects xmlns="" xmlns:a14="http://schemas.microsoft.com/office/drawing/2010/main">
+              <a14:hiddenEffects xmlns:a14="http://schemas.microsoft.com/office/drawing/2010/main" xmlns="">
                 <a:effectLst>
                   <a:outerShdw blurRad="63500" dist="38099" dir="2700000" algn="ctr" rotWithShape="0">
                     <a:schemeClr val="bg2">
@@ -24343,7 +24271,7 @@
           <a:blip r:embed="rId33">
             <a:extLst>
               <a:ext uri="{96DAC541-7B7A-43D3-8B79-37D633B846F1}">
-                <asvg:svgBlip xmlns:asvg="http://schemas.microsoft.com/office/drawing/2016/SVG/main" xmlns="" r:embed="rId34"/>
+                <asvg:svgBlip xmlns="" xmlns:asvg="http://schemas.microsoft.com/office/drawing/2016/SVG/main" r:embed="rId34"/>
               </a:ext>
             </a:extLst>
           </a:blip>
@@ -24380,14 +24308,14 @@
           <a:noFill/>
           <a:extLst>
             <a:ext uri="{909E8E84-426E-40dd-AFC4-6F175D3DCCD1}">
-              <a14:hiddenFill xmlns="" xmlns:a14="http://schemas.microsoft.com/office/drawing/2010/main">
+              <a14:hiddenFill xmlns:a14="http://schemas.microsoft.com/office/drawing/2010/main" xmlns="">
                 <a:solidFill>
                   <a:srgbClr val="FFFFFF"/>
                 </a:solidFill>
               </a14:hiddenFill>
             </a:ext>
             <a:ext uri="{91240B29-F687-4f45-9708-019B960494DF}">
-              <a14:hiddenLine xmlns="" xmlns:a14="http://schemas.microsoft.com/office/drawing/2010/main" w="9525">
+              <a14:hiddenLine xmlns:a14="http://schemas.microsoft.com/office/drawing/2010/main" xmlns="" w="9525">
                 <a:solidFill>
                   <a:srgbClr val="000000"/>
                 </a:solidFill>
@@ -24397,7 +24325,7 @@
               </a14:hiddenLine>
             </a:ext>
             <a:ext uri="{FAA26D3D-D897-4be2-8F04-BA451C77F1D7}">
-              <ma14:placeholderFlag xmlns="" xmlns:ma14="http://schemas.microsoft.com/office/mac/drawingml/2011/main" val="1"/>
+              <ma14:placeholderFlag xmlns:ma14="http://schemas.microsoft.com/office/mac/drawingml/2011/main" xmlns="" val="1"/>
             </a:ext>
           </a:extLst>
         </p:spPr>
@@ -25249,14 +25177,14 @@
           <a:noFill/>
           <a:extLst>
             <a:ext uri="{909E8E84-426E-40dd-AFC4-6F175D3DCCD1}">
-              <a14:hiddenFill xmlns="" xmlns:a14="http://schemas.microsoft.com/office/drawing/2010/main">
+              <a14:hiddenFill xmlns:a14="http://schemas.microsoft.com/office/drawing/2010/main" xmlns="">
                 <a:solidFill>
                   <a:srgbClr val="FFFFFF"/>
                 </a:solidFill>
               </a14:hiddenFill>
             </a:ext>
             <a:ext uri="{91240B29-F687-4f45-9708-019B960494DF}">
-              <a14:hiddenLine xmlns="" xmlns:a14="http://schemas.microsoft.com/office/drawing/2010/main" w="9525">
+              <a14:hiddenLine xmlns:a14="http://schemas.microsoft.com/office/drawing/2010/main" xmlns="" w="9525">
                 <a:solidFill>
                   <a:srgbClr val="000000"/>
                 </a:solidFill>
@@ -25365,14 +25293,14 @@
           <a:noFill/>
           <a:extLst>
             <a:ext uri="{909E8E84-426E-40dd-AFC4-6F175D3DCCD1}">
-              <a14:hiddenFill xmlns="" xmlns:a14="http://schemas.microsoft.com/office/drawing/2010/main">
+              <a14:hiddenFill xmlns:a14="http://schemas.microsoft.com/office/drawing/2010/main" xmlns="">
                 <a:solidFill>
                   <a:srgbClr val="FFFFFF"/>
                 </a:solidFill>
               </a14:hiddenFill>
             </a:ext>
             <a:ext uri="{91240B29-F687-4f45-9708-019B960494DF}">
-              <a14:hiddenLine xmlns="" xmlns:a14="http://schemas.microsoft.com/office/drawing/2010/main" w="9525">
+              <a14:hiddenLine xmlns:a14="http://schemas.microsoft.com/office/drawing/2010/main" xmlns="" w="9525">
                 <a:solidFill>
                   <a:srgbClr val="000000"/>
                 </a:solidFill>
@@ -25382,7 +25310,7 @@
               </a14:hiddenLine>
             </a:ext>
             <a:ext uri="{FAA26D3D-D897-4be2-8F04-BA451C77F1D7}">
-              <ma14:placeholderFlag xmlns="" xmlns:ma14="http://schemas.microsoft.com/office/mac/drawingml/2011/main" val="1"/>
+              <ma14:placeholderFlag xmlns:ma14="http://schemas.microsoft.com/office/mac/drawingml/2011/main" xmlns="" val="1"/>
             </a:ext>
           </a:extLst>
         </p:spPr>
@@ -25658,7 +25586,7 @@
         </p:nvSpPr>
         <p:spPr>
           <a:xfrm>
-            <a:off x="4189662" y="2217638"/>
+            <a:off x="3980892" y="2260069"/>
             <a:ext cx="7640102" cy="923330"/>
           </a:xfrm>
           <a:prstGeom prst="rect">
@@ -25684,15 +25612,42 @@
               <a:rPr lang="de-CH" sz="1800" smtClean="0">
                 <a:latin typeface="Berlin Sans FB" panose="020E0602020502020306" pitchFamily="34" charset="0"/>
               </a:rPr>
-              <a:t>Official portrayal is healthy 38% &amp; fun 42%.</a:t>
-            </a:r>
-          </a:p>
-          <a:p>
+              <a:t>Official portrayal is healthy </a:t>
+            </a:r>
             <a:r>
               <a:rPr lang="de-CH" sz="1800" smtClean="0">
                 <a:latin typeface="Berlin Sans FB" panose="020E0602020502020306" pitchFamily="34" charset="0"/>
               </a:rPr>
-              <a:t>Unofficial portrayal is fun only 52%. </a:t>
+              <a:t>41% </a:t>
+            </a:r>
+            <a:r>
+              <a:rPr lang="de-CH" sz="1800" smtClean="0">
+                <a:latin typeface="Berlin Sans FB" panose="020E0602020502020306" pitchFamily="34" charset="0"/>
+              </a:rPr>
+              <a:t>&amp; fun </a:t>
+            </a:r>
+            <a:r>
+              <a:rPr lang="de-CH" sz="1800" smtClean="0">
+                <a:latin typeface="Berlin Sans FB" panose="020E0602020502020306" pitchFamily="34" charset="0"/>
+              </a:rPr>
+              <a:t>54%.</a:t>
+            </a:r>
+            <a:endParaRPr lang="de-CH" sz="1800" smtClean="0">
+              <a:latin typeface="Berlin Sans FB" panose="020E0602020502020306" pitchFamily="34" charset="0"/>
+            </a:endParaRPr>
+          </a:p>
+          <a:p>
+            <a:r>
+              <a:rPr lang="de-CH" sz="1800" smtClean="0">
+                <a:latin typeface="Berlin Sans FB" panose="020E0602020502020306" pitchFamily="34" charset="0"/>
+              </a:rPr>
+              <a:t>Unofficial portrayal is </a:t>
+            </a:r>
+            <a:r>
+              <a:rPr lang="de-CH" sz="1800" smtClean="0">
+                <a:latin typeface="Berlin Sans FB" panose="020E0602020502020306" pitchFamily="34" charset="0"/>
+              </a:rPr>
+              <a:t>healthy 70% &amp; fun 21%. </a:t>
             </a:r>
             <a:endParaRPr lang="en-US" sz="1800">
               <a:latin typeface="Berlin Sans FB" panose="020E0602020502020306" pitchFamily="34" charset="0"/>
@@ -25750,7 +25705,7 @@
                   <a14:useLocalDpi xmlns:a14="http://schemas.microsoft.com/office/drawing/2010/main" val="0"/>
                 </a:ext>
                 <a:ext uri="{96DAC541-7B7A-43D3-8B79-37D633B846F1}">
-                  <asvg:svgBlip xmlns:lc="http://schemas.openxmlformats.org/drawingml/2006/lockedCanvas" xmlns="" xmlns:asvg="http://schemas.microsoft.com/office/drawing/2016/SVG/main" xmlns:dgm="http://schemas.openxmlformats.org/drawingml/2006/diagram" r:embed="rId5"/>
+                  <asvg:svgBlip xmlns:dgm="http://schemas.openxmlformats.org/drawingml/2006/diagram" xmlns:asvg="http://schemas.microsoft.com/office/drawing/2016/SVG/main" xmlns="" xmlns:lc="http://schemas.openxmlformats.org/drawingml/2006/lockedCanvas" r:embed="rId5"/>
                 </a:ext>
               </a:extLst>
             </a:blip>
@@ -25813,7 +25768,7 @@
                   <a14:useLocalDpi xmlns:a14="http://schemas.microsoft.com/office/drawing/2010/main" val="0"/>
                 </a:ext>
                 <a:ext uri="{96DAC541-7B7A-43D3-8B79-37D633B846F1}">
-                  <asvg:svgBlip xmlns:lc="http://schemas.openxmlformats.org/drawingml/2006/lockedCanvas" xmlns="" xmlns:asvg="http://schemas.microsoft.com/office/drawing/2016/SVG/main" xmlns:dgm="http://schemas.openxmlformats.org/drawingml/2006/diagram" r:embed="rId7"/>
+                  <asvg:svgBlip xmlns:dgm="http://schemas.openxmlformats.org/drawingml/2006/diagram" xmlns:asvg="http://schemas.microsoft.com/office/drawing/2016/SVG/main" xmlns="" xmlns:lc="http://schemas.openxmlformats.org/drawingml/2006/lockedCanvas" r:embed="rId7"/>
                 </a:ext>
               </a:extLst>
             </a:blip>
@@ -25876,7 +25831,7 @@
                   <a14:useLocalDpi xmlns:a14="http://schemas.microsoft.com/office/drawing/2010/main" val="0"/>
                 </a:ext>
                 <a:ext uri="{96DAC541-7B7A-43D3-8B79-37D633B846F1}">
-                  <asvg:svgBlip xmlns:lc="http://schemas.openxmlformats.org/drawingml/2006/lockedCanvas" xmlns="" xmlns:asvg="http://schemas.microsoft.com/office/drawing/2016/SVG/main" xmlns:dgm="http://schemas.openxmlformats.org/drawingml/2006/diagram" r:embed="rId9"/>
+                  <asvg:svgBlip xmlns:dgm="http://schemas.openxmlformats.org/drawingml/2006/diagram" xmlns:asvg="http://schemas.microsoft.com/office/drawing/2016/SVG/main" xmlns="" xmlns:lc="http://schemas.openxmlformats.org/drawingml/2006/lockedCanvas" r:embed="rId9"/>
                 </a:ext>
               </a:extLst>
             </a:blip>
@@ -26021,8 +25976,8 @@
         </p:nvSpPr>
         <p:spPr>
           <a:xfrm>
-            <a:off x="4520952" y="3655854"/>
-            <a:ext cx="7640102" cy="369332"/>
+            <a:off x="3811145" y="3605879"/>
+            <a:ext cx="7640102" cy="1200329"/>
           </a:xfrm>
           <a:prstGeom prst="rect">
             <a:avLst/>
@@ -26039,8 +25994,47 @@
               <a:rPr lang="de-CH" sz="1800" u="dotted" smtClean="0">
                 <a:latin typeface="Berlin Sans FB" panose="020E0602020502020306" pitchFamily="34" charset="0"/>
               </a:rPr>
-              <a:t>San Pellegrino vs. Evian </a:t>
-            </a:r>
+              <a:t>San Pellegrino vs. </a:t>
+            </a:r>
+            <a:r>
+              <a:rPr lang="de-CH" sz="1800" u="dotted" smtClean="0">
+                <a:latin typeface="Berlin Sans FB" panose="020E0602020502020306" pitchFamily="34" charset="0"/>
+              </a:rPr>
+              <a:t>Evian</a:t>
+            </a:r>
+          </a:p>
+          <a:p>
+            <a:r>
+              <a:rPr lang="de-CH" sz="1800" smtClean="0">
+                <a:latin typeface="Berlin Sans FB" panose="020E0602020502020306" pitchFamily="34" charset="0"/>
+              </a:rPr>
+              <a:t>Unofficially, Evian (35%) less healthy than</a:t>
+            </a:r>
+          </a:p>
+          <a:p>
+            <a:r>
+              <a:rPr lang="de-CH" sz="1800" smtClean="0">
+                <a:latin typeface="Berlin Sans FB" panose="020E0602020502020306" pitchFamily="34" charset="0"/>
+              </a:rPr>
+              <a:t>San Pellegrino (70%). Officially, San Pellegrino </a:t>
+            </a:r>
+          </a:p>
+          <a:p>
+            <a:r>
+              <a:rPr lang="de-CH" sz="1800" smtClean="0">
+                <a:latin typeface="Berlin Sans FB" panose="020E0602020502020306" pitchFamily="34" charset="0"/>
+              </a:rPr>
+              <a:t>(41%) l</a:t>
+            </a:r>
+            <a:r>
+              <a:rPr lang="de-CH" sz="1800" smtClean="0">
+                <a:latin typeface="Berlin Sans FB" panose="020E0602020502020306" pitchFamily="34" charset="0"/>
+              </a:rPr>
+              <a:t>ess healthy than Evian (59%).  </a:t>
+            </a:r>
+            <a:endParaRPr lang="de-CH" sz="1800" smtClean="0">
+              <a:latin typeface="Berlin Sans FB" panose="020E0602020502020306" pitchFamily="34" charset="0"/>
+            </a:endParaRPr>
           </a:p>
         </p:txBody>
       </p:sp>
@@ -26084,7 +26078,7 @@
         </p:blipFill>
         <p:spPr>
           <a:xfrm>
-            <a:off x="3588983" y="4149159"/>
+            <a:off x="3045500" y="4149159"/>
             <a:ext cx="639802" cy="454596"/>
           </a:xfrm>
           <a:prstGeom prst="rect">
@@ -26108,7 +26102,7 @@
         </p:blipFill>
         <p:spPr>
           <a:xfrm>
-            <a:off x="2074617" y="4142559"/>
+            <a:off x="1567400" y="4142559"/>
             <a:ext cx="1352258" cy="392381"/>
           </a:xfrm>
           <a:prstGeom prst="rect">
@@ -26163,7 +26157,7 @@
         </p:nvSpPr>
         <p:spPr>
           <a:xfrm>
-            <a:off x="1928664" y="2494637"/>
+            <a:off x="1761329" y="2506886"/>
             <a:ext cx="2268252" cy="646331"/>
           </a:xfrm>
           <a:prstGeom prst="rect">
@@ -26246,14 +26240,14 @@
           <a:noFill/>
           <a:extLst>
             <a:ext uri="{909E8E84-426E-40dd-AFC4-6F175D3DCCD1}">
-              <a14:hiddenFill xmlns="" xmlns:a14="http://schemas.microsoft.com/office/drawing/2010/main">
+              <a14:hiddenFill xmlns:a14="http://schemas.microsoft.com/office/drawing/2010/main" xmlns="">
                 <a:solidFill>
                   <a:srgbClr val="FFFFFF"/>
                 </a:solidFill>
               </a14:hiddenFill>
             </a:ext>
             <a:ext uri="{91240B29-F687-4f45-9708-019B960494DF}">
-              <a14:hiddenLine xmlns="" xmlns:a14="http://schemas.microsoft.com/office/drawing/2010/main" w="9525">
+              <a14:hiddenLine xmlns:a14="http://schemas.microsoft.com/office/drawing/2010/main" xmlns="" w="9525">
                 <a:solidFill>
                   <a:srgbClr val="000000"/>
                 </a:solidFill>
@@ -26708,7 +26702,7 @@
           <a:effectLst/>
           <a:extLst>
             <a:ext uri="{AF507438-7753-43e0-B8FC-AC1667EBCBE1}">
-              <a14:hiddenEffects xmlns="" xmlns:a14="http://schemas.microsoft.com/office/drawing/2010/main">
+              <a14:hiddenEffects xmlns:a14="http://schemas.microsoft.com/office/drawing/2010/main" xmlns="">
                 <a:effectLst>
                   <a:outerShdw blurRad="63500" dist="38099" dir="2700000" algn="ctr" rotWithShape="0">
                     <a:schemeClr val="bg2">
@@ -26835,14 +26829,14 @@
           <a:noFill/>
           <a:extLst>
             <a:ext uri="{909E8E84-426E-40dd-AFC4-6F175D3DCCD1}">
-              <a14:hiddenFill xmlns="" xmlns:a14="http://schemas.microsoft.com/office/drawing/2010/main">
+              <a14:hiddenFill xmlns:a14="http://schemas.microsoft.com/office/drawing/2010/main" xmlns="">
                 <a:solidFill>
                   <a:srgbClr val="FFFFFF"/>
                 </a:solidFill>
               </a14:hiddenFill>
             </a:ext>
             <a:ext uri="{91240B29-F687-4f45-9708-019B960494DF}">
-              <a14:hiddenLine xmlns="" xmlns:a14="http://schemas.microsoft.com/office/drawing/2010/main" w="9525">
+              <a14:hiddenLine xmlns:a14="http://schemas.microsoft.com/office/drawing/2010/main" xmlns="" w="9525">
                 <a:solidFill>
                   <a:srgbClr val="000000"/>
                 </a:solidFill>
@@ -26852,7 +26846,7 @@
               </a14:hiddenLine>
             </a:ext>
             <a:ext uri="{FAA26D3D-D897-4be2-8F04-BA451C77F1D7}">
-              <ma14:placeholderFlag xmlns="" xmlns:ma14="http://schemas.microsoft.com/office/mac/drawingml/2011/main" val="1"/>
+              <ma14:placeholderFlag xmlns:ma14="http://schemas.microsoft.com/office/mac/drawingml/2011/main" xmlns="" val="1"/>
             </a:ext>
           </a:extLst>
         </p:spPr>
@@ -27169,14 +27163,14 @@
           <a:noFill/>
           <a:extLst>
             <a:ext uri="{909E8E84-426E-40dd-AFC4-6F175D3DCCD1}">
-              <a14:hiddenFill xmlns="" xmlns:a14="http://schemas.microsoft.com/office/drawing/2010/main">
+              <a14:hiddenFill xmlns:a14="http://schemas.microsoft.com/office/drawing/2010/main" xmlns="">
                 <a:solidFill>
                   <a:srgbClr val="FFFFFF"/>
                 </a:solidFill>
               </a14:hiddenFill>
             </a:ext>
             <a:ext uri="{91240B29-F687-4f45-9708-019B960494DF}">
-              <a14:hiddenLine xmlns="" xmlns:a14="http://schemas.microsoft.com/office/drawing/2010/main" w="9525">
+              <a14:hiddenLine xmlns:a14="http://schemas.microsoft.com/office/drawing/2010/main" xmlns="" w="9525">
                 <a:solidFill>
                   <a:srgbClr val="000000"/>
                 </a:solidFill>
@@ -27296,7 +27290,7 @@
           <a:effectLst/>
           <a:extLst>
             <a:ext uri="{AF507438-7753-43e0-B8FC-AC1667EBCBE1}">
-              <a14:hiddenEffects xmlns="" xmlns:a14="http://schemas.microsoft.com/office/drawing/2010/main">
+              <a14:hiddenEffects xmlns:a14="http://schemas.microsoft.com/office/drawing/2010/main" xmlns="">
                 <a:effectLst>
                   <a:outerShdw blurRad="63500" dist="38099" dir="2700000" algn="ctr" rotWithShape="0">
                     <a:schemeClr val="bg2">
@@ -27449,7 +27443,7 @@
           <a:effectLst/>
           <a:extLst>
             <a:ext uri="{AF507438-7753-43e0-B8FC-AC1667EBCBE1}">
-              <a14:hiddenEffects xmlns="" xmlns:a14="http://schemas.microsoft.com/office/drawing/2010/main">
+              <a14:hiddenEffects xmlns:a14="http://schemas.microsoft.com/office/drawing/2010/main" xmlns="">
                 <a:effectLst>
                   <a:outerShdw blurRad="63500" dist="38099" dir="2700000" algn="ctr" rotWithShape="0">
                     <a:schemeClr val="bg2">
@@ -27540,7 +27534,7 @@
           <a:effectLst/>
           <a:extLst>
             <a:ext uri="{AF507438-7753-43e0-B8FC-AC1667EBCBE1}">
-              <a14:hiddenEffects xmlns="" xmlns:a14="http://schemas.microsoft.com/office/drawing/2010/main">
+              <a14:hiddenEffects xmlns:a14="http://schemas.microsoft.com/office/drawing/2010/main" xmlns="">
                 <a:effectLst>
                   <a:outerShdw blurRad="63500" dist="38099" dir="2700000" algn="ctr" rotWithShape="0">
                     <a:schemeClr val="bg2">
@@ -27631,7 +27625,7 @@
           <a:effectLst/>
           <a:extLst>
             <a:ext uri="{AF507438-7753-43e0-B8FC-AC1667EBCBE1}">
-              <a14:hiddenEffects xmlns="" xmlns:a14="http://schemas.microsoft.com/office/drawing/2010/main">
+              <a14:hiddenEffects xmlns:a14="http://schemas.microsoft.com/office/drawing/2010/main" xmlns="">
                 <a:effectLst>
                   <a:outerShdw blurRad="63500" dist="38099" dir="2700000" algn="ctr" rotWithShape="0">
                     <a:schemeClr val="bg2">
@@ -27722,7 +27716,7 @@
           <a:effectLst/>
           <a:extLst>
             <a:ext uri="{AF507438-7753-43e0-B8FC-AC1667EBCBE1}">
-              <a14:hiddenEffects xmlns="" xmlns:a14="http://schemas.microsoft.com/office/drawing/2010/main">
+              <a14:hiddenEffects xmlns:a14="http://schemas.microsoft.com/office/drawing/2010/main" xmlns="">
                 <a:effectLst>
                   <a:outerShdw blurRad="63500" dist="38099" dir="2700000" algn="ctr" rotWithShape="0">
                     <a:schemeClr val="bg2">
@@ -27813,7 +27807,7 @@
           <a:effectLst/>
           <a:extLst>
             <a:ext uri="{AF507438-7753-43e0-B8FC-AC1667EBCBE1}">
-              <a14:hiddenEffects xmlns="" xmlns:a14="http://schemas.microsoft.com/office/drawing/2010/main">
+              <a14:hiddenEffects xmlns:a14="http://schemas.microsoft.com/office/drawing/2010/main" xmlns="">
                 <a:effectLst>
                   <a:outerShdw blurRad="63500" dist="38099" dir="2700000" algn="ctr" rotWithShape="0">
                     <a:schemeClr val="bg2">
@@ -27905,7 +27899,7 @@
           <a:effectLst/>
           <a:extLst>
             <a:ext uri="{AF507438-7753-43e0-B8FC-AC1667EBCBE1}">
-              <a14:hiddenEffects xmlns="" xmlns:a14="http://schemas.microsoft.com/office/drawing/2010/main">
+              <a14:hiddenEffects xmlns:a14="http://schemas.microsoft.com/office/drawing/2010/main" xmlns="">
                 <a:effectLst>
                   <a:outerShdw blurRad="63500" dist="38099" dir="2700000" algn="ctr" rotWithShape="0">
                     <a:schemeClr val="bg2">
@@ -28056,7 +28050,7 @@
           <a:effectLst/>
           <a:extLst>
             <a:ext uri="{AF507438-7753-43e0-B8FC-AC1667EBCBE1}">
-              <a14:hiddenEffects xmlns="" xmlns:a14="http://schemas.microsoft.com/office/drawing/2010/main">
+              <a14:hiddenEffects xmlns:a14="http://schemas.microsoft.com/office/drawing/2010/main" xmlns="">
                 <a:effectLst>
                   <a:outerShdw blurRad="63500" dist="38099" dir="2700000" algn="ctr" rotWithShape="0">
                     <a:schemeClr val="bg2">
@@ -28147,7 +28141,7 @@
           <a:effectLst/>
           <a:extLst>
             <a:ext uri="{AF507438-7753-43e0-B8FC-AC1667EBCBE1}">
-              <a14:hiddenEffects xmlns="" xmlns:a14="http://schemas.microsoft.com/office/drawing/2010/main">
+              <a14:hiddenEffects xmlns:a14="http://schemas.microsoft.com/office/drawing/2010/main" xmlns="">
                 <a:effectLst>
                   <a:outerShdw blurRad="63500" dist="38099" dir="2700000" algn="ctr" rotWithShape="0">
                     <a:schemeClr val="bg2">
@@ -28234,7 +28228,7 @@
           <a:effectLst/>
           <a:extLst>
             <a:ext uri="{AF507438-7753-43e0-B8FC-AC1667EBCBE1}">
-              <a14:hiddenEffects xmlns="" xmlns:a14="http://schemas.microsoft.com/office/drawing/2010/main">
+              <a14:hiddenEffects xmlns:a14="http://schemas.microsoft.com/office/drawing/2010/main" xmlns="">
                 <a:effectLst>
                   <a:outerShdw blurRad="63500" dist="38099" dir="2700000" algn="ctr" rotWithShape="0">
                     <a:schemeClr val="bg2">
@@ -28323,7 +28317,7 @@
           <a:effectLst/>
           <a:extLst>
             <a:ext uri="{AF507438-7753-43e0-B8FC-AC1667EBCBE1}">
-              <a14:hiddenEffects xmlns="" xmlns:a14="http://schemas.microsoft.com/office/drawing/2010/main">
+              <a14:hiddenEffects xmlns:a14="http://schemas.microsoft.com/office/drawing/2010/main" xmlns="">
                 <a:effectLst>
                   <a:outerShdw blurRad="63500" dist="38099" dir="2700000" algn="ctr" rotWithShape="0">
                     <a:schemeClr val="bg2">
@@ -28371,7 +28365,7 @@
           <a:effectLst/>
           <a:extLst>
             <a:ext uri="{AF507438-7753-43e0-B8FC-AC1667EBCBE1}">
-              <a14:hiddenEffects xmlns="" xmlns:a14="http://schemas.microsoft.com/office/drawing/2010/main">
+              <a14:hiddenEffects xmlns:a14="http://schemas.microsoft.com/office/drawing/2010/main" xmlns="">
                 <a:effectLst>
                   <a:outerShdw blurRad="63500" dist="38099" dir="2700000" algn="ctr" rotWithShape="0">
                     <a:schemeClr val="bg2">
@@ -28422,7 +28416,7 @@
           <a:effectLst/>
           <a:extLst>
             <a:ext uri="{AF507438-7753-43e0-B8FC-AC1667EBCBE1}">
-              <a14:hiddenEffects xmlns="" xmlns:a14="http://schemas.microsoft.com/office/drawing/2010/main">
+              <a14:hiddenEffects xmlns:a14="http://schemas.microsoft.com/office/drawing/2010/main" xmlns="">
                 <a:effectLst>
                   <a:outerShdw blurRad="63500" dist="38099" dir="2700000" algn="ctr" rotWithShape="0">
                     <a:schemeClr val="bg2">
@@ -28472,7 +28466,7 @@
           <a:effectLst/>
           <a:extLst>
             <a:ext uri="{AF507438-7753-43e0-B8FC-AC1667EBCBE1}">
-              <a14:hiddenEffects xmlns="" xmlns:a14="http://schemas.microsoft.com/office/drawing/2010/main">
+              <a14:hiddenEffects xmlns:a14="http://schemas.microsoft.com/office/drawing/2010/main" xmlns="">
                 <a:effectLst>
                   <a:outerShdw blurRad="63500" dist="38099" dir="2700000" algn="ctr" rotWithShape="0">
                     <a:schemeClr val="bg2">
@@ -28522,7 +28516,7 @@
           <a:effectLst/>
           <a:extLst>
             <a:ext uri="{AF507438-7753-43e0-B8FC-AC1667EBCBE1}">
-              <a14:hiddenEffects xmlns="" xmlns:a14="http://schemas.microsoft.com/office/drawing/2010/main">
+              <a14:hiddenEffects xmlns:a14="http://schemas.microsoft.com/office/drawing/2010/main" xmlns="">
                 <a:effectLst>
                   <a:outerShdw blurRad="63500" dist="38099" dir="2700000" algn="ctr" rotWithShape="0">
                     <a:schemeClr val="bg2">
@@ -28573,7 +28567,7 @@
           <a:effectLst/>
           <a:extLst>
             <a:ext uri="{AF507438-7753-43e0-B8FC-AC1667EBCBE1}">
-              <a14:hiddenEffects xmlns="" xmlns:a14="http://schemas.microsoft.com/office/drawing/2010/main">
+              <a14:hiddenEffects xmlns:a14="http://schemas.microsoft.com/office/drawing/2010/main" xmlns="">
                 <a:effectLst>
                   <a:outerShdw blurRad="63500" dist="38099" dir="2700000" algn="ctr" rotWithShape="0">
                     <a:schemeClr val="bg2">
@@ -28624,7 +28618,7 @@
           <a:effectLst/>
           <a:extLst>
             <a:ext uri="{AF507438-7753-43e0-B8FC-AC1667EBCBE1}">
-              <a14:hiddenEffects xmlns="" xmlns:a14="http://schemas.microsoft.com/office/drawing/2010/main">
+              <a14:hiddenEffects xmlns:a14="http://schemas.microsoft.com/office/drawing/2010/main" xmlns="">
                 <a:effectLst>
                   <a:outerShdw blurRad="63500" dist="38099" dir="2700000" algn="ctr" rotWithShape="0">
                     <a:schemeClr val="bg2">
@@ -28672,7 +28666,7 @@
           <a:effectLst/>
           <a:extLst>
             <a:ext uri="{AF507438-7753-43e0-B8FC-AC1667EBCBE1}">
-              <a14:hiddenEffects xmlns="" xmlns:a14="http://schemas.microsoft.com/office/drawing/2010/main">
+              <a14:hiddenEffects xmlns:a14="http://schemas.microsoft.com/office/drawing/2010/main" xmlns="">
                 <a:effectLst>
                   <a:outerShdw blurRad="63500" dist="38099" dir="2700000" algn="ctr" rotWithShape="0">
                     <a:schemeClr val="bg2">
@@ -28759,7 +28753,7 @@
           <a:effectLst/>
           <a:extLst>
             <a:ext uri="{AF507438-7753-43e0-B8FC-AC1667EBCBE1}">
-              <a14:hiddenEffects xmlns="" xmlns:a14="http://schemas.microsoft.com/office/drawing/2010/main">
+              <a14:hiddenEffects xmlns:a14="http://schemas.microsoft.com/office/drawing/2010/main" xmlns="">
                 <a:effectLst>
                   <a:outerShdw blurRad="63500" dist="38099" dir="2700000" algn="ctr" rotWithShape="0">
                     <a:schemeClr val="bg2">
@@ -28848,7 +28842,7 @@
           <a:effectLst/>
           <a:extLst>
             <a:ext uri="{AF507438-7753-43e0-B8FC-AC1667EBCBE1}">
-              <a14:hiddenEffects xmlns="" xmlns:a14="http://schemas.microsoft.com/office/drawing/2010/main">
+              <a14:hiddenEffects xmlns:a14="http://schemas.microsoft.com/office/drawing/2010/main" xmlns="">
                 <a:effectLst>
                   <a:outerShdw blurRad="63500" dist="38099" dir="2700000" algn="ctr" rotWithShape="0">
                     <a:schemeClr val="bg2">
@@ -29288,7 +29282,7 @@
           <a:effectLst/>
           <a:extLst>
             <a:ext uri="{AF507438-7753-43e0-B8FC-AC1667EBCBE1}">
-              <a14:hiddenEffects xmlns="" xmlns:a14="http://schemas.microsoft.com/office/drawing/2010/main">
+              <a14:hiddenEffects xmlns:a14="http://schemas.microsoft.com/office/drawing/2010/main" xmlns="">
                 <a:effectLst>
                   <a:outerShdw blurRad="63500" dist="38099" dir="2700000" algn="ctr" rotWithShape="0">
                     <a:schemeClr val="bg2">
@@ -29426,14 +29420,14 @@
           <a:noFill/>
           <a:extLst>
             <a:ext uri="{909E8E84-426E-40dd-AFC4-6F175D3DCCD1}">
-              <a14:hiddenFill xmlns="" xmlns:a14="http://schemas.microsoft.com/office/drawing/2010/main">
+              <a14:hiddenFill xmlns:a14="http://schemas.microsoft.com/office/drawing/2010/main" xmlns="">
                 <a:solidFill>
                   <a:srgbClr val="FFFFFF"/>
                 </a:solidFill>
               </a14:hiddenFill>
             </a:ext>
             <a:ext uri="{91240B29-F687-4f45-9708-019B960494DF}">
-              <a14:hiddenLine xmlns="" xmlns:a14="http://schemas.microsoft.com/office/drawing/2010/main" w="9525">
+              <a14:hiddenLine xmlns:a14="http://schemas.microsoft.com/office/drawing/2010/main" xmlns="" w="9525">
                 <a:solidFill>
                   <a:srgbClr val="000000"/>
                 </a:solidFill>
@@ -29443,7 +29437,7 @@
               </a14:hiddenLine>
             </a:ext>
             <a:ext uri="{FAA26D3D-D897-4be2-8F04-BA451C77F1D7}">
-              <ma14:placeholderFlag xmlns="" xmlns:ma14="http://schemas.microsoft.com/office/mac/drawingml/2011/main" val="1"/>
+              <ma14:placeholderFlag xmlns:ma14="http://schemas.microsoft.com/office/mac/drawingml/2011/main" xmlns="" val="1"/>
             </a:ext>
           </a:extLst>
         </p:spPr>
@@ -29923,14 +29917,14 @@
           <a:noFill/>
           <a:extLst>
             <a:ext uri="{909E8E84-426E-40dd-AFC4-6F175D3DCCD1}">
-              <a14:hiddenFill xmlns="" xmlns:a14="http://schemas.microsoft.com/office/drawing/2010/main">
+              <a14:hiddenFill xmlns:a14="http://schemas.microsoft.com/office/drawing/2010/main" xmlns="">
                 <a:solidFill>
                   <a:srgbClr val="FFFFFF"/>
                 </a:solidFill>
               </a14:hiddenFill>
             </a:ext>
             <a:ext uri="{91240B29-F687-4f45-9708-019B960494DF}">
-              <a14:hiddenLine xmlns="" xmlns:a14="http://schemas.microsoft.com/office/drawing/2010/main" w="9525">
+              <a14:hiddenLine xmlns:a14="http://schemas.microsoft.com/office/drawing/2010/main" xmlns="" w="9525">
                 <a:solidFill>
                   <a:srgbClr val="000000"/>
                 </a:solidFill>
@@ -29940,7 +29934,7 @@
               </a14:hiddenLine>
             </a:ext>
             <a:ext uri="{FAA26D3D-D897-4be2-8F04-BA451C77F1D7}">
-              <ma14:placeholderFlag xmlns="" xmlns:ma14="http://schemas.microsoft.com/office/mac/drawingml/2011/main" val="1"/>
+              <ma14:placeholderFlag xmlns:ma14="http://schemas.microsoft.com/office/mac/drawingml/2011/main" xmlns="" val="1"/>
             </a:ext>
           </a:extLst>
         </p:spPr>
@@ -30117,15 +30111,7 @@
             </a:r>
             <a:r>
               <a:rPr lang="de-CH"/>
-              <a:t>multilabel instead of </a:t>
-            </a:r>
-            <a:r>
-              <a:rPr lang="de-CH"/>
-              <a:t>multiclass</a:t>
-            </a:r>
-            <a:r>
-              <a:rPr lang="de-CH"/>
-              <a:t>, </a:t>
+              <a:t>multilabel instead of multiclass, </a:t>
             </a:r>
             <a:r>
               <a:rPr lang="de-CH" smtClean="0"/>
@@ -30135,7 +30121,6 @@
               <a:rPr lang="de-CH"/>
               <a:t>up through cross-validation</a:t>
             </a:r>
-            <a:endParaRPr lang="de-CH"/>
           </a:p>
           <a:p>
             <a:pPr marL="285750" indent="-285750">
@@ -30209,14 +30194,14 @@
           <a:noFill/>
           <a:extLst>
             <a:ext uri="{909E8E84-426E-40dd-AFC4-6F175D3DCCD1}">
-              <a14:hiddenFill xmlns="" xmlns:a14="http://schemas.microsoft.com/office/drawing/2010/main">
+              <a14:hiddenFill xmlns:a14="http://schemas.microsoft.com/office/drawing/2010/main" xmlns="">
                 <a:solidFill>
                   <a:srgbClr val="FFFFFF"/>
                 </a:solidFill>
               </a14:hiddenFill>
             </a:ext>
             <a:ext uri="{91240B29-F687-4f45-9708-019B960494DF}">
-              <a14:hiddenLine xmlns="" xmlns:a14="http://schemas.microsoft.com/office/drawing/2010/main" w="9525">
+              <a14:hiddenLine xmlns:a14="http://schemas.microsoft.com/office/drawing/2010/main" xmlns="" w="9525">
                 <a:solidFill>
                   <a:srgbClr val="000000"/>
                 </a:solidFill>
@@ -30226,7 +30211,7 @@
               </a14:hiddenLine>
             </a:ext>
             <a:ext uri="{FAA26D3D-D897-4be2-8F04-BA451C77F1D7}">
-              <ma14:placeholderFlag xmlns="" xmlns:ma14="http://schemas.microsoft.com/office/mac/drawingml/2011/main" val="1"/>
+              <ma14:placeholderFlag xmlns:ma14="http://schemas.microsoft.com/office/mac/drawingml/2011/main" xmlns="" val="1"/>
             </a:ext>
           </a:extLst>
         </p:spPr>
@@ -30316,14 +30301,14 @@
           <a:noFill/>
           <a:extLst>
             <a:ext uri="{909E8E84-426E-40dd-AFC4-6F175D3DCCD1}">
-              <a14:hiddenFill xmlns="" xmlns:a14="http://schemas.microsoft.com/office/drawing/2010/main">
+              <a14:hiddenFill xmlns:a14="http://schemas.microsoft.com/office/drawing/2010/main" xmlns="">
                 <a:solidFill>
                   <a:srgbClr val="FFFFFF"/>
                 </a:solidFill>
               </a14:hiddenFill>
             </a:ext>
             <a:ext uri="{91240B29-F687-4f45-9708-019B960494DF}">
-              <a14:hiddenLine xmlns="" xmlns:a14="http://schemas.microsoft.com/office/drawing/2010/main" w="9525">
+              <a14:hiddenLine xmlns:a14="http://schemas.microsoft.com/office/drawing/2010/main" xmlns="" w="9525">
                 <a:solidFill>
                   <a:srgbClr val="000000"/>
                 </a:solidFill>
@@ -30411,14 +30396,14 @@
           <a:noFill/>
           <a:extLst>
             <a:ext uri="{909E8E84-426E-40dd-AFC4-6F175D3DCCD1}">
-              <a14:hiddenFill xmlns="" xmlns:a14="http://schemas.microsoft.com/office/drawing/2010/main">
+              <a14:hiddenFill xmlns:a14="http://schemas.microsoft.com/office/drawing/2010/main" xmlns="">
                 <a:solidFill>
                   <a:srgbClr val="FFFFFF"/>
                 </a:solidFill>
               </a14:hiddenFill>
             </a:ext>
             <a:ext uri="{91240B29-F687-4f45-9708-019B960494DF}">
-              <a14:hiddenLine xmlns="" xmlns:a14="http://schemas.microsoft.com/office/drawing/2010/main" w="9525">
+              <a14:hiddenLine xmlns:a14="http://schemas.microsoft.com/office/drawing/2010/main" xmlns="" w="9525">
                 <a:solidFill>
                   <a:srgbClr val="000000"/>
                 </a:solidFill>
@@ -30762,7 +30747,7 @@
         <a:effectLst/>
         <a:extLst>
           <a:ext uri="{AF507438-7753-43e0-B8FC-AC1667EBCBE1}">
-            <a14:hiddenEffects xmlns="" xmlns:a14="http://schemas.microsoft.com/office/drawing/2010/main">
+            <a14:hiddenEffects xmlns:a14="http://schemas.microsoft.com/office/drawing/2010/main" xmlns="">
               <a:effectLst>
                 <a:outerShdw blurRad="63500" dist="38099" dir="2700000" algn="ctr" rotWithShape="0">
                   <a:schemeClr val="bg2">
@@ -30840,7 +30825,7 @@
         <a:effectLst/>
         <a:extLst>
           <a:ext uri="{AF507438-7753-43e0-B8FC-AC1667EBCBE1}">
-            <a14:hiddenEffects xmlns="" xmlns:a14="http://schemas.microsoft.com/office/drawing/2010/main">
+            <a14:hiddenEffects xmlns:a14="http://schemas.microsoft.com/office/drawing/2010/main" xmlns="">
               <a:effectLst>
                 <a:outerShdw blurRad="63500" dist="38099" dir="2700000" algn="ctr" rotWithShape="0">
                   <a:schemeClr val="bg2">

</xml_diff>